<commit_message>
Web : mise en forme dev
</commit_message>
<xml_diff>
--- a/web/5-Developpement/developpement.pptx
+++ b/web/5-Developpement/developpement.pptx
@@ -219,7 +219,7 @@
           <a:p>
             <a:fld id="{5EB47243-285B-2741-8C7D-C88258D9CCFA}" type="datetimeFigureOut">
               <a:rPr lang="fr-FR" smtClean="0"/>
-              <a:t>03/06/2019</a:t>
+              <a:t>05/06/2019</a:t>
             </a:fld>
             <a:endParaRPr lang="fr-FR"/>
           </a:p>
@@ -285,7 +285,7 @@
           <a:p>
             <a:fld id="{C5CA9166-BC48-2C47-B9BF-6F57720E77B8}" type="slidenum">
               <a:rPr lang="fr-FR" smtClean="0"/>
-              <a:t>‹N°›</a:t>
+              <a:t>‹#›</a:t>
             </a:fld>
             <a:endParaRPr lang="fr-FR"/>
           </a:p>
@@ -385,7 +385,7 @@
           <a:p>
             <a:fld id="{7D088D39-B4EA-D24B-B9C3-6A64886EABE2}" type="datetimeFigureOut">
               <a:rPr lang="fr-FR" smtClean="0"/>
-              <a:t>03/06/2019</a:t>
+              <a:t>05/06/2019</a:t>
             </a:fld>
             <a:endParaRPr lang="fr-FR"/>
           </a:p>
@@ -543,7 +543,7 @@
           <a:p>
             <a:fld id="{1C0E2CBA-6097-B848-A7DA-4D7BD6EB303B}" type="slidenum">
               <a:rPr lang="fr-FR" smtClean="0"/>
-              <a:t>‹N°›</a:t>
+              <a:t>‹#›</a:t>
             </a:fld>
             <a:endParaRPr lang="fr-FR"/>
           </a:p>
@@ -1858,7 +1858,7 @@
           <a:p>
             <a:fld id="{BB2FA04C-1355-4CE6-8050-4BD994E23BD5}" type="datetime4">
               <a:rPr lang="fr-FR" smtClean="0"/>
-              <a:t>3 juin 2019</a:t>
+              <a:t>5 juin 2019</a:t>
             </a:fld>
             <a:endParaRPr lang="fr-FR" dirty="0"/>
           </a:p>
@@ -1936,7 +1936,7 @@
             <a:fld id="{DCE37727-CC04-7A46-938D-2CCFF056F773}" type="slidenum">
               <a:rPr lang="fr-FR" smtClean="0"/>
               <a:pPr/>
-              <a:t>‹N°›</a:t>
+              <a:t>‹#›</a:t>
             </a:fld>
             <a:endParaRPr lang="fr-FR"/>
           </a:p>
@@ -2449,7 +2449,7 @@
           <a:p>
             <a:fld id="{A81C4219-47FF-4375-968D-EABA4A212953}" type="datetime4">
               <a:rPr lang="fr-FR" smtClean="0"/>
-              <a:t>3 juin 2019</a:t>
+              <a:t>5 juin 2019</a:t>
             </a:fld>
             <a:endParaRPr lang="fr-FR" dirty="0"/>
           </a:p>
@@ -2527,7 +2527,7 @@
             <a:fld id="{DCE37727-CC04-7A46-938D-2CCFF056F773}" type="slidenum">
               <a:rPr lang="fr-FR" smtClean="0"/>
               <a:pPr/>
-              <a:t>‹N°›</a:t>
+              <a:t>‹#›</a:t>
             </a:fld>
             <a:endParaRPr lang="fr-FR"/>
           </a:p>
@@ -4285,7 +4285,7 @@
           <a:p>
             <a:fld id="{81E3CCF4-D669-4BB6-B0BE-EE495E88AE6B}" type="datetime4">
               <a:rPr lang="fr-FR" smtClean="0"/>
-              <a:t>3 juin 2019</a:t>
+              <a:t>5 juin 2019</a:t>
             </a:fld>
             <a:endParaRPr lang="fr-FR" dirty="0"/>
           </a:p>
@@ -4363,7 +4363,7 @@
             <a:fld id="{DCE37727-CC04-7A46-938D-2CCFF056F773}" type="slidenum">
               <a:rPr lang="fr-FR" smtClean="0"/>
               <a:pPr/>
-              <a:t>‹N°›</a:t>
+              <a:t>‹#›</a:t>
             </a:fld>
             <a:endParaRPr lang="fr-FR"/>
           </a:p>
@@ -5221,7 +5221,7 @@
           <a:p>
             <a:fld id="{2E52B8B1-858B-4633-AE57-5B6CA9292F2B}" type="datetime4">
               <a:rPr lang="fr-FR" smtClean="0"/>
-              <a:t>3 juin 2019</a:t>
+              <a:t>5 juin 2019</a:t>
             </a:fld>
             <a:endParaRPr lang="fr-FR" dirty="0"/>
           </a:p>
@@ -5299,7 +5299,7 @@
             <a:fld id="{DCE37727-CC04-7A46-938D-2CCFF056F773}" type="slidenum">
               <a:rPr lang="fr-FR" smtClean="0"/>
               <a:pPr/>
-              <a:t>‹N°›</a:t>
+              <a:t>‹#›</a:t>
             </a:fld>
             <a:endParaRPr lang="fr-FR"/>
           </a:p>
@@ -5842,7 +5842,7 @@
             </a:pPr>
             <a:fld id="{00000000-1234-1234-1234-123412341234}" type="slidenum">
               <a:rPr lang="en"/>
-              <a:t>‹N°›</a:t>
+              <a:t>‹#›</a:t>
             </a:fld>
             <a:endParaRPr/>
           </a:p>
@@ -6407,7 +6407,7 @@
         </p:blipFill>
         <p:spPr>
           <a:xfrm>
-            <a:off x="6656611" y="3137082"/>
+            <a:off x="6834411" y="2674085"/>
             <a:ext cx="1570286" cy="1509830"/>
           </a:xfrm>
           <a:prstGeom prst="rect">
@@ -6486,7 +6486,7 @@
                 <a:cs typeface="Calibri"/>
                 <a:sym typeface="Calibri"/>
               </a:rPr>
-              <a:t>Le développement d’un site web contient deux parties</a:t>
+              <a:t>Le développement d’un site web contient deux parties :</a:t>
             </a:r>
           </a:p>
         </p:txBody>
@@ -6501,7 +6501,7 @@
         </p:nvCxnSpPr>
         <p:spPr>
           <a:xfrm>
-            <a:off x="2955373" y="3654300"/>
+            <a:off x="3133173" y="3191303"/>
             <a:ext cx="3577687" cy="0"/>
           </a:xfrm>
           <a:prstGeom prst="straightConnector1">
@@ -6544,7 +6544,7 @@
         </p:blipFill>
         <p:spPr>
           <a:xfrm>
-            <a:off x="358518" y="3366876"/>
+            <a:off x="536318" y="2903879"/>
             <a:ext cx="2396885" cy="1382204"/>
           </a:xfrm>
           <a:prstGeom prst="rect">
@@ -6568,7 +6568,7 @@
         </p:nvCxnSpPr>
         <p:spPr>
           <a:xfrm flipH="1">
-            <a:off x="2955373" y="4004903"/>
+            <a:off x="3133173" y="3541906"/>
             <a:ext cx="3501268" cy="0"/>
           </a:xfrm>
           <a:prstGeom prst="straightConnector1">
@@ -6597,7 +6597,7 @@
         </p:nvSpPr>
         <p:spPr>
           <a:xfrm>
-            <a:off x="3695535" y="3105481"/>
+            <a:off x="3873335" y="2642484"/>
             <a:ext cx="2028775" cy="1496028"/>
           </a:xfrm>
           <a:prstGeom prst="cloud">
@@ -6651,8 +6651,8 @@
         </p:nvSpPr>
         <p:spPr>
           <a:xfrm>
-            <a:off x="588865" y="4975957"/>
-            <a:ext cx="2279979" cy="923330"/>
+            <a:off x="776492" y="4512960"/>
+            <a:ext cx="2491641" cy="1015663"/>
           </a:xfrm>
           <a:prstGeom prst="rect">
             <a:avLst/>
@@ -6666,13 +6666,13 @@
           <a:lstStyle/>
           <a:p>
             <a:r>
-              <a:rPr lang="fr-FR" b="1" u="sng" dirty="0"/>
+              <a:rPr lang="fr-FR" sz="2000" b="1" u="sng" dirty="0"/>
               <a:t>Front</a:t>
             </a:r>
           </a:p>
           <a:p>
             <a:r>
-              <a:rPr lang="fr-FR" dirty="0"/>
+              <a:rPr lang="fr-FR" sz="2000" dirty="0"/>
               <a:t>Ce qui s’exécute dans le navigateur.</a:t>
             </a:r>
           </a:p>
@@ -6686,8 +6686,8 @@
         </p:nvSpPr>
         <p:spPr>
           <a:xfrm>
-            <a:off x="6074103" y="4975957"/>
-            <a:ext cx="1897232" cy="923330"/>
+            <a:off x="6062133" y="4512960"/>
+            <a:ext cx="2087002" cy="1015663"/>
           </a:xfrm>
           <a:prstGeom prst="rect">
             <a:avLst/>
@@ -6702,15 +6702,118 @@
           <a:p>
             <a:pPr algn="r"/>
             <a:r>
-              <a:rPr lang="fr-FR" b="1" u="sng" dirty="0"/>
+              <a:rPr lang="fr-FR" sz="2000" b="1" u="sng" dirty="0"/>
               <a:t>Back</a:t>
             </a:r>
           </a:p>
           <a:p>
-            <a:r>
-              <a:rPr lang="fr-FR" dirty="0"/>
-              <a:t>Ce qui s’exécute dans le serveur.</a:t>
-            </a:r>
+            <a:pPr algn="r"/>
+            <a:r>
+              <a:rPr lang="fr-FR" sz="2000" dirty="0"/>
+              <a:t>Ce qui s’exécute sur le serveur.</a:t>
+            </a:r>
+          </a:p>
+        </p:txBody>
+      </p:sp>
+      <p:sp>
+        <p:nvSpPr>
+          <p:cNvPr id="11" name="Espace réservé de la date 3">
+            <a:extLst>
+              <a:ext uri="{FF2B5EF4-FFF2-40B4-BE49-F238E27FC236}">
+                <a16:creationId xmlns:a16="http://schemas.microsoft.com/office/drawing/2014/main" id="{5C84ECBD-BF62-124A-9CF0-441464D6A8DA}"/>
+              </a:ext>
+            </a:extLst>
+          </p:cNvPr>
+          <p:cNvSpPr>
+            <a:spLocks noGrp="1"/>
+          </p:cNvSpPr>
+          <p:nvPr>
+            <p:ph type="dt" sz="half" idx="10"/>
+          </p:nvPr>
+        </p:nvSpPr>
+        <p:spPr>
+          <a:xfrm>
+            <a:off x="901702" y="6654800"/>
+            <a:ext cx="2133600" cy="206375"/>
+          </a:xfrm>
+        </p:spPr>
+        <p:txBody>
+          <a:bodyPr/>
+          <a:lstStyle/>
+          <a:p>
+            <a:fld id="{BB2FA04C-1355-4CE6-8050-4BD994E23BD5}" type="datetime4">
+              <a:rPr lang="fr-FR" smtClean="0"/>
+              <a:t>5 juin 2019</a:t>
+            </a:fld>
+            <a:endParaRPr lang="fr-FR" dirty="0"/>
+          </a:p>
+        </p:txBody>
+      </p:sp>
+      <p:sp>
+        <p:nvSpPr>
+          <p:cNvPr id="12" name="Espace réservé du pied de page 4">
+            <a:extLst>
+              <a:ext uri="{FF2B5EF4-FFF2-40B4-BE49-F238E27FC236}">
+                <a16:creationId xmlns:a16="http://schemas.microsoft.com/office/drawing/2014/main" id="{6EFD8C49-3932-C94A-99C2-A5AD1B9A3A3E}"/>
+              </a:ext>
+            </a:extLst>
+          </p:cNvPr>
+          <p:cNvSpPr>
+            <a:spLocks noGrp="1"/>
+          </p:cNvSpPr>
+          <p:nvPr>
+            <p:ph type="ftr" sz="quarter" idx="11"/>
+          </p:nvPr>
+        </p:nvSpPr>
+        <p:spPr>
+          <a:xfrm>
+            <a:off x="3039530" y="6654800"/>
+            <a:ext cx="5257800" cy="206375"/>
+          </a:xfrm>
+        </p:spPr>
+        <p:txBody>
+          <a:bodyPr/>
+          <a:lstStyle/>
+          <a:p>
+            <a:r>
+              <a:rPr lang="fr-FR"/>
+              <a:t>DIU NSI</a:t>
+            </a:r>
+          </a:p>
+        </p:txBody>
+      </p:sp>
+      <p:sp>
+        <p:nvSpPr>
+          <p:cNvPr id="13" name="Espace réservé du numéro de diapositive 5">
+            <a:extLst>
+              <a:ext uri="{FF2B5EF4-FFF2-40B4-BE49-F238E27FC236}">
+                <a16:creationId xmlns:a16="http://schemas.microsoft.com/office/drawing/2014/main" id="{2E493AFA-EF12-7542-9439-8B9CA4899864}"/>
+              </a:ext>
+            </a:extLst>
+          </p:cNvPr>
+          <p:cNvSpPr>
+            <a:spLocks noGrp="1"/>
+          </p:cNvSpPr>
+          <p:nvPr>
+            <p:ph type="sldNum" sz="quarter" idx="12"/>
+          </p:nvPr>
+        </p:nvSpPr>
+        <p:spPr>
+          <a:xfrm>
+            <a:off x="0" y="6553200"/>
+            <a:ext cx="457200" cy="304800"/>
+          </a:xfrm>
+        </p:spPr>
+        <p:txBody>
+          <a:bodyPr/>
+          <a:lstStyle/>
+          <a:p>
+            <a:fld id="{DCE37727-CC04-7A46-938D-2CCFF056F773}" type="slidenum">
+              <a:rPr lang="fr-FR" smtClean="0"/>
+              <a:pPr/>
+              <a:t>3</a:t>
+            </a:fld>
+            <a:endParaRPr lang="fr-FR"/>
           </a:p>
         </p:txBody>
       </p:sp>
@@ -6795,7 +6898,7 @@
           <a:p>
             <a:fld id="{BB2FA04C-1355-4CE6-8050-4BD994E23BD5}" type="datetime4">
               <a:rPr lang="fr-FR" smtClean="0"/>
-              <a:t>3 juin 2019</a:t>
+              <a:t>5 juin 2019</a:t>
             </a:fld>
             <a:endParaRPr lang="fr-FR" dirty="0"/>
           </a:p>
@@ -6884,14 +6987,22 @@
           <a:p>
             <a:r>
               <a:rPr lang="fr-FR" dirty="0"/>
-              <a:t>Affichage Graphique</a:t>
+              <a:t>Affichage graphique</a:t>
             </a:r>
           </a:p>
           <a:p>
             <a:pPr lvl="1"/>
             <a:r>
               <a:rPr lang="fr-FR" dirty="0"/>
-              <a:t>Adapté à l’écran (responsive)</a:t>
+              <a:t>Adapté à l’écran (</a:t>
+            </a:r>
+            <a:r>
+              <a:rPr lang="fr-FR" i="1" dirty="0"/>
+              <a:t>responsive</a:t>
+            </a:r>
+            <a:r>
+              <a:rPr lang="fr-FR" dirty="0"/>
+              <a:t>)</a:t>
             </a:r>
           </a:p>
           <a:p>
@@ -6904,25 +7015,29 @@
           <a:p>
             <a:r>
               <a:rPr lang="fr-FR" dirty="0"/>
-              <a:t>Interaction Utilisateur</a:t>
+              <a:t>Interaction utilisateur</a:t>
             </a:r>
           </a:p>
           <a:p>
             <a:pPr lvl="1"/>
             <a:r>
               <a:rPr lang="fr-FR" dirty="0"/>
-              <a:t>Réactivité (Asynchronisme)</a:t>
+              <a:t>Réactivité (asynchronisme)</a:t>
             </a:r>
           </a:p>
           <a:p>
             <a:pPr lvl="1"/>
             <a:r>
               <a:rPr lang="fr-FR" dirty="0"/>
-              <a:t>Rapidité (progressive </a:t>
-            </a:r>
-            <a:r>
-              <a:rPr lang="fr-FR" dirty="0" err="1"/>
-              <a:t>app</a:t>
+              <a:t>Rapidité (</a:t>
+            </a:r>
+            <a:r>
+              <a:rPr lang="fr-FR" i="1" dirty="0"/>
+              <a:t>progressive </a:t>
+            </a:r>
+            <a:r>
+              <a:rPr lang="fr-FR" i="1" dirty="0" err="1"/>
+              <a:t>apps</a:t>
             </a:r>
             <a:r>
               <a:rPr lang="fr-FR" dirty="0"/>
@@ -6932,14 +7047,14 @@
           <a:p>
             <a:r>
               <a:rPr lang="fr-FR" dirty="0"/>
-              <a:t>Communication Serveur</a:t>
+              <a:t>Communication serveur</a:t>
             </a:r>
           </a:p>
           <a:p>
             <a:pPr lvl="1"/>
             <a:r>
               <a:rPr lang="fr-FR" dirty="0"/>
-              <a:t>Envoi des requêtes (gestion erreurs)</a:t>
+              <a:t>Envoi des requêtes (gestion des erreurs)</a:t>
             </a:r>
           </a:p>
           <a:p>
@@ -6959,7 +7074,15 @@
             </a:pPr>
             <a:r>
               <a:rPr lang="fr-FR" dirty="0"/>
-              <a:t>Nombreux Framework de Dev</a:t>
+              <a:t>Nombreux </a:t>
+            </a:r>
+            <a:r>
+              <a:rPr lang="fr-FR" i="1" dirty="0" err="1"/>
+              <a:t>framework</a:t>
+            </a:r>
+            <a:r>
+              <a:rPr lang="fr-FR" dirty="0"/>
+              <a:t> de développement</a:t>
             </a:r>
           </a:p>
           <a:p>
@@ -6967,12 +7090,8 @@
               <a:buNone/>
             </a:pPr>
             <a:r>
-              <a:rPr lang="fr-FR" dirty="0" err="1"/>
-              <a:t>Jquery</a:t>
-            </a:r>
-            <a:r>
               <a:rPr lang="fr-FR" dirty="0"/>
-              <a:t>, </a:t>
+              <a:t>jQuery, </a:t>
             </a:r>
             <a:r>
               <a:rPr lang="fr-FR" dirty="0" err="1"/>
@@ -7111,14 +7230,19 @@
             <p:ph type="dt" sz="half" idx="10"/>
           </p:nvPr>
         </p:nvSpPr>
-        <p:spPr/>
+        <p:spPr>
+          <a:xfrm>
+            <a:off x="901702" y="6654800"/>
+            <a:ext cx="2133600" cy="206375"/>
+          </a:xfrm>
+        </p:spPr>
         <p:txBody>
           <a:bodyPr/>
           <a:lstStyle/>
           <a:p>
             <a:fld id="{BB2FA04C-1355-4CE6-8050-4BD994E23BD5}" type="datetime4">
               <a:rPr lang="fr-FR" smtClean="0"/>
-              <a:t>3 juin 2019</a:t>
+              <a:t>5 juin 2019</a:t>
             </a:fld>
             <a:endParaRPr lang="fr-FR" dirty="0"/>
           </a:p>
@@ -7198,7 +7322,12 @@
             <p:ph sz="half" idx="1"/>
           </p:nvPr>
         </p:nvSpPr>
-        <p:spPr/>
+        <p:spPr>
+          <a:xfrm>
+            <a:off x="457200" y="1261534"/>
+            <a:ext cx="8229600" cy="5139898"/>
+          </a:xfrm>
+        </p:spPr>
         <p:txBody>
           <a:bodyPr>
             <a:normAutofit fontScale="92500" lnSpcReduction="10000"/>
@@ -7214,27 +7343,27 @@
             <a:pPr lvl="1"/>
             <a:r>
               <a:rPr lang="fr-FR" dirty="0"/>
-              <a:t>Services métier</a:t>
+              <a:t>Services métier (recherche, calculs…)</a:t>
             </a:r>
           </a:p>
           <a:p>
             <a:pPr lvl="1"/>
             <a:r>
               <a:rPr lang="fr-FR" dirty="0"/>
-              <a:t>Données (Base de données)</a:t>
+              <a:t>Données (base de données)</a:t>
             </a:r>
           </a:p>
           <a:p>
             <a:r>
               <a:rPr lang="fr-FR" dirty="0"/>
-              <a:t>Interaction Front</a:t>
+              <a:t>Interaction avec le Front</a:t>
             </a:r>
           </a:p>
           <a:p>
             <a:pPr lvl="1"/>
             <a:r>
               <a:rPr lang="fr-FR" dirty="0"/>
-              <a:t>Accès aux ressources </a:t>
+              <a:t>Accès aux ressources</a:t>
             </a:r>
           </a:p>
           <a:p>
@@ -7254,14 +7383,14 @@
             <a:pPr lvl="1"/>
             <a:r>
               <a:rPr lang="fr-FR" dirty="0"/>
-              <a:t>Authentification / Confidentialité</a:t>
+              <a:t>Authentification / confidentialité</a:t>
             </a:r>
           </a:p>
           <a:p>
             <a:pPr lvl="1"/>
             <a:r>
               <a:rPr lang="fr-FR" dirty="0"/>
-              <a:t>Attaques / Bots</a:t>
+              <a:t>Attaques / bots</a:t>
             </a:r>
           </a:p>
           <a:p>
@@ -7274,18 +7403,20 @@
             <a:pPr lvl="1"/>
             <a:r>
               <a:rPr lang="fr-FR" dirty="0"/>
-              <a:t>Nb utilisateurs</a:t>
+              <a:t>Nombre d’utilisateurs simultanés</a:t>
             </a:r>
           </a:p>
           <a:p>
             <a:pPr lvl="1"/>
             <a:r>
               <a:rPr lang="fr-FR" dirty="0"/>
-              <a:t>Latence</a:t>
-            </a:r>
-          </a:p>
-          <a:p>
-            <a:pPr lvl="1"/>
+              <a:t>Latence (temps entre la requête et la réponse)</a:t>
+            </a:r>
+          </a:p>
+          <a:p>
+            <a:pPr marL="457200" lvl="1" indent="0">
+              <a:buNone/>
+            </a:pPr>
             <a:endParaRPr lang="fr-FR" dirty="0"/>
           </a:p>
           <a:p>
@@ -7294,7 +7425,15 @@
             </a:pPr>
             <a:r>
               <a:rPr lang="fr-FR" dirty="0"/>
-              <a:t>Nombreux Framework proposés</a:t>
+              <a:t>Nombreux </a:t>
+            </a:r>
+            <a:r>
+              <a:rPr lang="fr-FR" i="1" dirty="0" err="1"/>
+              <a:t>framework</a:t>
+            </a:r>
+            <a:r>
+              <a:rPr lang="fr-FR" dirty="0"/>
+              <a:t> proposés</a:t>
             </a:r>
           </a:p>
           <a:p>
@@ -7317,16 +7456,6 @@
               <a:rPr lang="fr-FR" dirty="0"/>
               <a:t>, etc.</a:t>
             </a:r>
-          </a:p>
-          <a:p>
-            <a:pPr marL="0" indent="0">
-              <a:buNone/>
-            </a:pPr>
-            <a:endParaRPr lang="fr-FR" dirty="0"/>
-          </a:p>
-          <a:p>
-            <a:pPr lvl="1"/>
-            <a:endParaRPr lang="fr-FR" dirty="0"/>
           </a:p>
         </p:txBody>
       </p:sp>
@@ -7346,7 +7475,7 @@
         </p:blipFill>
         <p:spPr>
           <a:xfrm>
-            <a:off x="6517639" y="3618712"/>
+            <a:off x="6727044" y="3076568"/>
             <a:ext cx="1570286" cy="1509830"/>
           </a:xfrm>
           <a:prstGeom prst="rect">
@@ -7443,84 +7572,28 @@
               </a:spcBef>
             </a:pPr>
             <a:r>
-              <a:rPr lang="en" dirty="0">
+              <a:rPr lang="fr-FR" dirty="0">
                 <a:ea typeface="Calibri"/>
                 <a:cs typeface="Calibri"/>
                 <a:sym typeface="Calibri"/>
               </a:rPr>
-              <a:t>Page </a:t>
-            </a:r>
-            <a:r>
-              <a:rPr lang="en" dirty="0" err="1">
+              <a:t>Page statique : </a:t>
+            </a:r>
+            <a:r>
+              <a:rPr lang="fr-FR" b="1" dirty="0">
                 <a:ea typeface="Calibri"/>
                 <a:cs typeface="Calibri"/>
                 <a:sym typeface="Calibri"/>
               </a:rPr>
-              <a:t>statique</a:t>
-            </a:r>
-            <a:r>
-              <a:rPr lang="en" dirty="0">
+              <a:t>toujours le même contenu </a:t>
+            </a:r>
+            <a:r>
+              <a:rPr lang="fr-FR" dirty="0">
                 <a:ea typeface="Calibri"/>
                 <a:cs typeface="Calibri"/>
                 <a:sym typeface="Calibri"/>
               </a:rPr>
-              <a:t> : </a:t>
-            </a:r>
-            <a:r>
-              <a:rPr lang="en" b="1" dirty="0" err="1">
-                <a:ea typeface="Calibri"/>
-                <a:cs typeface="Calibri"/>
-                <a:sym typeface="Calibri"/>
-              </a:rPr>
-              <a:t>toujours</a:t>
-            </a:r>
-            <a:r>
-              <a:rPr lang="en" b="1" dirty="0">
-                <a:ea typeface="Calibri"/>
-                <a:cs typeface="Calibri"/>
-                <a:sym typeface="Calibri"/>
-              </a:rPr>
-              <a:t> le </a:t>
-            </a:r>
-            <a:r>
-              <a:rPr lang="en" b="1" dirty="0" err="1">
-                <a:ea typeface="Calibri"/>
-                <a:cs typeface="Calibri"/>
-                <a:sym typeface="Calibri"/>
-              </a:rPr>
-              <a:t>même</a:t>
-            </a:r>
-            <a:r>
-              <a:rPr lang="en" b="1" dirty="0">
-                <a:ea typeface="Calibri"/>
-                <a:cs typeface="Calibri"/>
-                <a:sym typeface="Calibri"/>
-              </a:rPr>
-              <a:t> </a:t>
-            </a:r>
-            <a:r>
-              <a:rPr lang="en" b="1" dirty="0" err="1">
-                <a:ea typeface="Calibri"/>
-                <a:cs typeface="Calibri"/>
-                <a:sym typeface="Calibri"/>
-              </a:rPr>
-              <a:t>contenu</a:t>
-            </a:r>
-            <a:r>
-              <a:rPr lang="en" b="1" dirty="0">
-                <a:ea typeface="Calibri"/>
-                <a:cs typeface="Calibri"/>
-                <a:sym typeface="Calibri"/>
-              </a:rPr>
-              <a:t> </a:t>
-            </a:r>
-            <a:r>
-              <a:rPr lang="en" dirty="0">
-                <a:ea typeface="Calibri"/>
-                <a:cs typeface="Calibri"/>
-                <a:sym typeface="Calibri"/>
-              </a:rPr>
-              <a:t>quelque soit l’utilisateur et ses interactions</a:t>
+              <a:t>quel que soit l’utilisateur et ses interactions</a:t>
             </a:r>
           </a:p>
           <a:p>
@@ -7532,44 +7605,12 @@
               <a:buAutoNum type="arabicPeriod"/>
             </a:pPr>
             <a:r>
-              <a:rPr lang="en" dirty="0">
+              <a:rPr lang="fr-FR" dirty="0">
                 <a:ea typeface="Calibri"/>
                 <a:cs typeface="Calibri"/>
                 <a:sym typeface="Calibri"/>
               </a:rPr>
-              <a:t>Le </a:t>
-            </a:r>
-            <a:r>
-              <a:rPr lang="en" dirty="0" err="1">
-                <a:ea typeface="Calibri"/>
-                <a:cs typeface="Calibri"/>
-                <a:sym typeface="Calibri"/>
-              </a:rPr>
-              <a:t>serveur</a:t>
-            </a:r>
-            <a:r>
-              <a:rPr lang="en" dirty="0">
-                <a:ea typeface="Calibri"/>
-                <a:cs typeface="Calibri"/>
-                <a:sym typeface="Calibri"/>
-              </a:rPr>
-              <a:t> </a:t>
-            </a:r>
-            <a:r>
-              <a:rPr lang="en" dirty="0" err="1">
-                <a:ea typeface="Calibri"/>
-                <a:cs typeface="Calibri"/>
-                <a:sym typeface="Calibri"/>
-              </a:rPr>
-              <a:t>possède</a:t>
-            </a:r>
-            <a:r>
-              <a:rPr lang="en" dirty="0">
-                <a:ea typeface="Calibri"/>
-                <a:cs typeface="Calibri"/>
-                <a:sym typeface="Calibri"/>
-              </a:rPr>
-              <a:t> toutes les pages statiques</a:t>
+              <a:t>Le serveur possède toutes les pages statiques</a:t>
             </a:r>
           </a:p>
           <a:p>
@@ -7581,28 +7622,12 @@
               <a:buAutoNum type="arabicPeriod"/>
             </a:pPr>
             <a:r>
-              <a:rPr lang="en" dirty="0">
+              <a:rPr lang="fr-FR" dirty="0">
                 <a:ea typeface="Calibri"/>
                 <a:cs typeface="Calibri"/>
                 <a:sym typeface="Calibri"/>
               </a:rPr>
-              <a:t>Le navigateur demande la page qu’il </a:t>
-            </a:r>
-            <a:r>
-              <a:rPr lang="en" dirty="0" err="1">
-                <a:ea typeface="Calibri"/>
-                <a:cs typeface="Calibri"/>
-                <a:sym typeface="Calibri"/>
-              </a:rPr>
-              <a:t>veut</a:t>
-            </a:r>
-            <a:r>
-              <a:rPr lang="en" dirty="0">
-                <a:ea typeface="Calibri"/>
-                <a:cs typeface="Calibri"/>
-                <a:sym typeface="Calibri"/>
-              </a:rPr>
-              <a:t> lire (GET)</a:t>
+              <a:t>Le navigateur demande la page qu’il veut lire (GET)</a:t>
             </a:r>
           </a:p>
           <a:p>
@@ -7614,29 +7639,95 @@
               <a:buAutoNum type="arabicPeriod"/>
             </a:pPr>
             <a:r>
-              <a:rPr lang="en" dirty="0">
+              <a:rPr lang="fr-FR" dirty="0">
                 <a:ea typeface="Calibri"/>
                 <a:cs typeface="Calibri"/>
                 <a:sym typeface="Calibri"/>
               </a:rPr>
-              <a:t>Depuis cette page, il demande d’autres pages</a:t>
-            </a:r>
-            <a:endParaRPr dirty="0">
-              <a:ea typeface="Calibri"/>
-              <a:cs typeface="Calibri"/>
-              <a:sym typeface="Calibri"/>
-            </a:endParaRPr>
+              <a:t>Depuis cette page, il demande d’autres pages </a:t>
+            </a:r>
+            <a:br>
+              <a:rPr lang="fr-FR" dirty="0">
+                <a:ea typeface="Calibri"/>
+                <a:cs typeface="Calibri"/>
+                <a:sym typeface="Calibri"/>
+              </a:rPr>
+            </a:br>
+            <a:r>
+              <a:rPr lang="fr-FR" dirty="0">
+                <a:ea typeface="Calibri"/>
+                <a:cs typeface="Calibri"/>
+                <a:sym typeface="Calibri"/>
+              </a:rPr>
+              <a:t>(balises </a:t>
+            </a:r>
+            <a:r>
+              <a:rPr lang="fr-FR" dirty="0">
+                <a:latin typeface="Source Code Pro" panose="020B0509030403020204" pitchFamily="49" charset="0"/>
+                <a:ea typeface="Source Code Pro" panose="020B0509030403020204" pitchFamily="49" charset="0"/>
+                <a:cs typeface="Calibri"/>
+                <a:sym typeface="Calibri"/>
+              </a:rPr>
+              <a:t>&lt;a&gt;</a:t>
+            </a:r>
+            <a:r>
+              <a:rPr lang="fr-FR" dirty="0">
+                <a:latin typeface="+mj-lt"/>
+                <a:ea typeface="Source Code Pro" panose="020B0509030403020204" pitchFamily="49" charset="0"/>
+                <a:cs typeface="Calibri"/>
+                <a:sym typeface="Calibri"/>
+              </a:rPr>
+              <a:t>, code </a:t>
+            </a:r>
+            <a:r>
+              <a:rPr lang="fr-FR" dirty="0">
+                <a:ea typeface="Calibri"/>
+                <a:cs typeface="Calibri"/>
+                <a:sym typeface="Calibri"/>
+              </a:rPr>
+              <a:t>JavaScript)</a:t>
+            </a:r>
           </a:p>
         </p:txBody>
       </p:sp>
       <p:pic>
         <p:nvPicPr>
-          <p:cNvPr id="9" name="Google Shape;113;p21"/>
+          <p:cNvPr id="8" name="Image 7"/>
+          <p:cNvPicPr>
+            <a:picLocks noChangeAspect="1"/>
+          </p:cNvPicPr>
+          <p:nvPr/>
+        </p:nvPicPr>
+        <p:blipFill>
+          <a:blip r:embed="rId3"/>
+          <a:stretch>
+            <a:fillRect/>
+          </a:stretch>
+        </p:blipFill>
+        <p:spPr>
+          <a:xfrm>
+            <a:off x="6563970" y="4191603"/>
+            <a:ext cx="1158269" cy="1158269"/>
+          </a:xfrm>
+          <a:prstGeom prst="rect">
+            <a:avLst/>
+          </a:prstGeom>
+        </p:spPr>
+      </p:pic>
+      <p:pic>
+        <p:nvPicPr>
+          <p:cNvPr id="25" name="Google Shape;113;p21">
+            <a:extLst>
+              <a:ext uri="{FF2B5EF4-FFF2-40B4-BE49-F238E27FC236}">
+                <a16:creationId xmlns:a16="http://schemas.microsoft.com/office/drawing/2014/main" id="{6FD9C605-BEC4-6040-AA60-F8B219D3AD10}"/>
+              </a:ext>
+            </a:extLst>
+          </p:cNvPr>
           <p:cNvPicPr preferRelativeResize="0"/>
           <p:nvPr/>
         </p:nvPicPr>
         <p:blipFill>
-          <a:blip r:embed="rId3">
+          <a:blip r:embed="rId4">
             <a:alphaModFix/>
           </a:blip>
           <a:stretch>
@@ -7645,7 +7736,7 @@
         </p:blipFill>
         <p:spPr>
           <a:xfrm>
-            <a:off x="5169646" y="4191602"/>
+            <a:off x="4796857" y="4086636"/>
             <a:ext cx="1570286" cy="1509830"/>
           </a:xfrm>
           <a:prstGeom prst="rect">
@@ -7659,7 +7750,13 @@
       </p:pic>
       <p:cxnSp>
         <p:nvCxnSpPr>
-          <p:cNvPr id="10" name="Google Shape;117;p21"/>
+          <p:cNvPr id="26" name="Google Shape;117;p21">
+            <a:extLst>
+              <a:ext uri="{FF2B5EF4-FFF2-40B4-BE49-F238E27FC236}">
+                <a16:creationId xmlns:a16="http://schemas.microsoft.com/office/drawing/2014/main" id="{3C20B004-2EA5-0645-937D-D7D24F65D59F}"/>
+              </a:ext>
+            </a:extLst>
+          </p:cNvPr>
           <p:cNvCxnSpPr>
             <a:cxnSpLocks/>
           </p:cNvCxnSpPr>
@@ -7667,7 +7764,7 @@
         </p:nvCxnSpPr>
         <p:spPr>
           <a:xfrm>
-            <a:off x="2834392" y="4684158"/>
+            <a:off x="2461603" y="4579192"/>
             <a:ext cx="2536294" cy="0"/>
           </a:xfrm>
           <a:prstGeom prst="straightConnector1">
@@ -7690,10 +7787,10 @@
       </p:cxnSp>
       <p:pic>
         <p:nvPicPr>
-          <p:cNvPr id="11" name="Image 10">
+          <p:cNvPr id="27" name="Image 10">
             <a:extLst>
               <a:ext uri="{FF2B5EF4-FFF2-40B4-BE49-F238E27FC236}">
-                <a16:creationId xmlns:a16="http://schemas.microsoft.com/office/drawing/2014/main" id="{5B87F28A-5152-D743-821E-A2AA15F99530}"/>
+                <a16:creationId xmlns:a16="http://schemas.microsoft.com/office/drawing/2014/main" id="{D08EB2CE-5902-3C42-ADAF-5D0DEFC8900A}"/>
               </a:ext>
             </a:extLst>
           </p:cNvPr>
@@ -7703,14 +7800,14 @@
           <p:nvPr/>
         </p:nvPicPr>
         <p:blipFill>
-          <a:blip r:embed="rId4"/>
+          <a:blip r:embed="rId5"/>
           <a:stretch>
             <a:fillRect/>
           </a:stretch>
         </p:blipFill>
         <p:spPr>
           <a:xfrm>
-            <a:off x="829989" y="4561816"/>
+            <a:off x="457200" y="4456850"/>
             <a:ext cx="1929052" cy="1112420"/>
           </a:xfrm>
           <a:prstGeom prst="rect">
@@ -7720,10 +7817,10 @@
       </p:pic>
       <p:cxnSp>
         <p:nvCxnSpPr>
-          <p:cNvPr id="12" name="Google Shape;133;p22">
+          <p:cNvPr id="28" name="Google Shape;133;p22">
             <a:extLst>
               <a:ext uri="{FF2B5EF4-FFF2-40B4-BE49-F238E27FC236}">
-                <a16:creationId xmlns:a16="http://schemas.microsoft.com/office/drawing/2014/main" id="{11B00C56-9F68-CE48-A866-BCB4C0E0236D}"/>
+                <a16:creationId xmlns:a16="http://schemas.microsoft.com/office/drawing/2014/main" id="{B2FA6578-609E-5F43-903E-9D09652383CA}"/>
               </a:ext>
             </a:extLst>
           </p:cNvPr>
@@ -7734,7 +7831,7 @@
         </p:nvCxnSpPr>
         <p:spPr>
           <a:xfrm flipH="1">
-            <a:off x="2834392" y="5034761"/>
+            <a:off x="2461603" y="4929795"/>
             <a:ext cx="2487433" cy="0"/>
           </a:xfrm>
           <a:prstGeom prst="straightConnector1">
@@ -7757,13 +7854,19 @@
       </p:cxnSp>
       <p:sp>
         <p:nvSpPr>
-          <p:cNvPr id="13" name="Google Shape;116;p21"/>
+          <p:cNvPr id="29" name="Google Shape;116;p21">
+            <a:extLst>
+              <a:ext uri="{FF2B5EF4-FFF2-40B4-BE49-F238E27FC236}">
+                <a16:creationId xmlns:a16="http://schemas.microsoft.com/office/drawing/2014/main" id="{60D95972-EA00-9245-9D52-413D7820DE31}"/>
+              </a:ext>
+            </a:extLst>
+          </p:cNvPr>
           <p:cNvSpPr/>
           <p:nvPr/>
         </p:nvSpPr>
         <p:spPr>
           <a:xfrm>
-            <a:off x="3154033" y="4296569"/>
+            <a:off x="2781244" y="4191603"/>
             <a:ext cx="1818786" cy="1299897"/>
           </a:xfrm>
           <a:prstGeom prst="cloud">
@@ -7802,34 +7905,10 @@
       </p:sp>
       <p:pic>
         <p:nvPicPr>
-          <p:cNvPr id="8" name="Image 7"/>
-          <p:cNvPicPr>
-            <a:picLocks noChangeAspect="1"/>
-          </p:cNvPicPr>
-          <p:nvPr/>
-        </p:nvPicPr>
-        <p:blipFill>
-          <a:blip r:embed="rId5"/>
-          <a:stretch>
-            <a:fillRect/>
-          </a:stretch>
-        </p:blipFill>
-        <p:spPr>
-          <a:xfrm>
-            <a:off x="6804289" y="4367382"/>
-            <a:ext cx="1158269" cy="1158269"/>
-          </a:xfrm>
-          <a:prstGeom prst="rect">
-            <a:avLst/>
-          </a:prstGeom>
-        </p:spPr>
-      </p:pic>
-      <p:pic>
-        <p:nvPicPr>
-          <p:cNvPr id="19" name="Google Shape;134;p22">
+          <p:cNvPr id="30" name="Google Shape;134;p22">
             <a:extLst>
               <a:ext uri="{FF2B5EF4-FFF2-40B4-BE49-F238E27FC236}">
-                <a16:creationId xmlns:a16="http://schemas.microsoft.com/office/drawing/2014/main" id="{8A004551-2835-5346-A532-FBA95E1F21A1}"/>
+                <a16:creationId xmlns:a16="http://schemas.microsoft.com/office/drawing/2014/main" id="{9B20C819-A3A0-AE45-B96B-318D39E4DF7D}"/>
               </a:ext>
             </a:extLst>
           </p:cNvPr>
@@ -7846,7 +7925,7 @@
         </p:blipFill>
         <p:spPr>
           <a:xfrm>
-            <a:off x="3784104" y="5028768"/>
+            <a:off x="3411315" y="4923802"/>
             <a:ext cx="633900" cy="633900"/>
           </a:xfrm>
           <a:prstGeom prst="rect">
@@ -7860,14 +7939,20 @@
       </p:pic>
       <p:sp>
         <p:nvSpPr>
-          <p:cNvPr id="14" name="ZoneTexte 13"/>
+          <p:cNvPr id="31" name="ZoneTexte 13">
+            <a:extLst>
+              <a:ext uri="{FF2B5EF4-FFF2-40B4-BE49-F238E27FC236}">
+                <a16:creationId xmlns:a16="http://schemas.microsoft.com/office/drawing/2014/main" id="{D7FF2460-FBE6-0D4F-A743-DD38E86DBD7E}"/>
+              </a:ext>
+            </a:extLst>
+          </p:cNvPr>
           <p:cNvSpPr txBox="1"/>
           <p:nvPr/>
         </p:nvSpPr>
         <p:spPr>
           <a:xfrm>
-            <a:off x="3772961" y="4377150"/>
-            <a:ext cx="659155" cy="369332"/>
+            <a:off x="2990402" y="4299467"/>
+            <a:ext cx="1475725" cy="369332"/>
           </a:xfrm>
           <a:prstGeom prst="rect">
             <a:avLst/>
@@ -7882,8 +7967,110 @@
           <a:p>
             <a:r>
               <a:rPr lang="fr-FR" dirty="0"/>
-              <a:t>GET</a:t>
-            </a:r>
+              <a:t>GET / POST</a:t>
+            </a:r>
+          </a:p>
+        </p:txBody>
+      </p:sp>
+      <p:sp>
+        <p:nvSpPr>
+          <p:cNvPr id="34" name="Espace réservé de la date 3">
+            <a:extLst>
+              <a:ext uri="{FF2B5EF4-FFF2-40B4-BE49-F238E27FC236}">
+                <a16:creationId xmlns:a16="http://schemas.microsoft.com/office/drawing/2014/main" id="{7B04738B-FD10-AD42-AA9A-D9E5B188D73B}"/>
+              </a:ext>
+            </a:extLst>
+          </p:cNvPr>
+          <p:cNvSpPr>
+            <a:spLocks noGrp="1"/>
+          </p:cNvSpPr>
+          <p:nvPr>
+            <p:ph type="dt" sz="half" idx="10"/>
+          </p:nvPr>
+        </p:nvSpPr>
+        <p:spPr>
+          <a:xfrm>
+            <a:off x="901702" y="6654800"/>
+            <a:ext cx="2133600" cy="206375"/>
+          </a:xfrm>
+        </p:spPr>
+        <p:txBody>
+          <a:bodyPr/>
+          <a:lstStyle/>
+          <a:p>
+            <a:fld id="{BB2FA04C-1355-4CE6-8050-4BD994E23BD5}" type="datetime4">
+              <a:rPr lang="fr-FR" smtClean="0"/>
+              <a:t>5 juin 2019</a:t>
+            </a:fld>
+            <a:endParaRPr lang="fr-FR" dirty="0"/>
+          </a:p>
+        </p:txBody>
+      </p:sp>
+      <p:sp>
+        <p:nvSpPr>
+          <p:cNvPr id="35" name="Espace réservé du pied de page 4">
+            <a:extLst>
+              <a:ext uri="{FF2B5EF4-FFF2-40B4-BE49-F238E27FC236}">
+                <a16:creationId xmlns:a16="http://schemas.microsoft.com/office/drawing/2014/main" id="{0FE90E11-C8BB-D04C-B32C-3C0DABE25AF6}"/>
+              </a:ext>
+            </a:extLst>
+          </p:cNvPr>
+          <p:cNvSpPr>
+            <a:spLocks noGrp="1"/>
+          </p:cNvSpPr>
+          <p:nvPr>
+            <p:ph type="ftr" sz="quarter" idx="11"/>
+          </p:nvPr>
+        </p:nvSpPr>
+        <p:spPr>
+          <a:xfrm>
+            <a:off x="3039530" y="6654800"/>
+            <a:ext cx="5257800" cy="206375"/>
+          </a:xfrm>
+        </p:spPr>
+        <p:txBody>
+          <a:bodyPr/>
+          <a:lstStyle/>
+          <a:p>
+            <a:r>
+              <a:rPr lang="fr-FR"/>
+              <a:t>DIU NSI</a:t>
+            </a:r>
+          </a:p>
+        </p:txBody>
+      </p:sp>
+      <p:sp>
+        <p:nvSpPr>
+          <p:cNvPr id="36" name="Espace réservé du numéro de diapositive 5">
+            <a:extLst>
+              <a:ext uri="{FF2B5EF4-FFF2-40B4-BE49-F238E27FC236}">
+                <a16:creationId xmlns:a16="http://schemas.microsoft.com/office/drawing/2014/main" id="{2E42F879-8FF3-D741-BE58-8E6201169997}"/>
+              </a:ext>
+            </a:extLst>
+          </p:cNvPr>
+          <p:cNvSpPr>
+            <a:spLocks noGrp="1"/>
+          </p:cNvSpPr>
+          <p:nvPr>
+            <p:ph type="sldNum" sz="quarter" idx="12"/>
+          </p:nvPr>
+        </p:nvSpPr>
+        <p:spPr>
+          <a:xfrm>
+            <a:off x="0" y="6553200"/>
+            <a:ext cx="457200" cy="304800"/>
+          </a:xfrm>
+        </p:spPr>
+        <p:txBody>
+          <a:bodyPr/>
+          <a:lstStyle/>
+          <a:p>
+            <a:fld id="{DCE37727-CC04-7A46-938D-2CCFF056F773}" type="slidenum">
+              <a:rPr lang="fr-FR" smtClean="0"/>
+              <a:pPr/>
+              <a:t>6</a:t>
+            </a:fld>
+            <a:endParaRPr lang="fr-FR"/>
           </a:p>
         </p:txBody>
       </p:sp>
@@ -7972,47 +8159,23 @@
               </a:spcBef>
             </a:pPr>
             <a:r>
-              <a:rPr lang="en" dirty="0">
+              <a:rPr lang="fr-FR" dirty="0">
                 <a:ea typeface="Calibri"/>
                 <a:cs typeface="Calibri"/>
                 <a:sym typeface="Calibri"/>
               </a:rPr>
-              <a:t>Page </a:t>
-            </a:r>
-            <a:r>
-              <a:rPr lang="en" dirty="0" err="1">
+              <a:t>Page dynamique : </a:t>
+            </a:r>
+            <a:r>
+              <a:rPr lang="fr-FR" b="1" dirty="0">
                 <a:ea typeface="Calibri"/>
                 <a:cs typeface="Calibri"/>
                 <a:sym typeface="Calibri"/>
               </a:rPr>
-              <a:t>dynamique</a:t>
-            </a:r>
-            <a:r>
-              <a:rPr lang="en" dirty="0">
-                <a:ea typeface="Calibri"/>
-                <a:cs typeface="Calibri"/>
-                <a:sym typeface="Calibri"/>
-              </a:rPr>
-              <a:t> : </a:t>
-            </a:r>
-            <a:r>
-              <a:rPr lang="en" b="1" dirty="0" err="1">
-                <a:ea typeface="Calibri"/>
-                <a:cs typeface="Calibri"/>
-                <a:sym typeface="Calibri"/>
-              </a:rPr>
-              <a:t>contenu</a:t>
-            </a:r>
-            <a:r>
-              <a:rPr lang="en" b="1" dirty="0">
-                <a:ea typeface="Calibri"/>
-                <a:cs typeface="Calibri"/>
-                <a:sym typeface="Calibri"/>
-              </a:rPr>
-              <a:t> qui change</a:t>
-            </a:r>
-            <a:r>
-              <a:rPr lang="en" dirty="0">
+              <a:t>contenu qui change</a:t>
+            </a:r>
+            <a:r>
+              <a:rPr lang="fr-FR" dirty="0">
                 <a:ea typeface="Calibri"/>
                 <a:cs typeface="Calibri"/>
                 <a:sym typeface="Calibri"/>
@@ -8029,7 +8192,7 @@
               <a:buAutoNum type="arabicPeriod"/>
             </a:pPr>
             <a:r>
-              <a:rPr lang="en" dirty="0">
+              <a:rPr lang="fr-FR" dirty="0">
                 <a:ea typeface="Calibri"/>
                 <a:cs typeface="Calibri"/>
                 <a:sym typeface="Calibri"/>
@@ -8046,7 +8209,7 @@
               <a:buAutoNum type="arabicPeriod"/>
             </a:pPr>
             <a:r>
-              <a:rPr lang="en" dirty="0">
+              <a:rPr lang="fr-FR" dirty="0">
                 <a:ea typeface="Calibri"/>
                 <a:cs typeface="Calibri"/>
                 <a:sym typeface="Calibri"/>
@@ -8063,7 +8226,7 @@
               <a:buAutoNum type="arabicPeriod"/>
             </a:pPr>
             <a:r>
-              <a:rPr lang="en" dirty="0">
+              <a:rPr lang="fr-FR" dirty="0">
                 <a:ea typeface="Calibri"/>
                 <a:cs typeface="Calibri"/>
                 <a:sym typeface="Calibri"/>
@@ -8080,26 +8243,13 @@
               <a:buAutoNum type="arabicPeriod"/>
             </a:pPr>
             <a:r>
-              <a:rPr lang="en" dirty="0">
+              <a:rPr lang="fr-FR" dirty="0">
                 <a:ea typeface="Calibri"/>
                 <a:cs typeface="Calibri"/>
                 <a:sym typeface="Calibri"/>
               </a:rPr>
-              <a:t>Le serveur génère la page </a:t>
-            </a:r>
-            <a:r>
-              <a:rPr lang="en" dirty="0" err="1">
-                <a:ea typeface="Calibri"/>
-                <a:cs typeface="Calibri"/>
-                <a:sym typeface="Calibri"/>
-              </a:rPr>
-              <a:t>correspondante</a:t>
-            </a:r>
-            <a:endParaRPr dirty="0">
-              <a:ea typeface="Calibri"/>
-              <a:cs typeface="Calibri"/>
-              <a:sym typeface="Calibri"/>
-            </a:endParaRPr>
+              <a:t>Le serveur génère la page HTML correspondante</a:t>
+            </a:r>
           </a:p>
         </p:txBody>
       </p:sp>
@@ -8119,7 +8269,7 @@
         </p:blipFill>
         <p:spPr>
           <a:xfrm>
-            <a:off x="4706007" y="4369310"/>
+            <a:off x="4796857" y="4086636"/>
             <a:ext cx="1570286" cy="1509830"/>
           </a:xfrm>
           <a:prstGeom prst="rect">
@@ -8141,7 +8291,7 @@
         </p:nvCxnSpPr>
         <p:spPr>
           <a:xfrm>
-            <a:off x="2370753" y="4861866"/>
+            <a:off x="2461603" y="4579192"/>
             <a:ext cx="2536294" cy="0"/>
           </a:xfrm>
           <a:prstGeom prst="straightConnector1">
@@ -8184,7 +8334,7 @@
         </p:blipFill>
         <p:spPr>
           <a:xfrm>
-            <a:off x="366350" y="4739524"/>
+            <a:off x="457200" y="4456850"/>
             <a:ext cx="1929052" cy="1112420"/>
           </a:xfrm>
           <a:prstGeom prst="rect">
@@ -8208,7 +8358,7 @@
         </p:nvCxnSpPr>
         <p:spPr>
           <a:xfrm flipH="1">
-            <a:off x="2370753" y="5212469"/>
+            <a:off x="2461603" y="4929795"/>
             <a:ext cx="2487433" cy="0"/>
           </a:xfrm>
           <a:prstGeom prst="straightConnector1">
@@ -8237,7 +8387,7 @@
         </p:nvSpPr>
         <p:spPr>
           <a:xfrm>
-            <a:off x="2690394" y="4474277"/>
+            <a:off x="2781244" y="4191603"/>
             <a:ext cx="1818786" cy="1299897"/>
           </a:xfrm>
           <a:prstGeom prst="cloud">
@@ -8296,7 +8446,7 @@
         </p:blipFill>
         <p:spPr>
           <a:xfrm>
-            <a:off x="3320465" y="5206476"/>
+            <a:off x="3411315" y="4923802"/>
             <a:ext cx="633900" cy="633900"/>
           </a:xfrm>
           <a:prstGeom prst="rect">
@@ -8316,7 +8466,7 @@
         </p:nvSpPr>
         <p:spPr>
           <a:xfrm>
-            <a:off x="2899552" y="4539806"/>
+            <a:off x="2990402" y="4299467"/>
             <a:ext cx="1475725" cy="369332"/>
           </a:xfrm>
           <a:prstGeom prst="rect">
@@ -8360,7 +8510,7 @@
         </p:blipFill>
         <p:spPr bwMode="auto">
           <a:xfrm>
-            <a:off x="7268791" y="4539806"/>
+            <a:off x="7359641" y="4257132"/>
             <a:ext cx="1095219" cy="1082809"/>
           </a:xfrm>
           <a:prstGeom prst="rect">
@@ -8394,7 +8544,7 @@
         </p:blipFill>
         <p:spPr>
           <a:xfrm>
-            <a:off x="6156634" y="4596672"/>
+            <a:off x="6247484" y="4313998"/>
             <a:ext cx="1025943" cy="1025943"/>
           </a:xfrm>
           <a:prstGeom prst="rect">
@@ -8402,6 +8552,108 @@
           </a:prstGeom>
         </p:spPr>
       </p:pic>
+      <p:sp>
+        <p:nvSpPr>
+          <p:cNvPr id="15" name="Espace réservé de la date 3">
+            <a:extLst>
+              <a:ext uri="{FF2B5EF4-FFF2-40B4-BE49-F238E27FC236}">
+                <a16:creationId xmlns:a16="http://schemas.microsoft.com/office/drawing/2014/main" id="{704D21A2-40A8-5342-A3A5-74B00E25E343}"/>
+              </a:ext>
+            </a:extLst>
+          </p:cNvPr>
+          <p:cNvSpPr>
+            <a:spLocks noGrp="1"/>
+          </p:cNvSpPr>
+          <p:nvPr>
+            <p:ph type="dt" sz="half" idx="10"/>
+          </p:nvPr>
+        </p:nvSpPr>
+        <p:spPr>
+          <a:xfrm>
+            <a:off x="901702" y="6654800"/>
+            <a:ext cx="2133600" cy="206375"/>
+          </a:xfrm>
+        </p:spPr>
+        <p:txBody>
+          <a:bodyPr/>
+          <a:lstStyle/>
+          <a:p>
+            <a:fld id="{BB2FA04C-1355-4CE6-8050-4BD994E23BD5}" type="datetime4">
+              <a:rPr lang="fr-FR" smtClean="0"/>
+              <a:t>5 juin 2019</a:t>
+            </a:fld>
+            <a:endParaRPr lang="fr-FR" dirty="0"/>
+          </a:p>
+        </p:txBody>
+      </p:sp>
+      <p:sp>
+        <p:nvSpPr>
+          <p:cNvPr id="16" name="Espace réservé du pied de page 4">
+            <a:extLst>
+              <a:ext uri="{FF2B5EF4-FFF2-40B4-BE49-F238E27FC236}">
+                <a16:creationId xmlns:a16="http://schemas.microsoft.com/office/drawing/2014/main" id="{D4135517-1EFA-2E41-BF78-74B49BE2E6FF}"/>
+              </a:ext>
+            </a:extLst>
+          </p:cNvPr>
+          <p:cNvSpPr>
+            <a:spLocks noGrp="1"/>
+          </p:cNvSpPr>
+          <p:nvPr>
+            <p:ph type="ftr" sz="quarter" idx="11"/>
+          </p:nvPr>
+        </p:nvSpPr>
+        <p:spPr>
+          <a:xfrm>
+            <a:off x="3039530" y="6654800"/>
+            <a:ext cx="5257800" cy="206375"/>
+          </a:xfrm>
+        </p:spPr>
+        <p:txBody>
+          <a:bodyPr/>
+          <a:lstStyle/>
+          <a:p>
+            <a:r>
+              <a:rPr lang="fr-FR"/>
+              <a:t>DIU NSI</a:t>
+            </a:r>
+          </a:p>
+        </p:txBody>
+      </p:sp>
+      <p:sp>
+        <p:nvSpPr>
+          <p:cNvPr id="17" name="Espace réservé du numéro de diapositive 5">
+            <a:extLst>
+              <a:ext uri="{FF2B5EF4-FFF2-40B4-BE49-F238E27FC236}">
+                <a16:creationId xmlns:a16="http://schemas.microsoft.com/office/drawing/2014/main" id="{9CE77645-18D7-5147-A8DC-6A602D49739B}"/>
+              </a:ext>
+            </a:extLst>
+          </p:cNvPr>
+          <p:cNvSpPr>
+            <a:spLocks noGrp="1"/>
+          </p:cNvSpPr>
+          <p:nvPr>
+            <p:ph type="sldNum" sz="quarter" idx="12"/>
+          </p:nvPr>
+        </p:nvSpPr>
+        <p:spPr>
+          <a:xfrm>
+            <a:off x="0" y="6553200"/>
+            <a:ext cx="457200" cy="304800"/>
+          </a:xfrm>
+        </p:spPr>
+        <p:txBody>
+          <a:bodyPr/>
+          <a:lstStyle/>
+          <a:p>
+            <a:fld id="{DCE37727-CC04-7A46-938D-2CCFF056F773}" type="slidenum">
+              <a:rPr lang="fr-FR" smtClean="0"/>
+              <a:pPr/>
+              <a:t>7</a:t>
+            </a:fld>
+            <a:endParaRPr lang="fr-FR"/>
+          </a:p>
+        </p:txBody>
+      </p:sp>
     </p:spTree>
     <p:extLst>
       <p:ext uri="{BB962C8B-B14F-4D97-AF65-F5344CB8AC3E}">
@@ -8432,6 +8684,30 @@
           <a:chExt cx="0" cy="0"/>
         </a:xfrm>
       </p:grpSpPr>
+      <p:pic>
+        <p:nvPicPr>
+          <p:cNvPr id="4" name="Image 3"/>
+          <p:cNvPicPr>
+            <a:picLocks noChangeAspect="1"/>
+          </p:cNvPicPr>
+          <p:nvPr/>
+        </p:nvPicPr>
+        <p:blipFill>
+          <a:blip r:embed="rId3"/>
+          <a:stretch>
+            <a:fillRect/>
+          </a:stretch>
+        </p:blipFill>
+        <p:spPr>
+          <a:xfrm>
+            <a:off x="6848955" y="5240752"/>
+            <a:ext cx="1021372" cy="1021372"/>
+          </a:xfrm>
+          <a:prstGeom prst="rect">
+            <a:avLst/>
+          </a:prstGeom>
+        </p:spPr>
+      </p:pic>
       <p:sp>
         <p:nvSpPr>
           <p:cNvPr id="3" name="Titre 2">
@@ -8471,6 +8747,10 @@
           </p:nvPr>
         </p:nvSpPr>
         <p:spPr>
+          <a:xfrm>
+            <a:off x="457200" y="1261534"/>
+            <a:ext cx="8534400" cy="5139898"/>
+          </a:xfrm>
           <a:prstGeom prst="rect">
             <a:avLst/>
           </a:prstGeom>
@@ -8492,63 +8772,23 @@
                 <a:cs typeface="Calibri"/>
                 <a:sym typeface="Calibri"/>
               </a:rPr>
-              <a:t>A</a:t>
-            </a:r>
-            <a:r>
-              <a:rPr lang="en" dirty="0" err="1">
+              <a:t>Application web : </a:t>
+            </a:r>
+            <a:r>
+              <a:rPr lang="fr-FR" b="1" dirty="0">
                 <a:ea typeface="Calibri"/>
                 <a:cs typeface="Calibri"/>
                 <a:sym typeface="Calibri"/>
               </a:rPr>
-              <a:t>pplication</a:t>
-            </a:r>
-            <a:r>
-              <a:rPr lang="en" dirty="0">
+              <a:t>exécutée sur le navigateur</a:t>
+            </a:r>
+            <a:r>
+              <a:rPr lang="fr-FR" dirty="0">
                 <a:ea typeface="Calibri"/>
                 <a:cs typeface="Calibri"/>
                 <a:sym typeface="Calibri"/>
               </a:rPr>
-              <a:t> web : </a:t>
-            </a:r>
-            <a:r>
-              <a:rPr lang="en" b="1" dirty="0" err="1">
-                <a:ea typeface="Calibri"/>
-                <a:cs typeface="Calibri"/>
-                <a:sym typeface="Calibri"/>
-              </a:rPr>
-              <a:t>exécutée</a:t>
-            </a:r>
-            <a:r>
-              <a:rPr lang="en" b="1" dirty="0">
-                <a:ea typeface="Calibri"/>
-                <a:cs typeface="Calibri"/>
-                <a:sym typeface="Calibri"/>
-              </a:rPr>
-              <a:t> sur le navigateur</a:t>
-            </a:r>
-            <a:r>
-              <a:rPr lang="en" dirty="0">
-                <a:ea typeface="Calibri"/>
-                <a:cs typeface="Calibri"/>
-                <a:sym typeface="Calibri"/>
-              </a:rPr>
-              <a:t>, </a:t>
-            </a:r>
-            <a:r>
-              <a:rPr lang="en" dirty="0" err="1">
-                <a:ea typeface="Calibri"/>
-                <a:cs typeface="Calibri"/>
-                <a:sym typeface="Calibri"/>
-              </a:rPr>
-              <a:t>interagit</a:t>
-            </a:r>
-            <a:r>
-              <a:rPr lang="en" dirty="0">
-                <a:ea typeface="Calibri"/>
-                <a:cs typeface="Calibri"/>
-                <a:sym typeface="Calibri"/>
-              </a:rPr>
-              <a:t> avec le serveur</a:t>
+              <a:t>, interagit avec le serveur</a:t>
             </a:r>
           </a:p>
           <a:p>
@@ -8560,7 +8800,7 @@
               <a:buAutoNum type="arabicPeriod"/>
             </a:pPr>
             <a:r>
-              <a:rPr lang="en" dirty="0">
+              <a:rPr lang="fr-FR" dirty="0">
                 <a:ea typeface="Calibri"/>
                 <a:cs typeface="Calibri"/>
                 <a:sym typeface="Calibri"/>
@@ -8577,7 +8817,7 @@
               <a:buAutoNum type="arabicPeriod"/>
             </a:pPr>
             <a:r>
-              <a:rPr lang="en" dirty="0">
+              <a:rPr lang="fr-FR" dirty="0">
                 <a:ea typeface="Calibri"/>
                 <a:cs typeface="Calibri"/>
                 <a:sym typeface="Calibri"/>
@@ -8594,7 +8834,7 @@
               <a:buAutoNum type="arabicPeriod"/>
             </a:pPr>
             <a:r>
-              <a:rPr lang="en" dirty="0">
+              <a:rPr lang="fr-FR" dirty="0">
                 <a:ea typeface="Calibri"/>
                 <a:cs typeface="Calibri"/>
                 <a:sym typeface="Calibri"/>
@@ -8611,29 +8851,132 @@
               <a:buAutoNum type="arabicPeriod"/>
             </a:pPr>
             <a:r>
-              <a:rPr lang="en" dirty="0">
+              <a:rPr lang="fr-FR" dirty="0">
                 <a:ea typeface="Calibri"/>
                 <a:cs typeface="Calibri"/>
                 <a:sym typeface="Calibri"/>
               </a:rPr>
-              <a:t>L’application interagit avec le serveur qui renvoit des ressources (JSON, HTML, images, etc.)</a:t>
-            </a:r>
-            <a:endParaRPr dirty="0">
-              <a:ea typeface="Calibri"/>
-              <a:cs typeface="Calibri"/>
-              <a:sym typeface="Calibri"/>
-            </a:endParaRPr>
+              <a:t>L’application interagit avec le serveur qui renvoi des ressources (JSON, HTML, images, etc.)</a:t>
+            </a:r>
+          </a:p>
+        </p:txBody>
+      </p:sp>
+      <p:sp>
+        <p:nvSpPr>
+          <p:cNvPr id="16" name="Espace réservé de la date 3">
+            <a:extLst>
+              <a:ext uri="{FF2B5EF4-FFF2-40B4-BE49-F238E27FC236}">
+                <a16:creationId xmlns:a16="http://schemas.microsoft.com/office/drawing/2014/main" id="{85DB5E53-2306-A342-90BB-BD43A00D539E}"/>
+              </a:ext>
+            </a:extLst>
+          </p:cNvPr>
+          <p:cNvSpPr>
+            <a:spLocks noGrp="1"/>
+          </p:cNvSpPr>
+          <p:nvPr>
+            <p:ph type="dt" sz="half" idx="10"/>
+          </p:nvPr>
+        </p:nvSpPr>
+        <p:spPr>
+          <a:xfrm>
+            <a:off x="901702" y="6654800"/>
+            <a:ext cx="2133600" cy="206375"/>
+          </a:xfrm>
+        </p:spPr>
+        <p:txBody>
+          <a:bodyPr/>
+          <a:lstStyle/>
+          <a:p>
+            <a:fld id="{BB2FA04C-1355-4CE6-8050-4BD994E23BD5}" type="datetime4">
+              <a:rPr lang="fr-FR" smtClean="0"/>
+              <a:t>5 juin 2019</a:t>
+            </a:fld>
+            <a:endParaRPr lang="fr-FR" dirty="0"/>
+          </a:p>
+        </p:txBody>
+      </p:sp>
+      <p:sp>
+        <p:nvSpPr>
+          <p:cNvPr id="17" name="Espace réservé du pied de page 4">
+            <a:extLst>
+              <a:ext uri="{FF2B5EF4-FFF2-40B4-BE49-F238E27FC236}">
+                <a16:creationId xmlns:a16="http://schemas.microsoft.com/office/drawing/2014/main" id="{815F5B13-8167-B446-B71B-F51C00AFCE7E}"/>
+              </a:ext>
+            </a:extLst>
+          </p:cNvPr>
+          <p:cNvSpPr>
+            <a:spLocks noGrp="1"/>
+          </p:cNvSpPr>
+          <p:nvPr>
+            <p:ph type="ftr" sz="quarter" idx="11"/>
+          </p:nvPr>
+        </p:nvSpPr>
+        <p:spPr>
+          <a:xfrm>
+            <a:off x="3039530" y="6654800"/>
+            <a:ext cx="5257800" cy="206375"/>
+          </a:xfrm>
+        </p:spPr>
+        <p:txBody>
+          <a:bodyPr/>
+          <a:lstStyle/>
+          <a:p>
+            <a:r>
+              <a:rPr lang="fr-FR"/>
+              <a:t>DIU NSI</a:t>
+            </a:r>
+          </a:p>
+        </p:txBody>
+      </p:sp>
+      <p:sp>
+        <p:nvSpPr>
+          <p:cNvPr id="18" name="Espace réservé du numéro de diapositive 5">
+            <a:extLst>
+              <a:ext uri="{FF2B5EF4-FFF2-40B4-BE49-F238E27FC236}">
+                <a16:creationId xmlns:a16="http://schemas.microsoft.com/office/drawing/2014/main" id="{2715BE8D-4266-ED42-B897-EC095C7BBB00}"/>
+              </a:ext>
+            </a:extLst>
+          </p:cNvPr>
+          <p:cNvSpPr>
+            <a:spLocks noGrp="1"/>
+          </p:cNvSpPr>
+          <p:nvPr>
+            <p:ph type="sldNum" sz="quarter" idx="12"/>
+          </p:nvPr>
+        </p:nvSpPr>
+        <p:spPr>
+          <a:xfrm>
+            <a:off x="0" y="6553200"/>
+            <a:ext cx="457200" cy="304800"/>
+          </a:xfrm>
+        </p:spPr>
+        <p:txBody>
+          <a:bodyPr/>
+          <a:lstStyle/>
+          <a:p>
+            <a:fld id="{DCE37727-CC04-7A46-938D-2CCFF056F773}" type="slidenum">
+              <a:rPr lang="fr-FR" smtClean="0"/>
+              <a:pPr/>
+              <a:t>8</a:t>
+            </a:fld>
+            <a:endParaRPr lang="fr-FR" dirty="0"/>
           </a:p>
         </p:txBody>
       </p:sp>
       <p:pic>
         <p:nvPicPr>
-          <p:cNvPr id="9" name="Google Shape;113;p21"/>
+          <p:cNvPr id="23" name="Google Shape;113;p21">
+            <a:extLst>
+              <a:ext uri="{FF2B5EF4-FFF2-40B4-BE49-F238E27FC236}">
+                <a16:creationId xmlns:a16="http://schemas.microsoft.com/office/drawing/2014/main" id="{C0090C7A-07F8-9343-AACB-DB32A461D777}"/>
+              </a:ext>
+            </a:extLst>
+          </p:cNvPr>
           <p:cNvPicPr preferRelativeResize="0"/>
           <p:nvPr/>
         </p:nvPicPr>
         <p:blipFill>
-          <a:blip r:embed="rId3">
+          <a:blip r:embed="rId4">
             <a:alphaModFix/>
           </a:blip>
           <a:stretch>
@@ -8642,7 +8985,7 @@
         </p:blipFill>
         <p:spPr>
           <a:xfrm>
-            <a:off x="5259798" y="4678403"/>
+            <a:off x="4796857" y="4086636"/>
             <a:ext cx="1570286" cy="1509830"/>
           </a:xfrm>
           <a:prstGeom prst="rect">
@@ -8656,7 +8999,13 @@
       </p:pic>
       <p:cxnSp>
         <p:nvCxnSpPr>
-          <p:cNvPr id="10" name="Google Shape;117;p21"/>
+          <p:cNvPr id="24" name="Google Shape;117;p21">
+            <a:extLst>
+              <a:ext uri="{FF2B5EF4-FFF2-40B4-BE49-F238E27FC236}">
+                <a16:creationId xmlns:a16="http://schemas.microsoft.com/office/drawing/2014/main" id="{2009DA93-BAF0-2B4E-AA1B-D0300E63BD6E}"/>
+              </a:ext>
+            </a:extLst>
+          </p:cNvPr>
           <p:cNvCxnSpPr>
             <a:cxnSpLocks/>
           </p:cNvCxnSpPr>
@@ -8664,7 +9013,7 @@
         </p:nvCxnSpPr>
         <p:spPr>
           <a:xfrm>
-            <a:off x="2924544" y="5170959"/>
+            <a:off x="2461603" y="4579192"/>
             <a:ext cx="2536294" cy="0"/>
           </a:xfrm>
           <a:prstGeom prst="straightConnector1">
@@ -8687,10 +9036,10 @@
       </p:cxnSp>
       <p:pic>
         <p:nvPicPr>
-          <p:cNvPr id="11" name="Image 10">
+          <p:cNvPr id="25" name="Image 10">
             <a:extLst>
               <a:ext uri="{FF2B5EF4-FFF2-40B4-BE49-F238E27FC236}">
-                <a16:creationId xmlns:a16="http://schemas.microsoft.com/office/drawing/2014/main" id="{5B87F28A-5152-D743-821E-A2AA15F99530}"/>
+                <a16:creationId xmlns:a16="http://schemas.microsoft.com/office/drawing/2014/main" id="{CA3DDE2F-D277-5044-AB80-87C4981DF03D}"/>
               </a:ext>
             </a:extLst>
           </p:cNvPr>
@@ -8700,14 +9049,14 @@
           <p:nvPr/>
         </p:nvPicPr>
         <p:blipFill>
-          <a:blip r:embed="rId4"/>
+          <a:blip r:embed="rId5"/>
           <a:stretch>
             <a:fillRect/>
           </a:stretch>
         </p:blipFill>
         <p:spPr>
           <a:xfrm>
-            <a:off x="920141" y="5048617"/>
+            <a:off x="457200" y="4456850"/>
             <a:ext cx="1929052" cy="1112420"/>
           </a:xfrm>
           <a:prstGeom prst="rect">
@@ -8717,10 +9066,10 @@
       </p:pic>
       <p:cxnSp>
         <p:nvCxnSpPr>
-          <p:cNvPr id="12" name="Google Shape;133;p22">
+          <p:cNvPr id="26" name="Google Shape;133;p22">
             <a:extLst>
               <a:ext uri="{FF2B5EF4-FFF2-40B4-BE49-F238E27FC236}">
-                <a16:creationId xmlns:a16="http://schemas.microsoft.com/office/drawing/2014/main" id="{11B00C56-9F68-CE48-A866-BCB4C0E0236D}"/>
+                <a16:creationId xmlns:a16="http://schemas.microsoft.com/office/drawing/2014/main" id="{0E467C43-0234-C44D-842E-1E61FC0F55A1}"/>
               </a:ext>
             </a:extLst>
           </p:cNvPr>
@@ -8731,7 +9080,7 @@
         </p:nvCxnSpPr>
         <p:spPr>
           <a:xfrm flipH="1">
-            <a:off x="2924544" y="5521562"/>
+            <a:off x="2461603" y="4929795"/>
             <a:ext cx="2487433" cy="0"/>
           </a:xfrm>
           <a:prstGeom prst="straightConnector1">
@@ -8754,13 +9103,19 @@
       </p:cxnSp>
       <p:sp>
         <p:nvSpPr>
-          <p:cNvPr id="13" name="Google Shape;116;p21"/>
+          <p:cNvPr id="27" name="Google Shape;116;p21">
+            <a:extLst>
+              <a:ext uri="{FF2B5EF4-FFF2-40B4-BE49-F238E27FC236}">
+                <a16:creationId xmlns:a16="http://schemas.microsoft.com/office/drawing/2014/main" id="{E7E7CDCA-10F5-064E-BA24-85BC703673F8}"/>
+              </a:ext>
+            </a:extLst>
+          </p:cNvPr>
           <p:cNvSpPr/>
           <p:nvPr/>
         </p:nvSpPr>
         <p:spPr>
           <a:xfrm>
-            <a:off x="3244185" y="4783370"/>
+            <a:off x="2781244" y="4191603"/>
             <a:ext cx="1818786" cy="1299897"/>
           </a:xfrm>
           <a:prstGeom prst="cloud">
@@ -8799,10 +9154,10 @@
       </p:sp>
       <p:pic>
         <p:nvPicPr>
-          <p:cNvPr id="19" name="Google Shape;134;p22">
+          <p:cNvPr id="28" name="Google Shape;134;p22">
             <a:extLst>
               <a:ext uri="{FF2B5EF4-FFF2-40B4-BE49-F238E27FC236}">
-                <a16:creationId xmlns:a16="http://schemas.microsoft.com/office/drawing/2014/main" id="{8A004551-2835-5346-A532-FBA95E1F21A1}"/>
+                <a16:creationId xmlns:a16="http://schemas.microsoft.com/office/drawing/2014/main" id="{29D469E5-C606-CF48-847E-76BDC68DDB2A}"/>
               </a:ext>
             </a:extLst>
           </p:cNvPr>
@@ -8810,7 +9165,7 @@
           <p:nvPr/>
         </p:nvPicPr>
         <p:blipFill>
-          <a:blip r:embed="rId5">
+          <a:blip r:embed="rId6">
             <a:alphaModFix/>
           </a:blip>
           <a:stretch>
@@ -8819,7 +9174,7 @@
         </p:blipFill>
         <p:spPr>
           <a:xfrm>
-            <a:off x="4003796" y="5449367"/>
+            <a:off x="3411315" y="4923802"/>
             <a:ext cx="633900" cy="633900"/>
           </a:xfrm>
           <a:prstGeom prst="rect">
@@ -8833,13 +9188,19 @@
       </p:pic>
       <p:sp>
         <p:nvSpPr>
-          <p:cNvPr id="14" name="ZoneTexte 13"/>
+          <p:cNvPr id="29" name="ZoneTexte 13">
+            <a:extLst>
+              <a:ext uri="{FF2B5EF4-FFF2-40B4-BE49-F238E27FC236}">
+                <a16:creationId xmlns:a16="http://schemas.microsoft.com/office/drawing/2014/main" id="{F0F4FF03-2B6B-8E49-B85C-4AF68DC2E805}"/>
+              </a:ext>
+            </a:extLst>
+          </p:cNvPr>
           <p:cNvSpPr txBox="1"/>
           <p:nvPr/>
         </p:nvSpPr>
         <p:spPr>
           <a:xfrm>
-            <a:off x="3453343" y="4848899"/>
+            <a:off x="2990402" y="4299467"/>
             <a:ext cx="1475725" cy="369332"/>
           </a:xfrm>
           <a:prstGeom prst="rect">
@@ -8862,14 +9223,20 @@
       </p:sp>
       <p:pic>
         <p:nvPicPr>
-          <p:cNvPr id="1026" name="Picture 2" descr="Image associÃ©e"/>
+          <p:cNvPr id="30" name="Picture 2" descr="Image associÃ©e">
+            <a:extLst>
+              <a:ext uri="{FF2B5EF4-FFF2-40B4-BE49-F238E27FC236}">
+                <a16:creationId xmlns:a16="http://schemas.microsoft.com/office/drawing/2014/main" id="{A2D0C2E4-8513-7147-BB59-058570FAD97F}"/>
+              </a:ext>
+            </a:extLst>
+          </p:cNvPr>
           <p:cNvPicPr>
             <a:picLocks noChangeAspect="1" noChangeArrowheads="1"/>
           </p:cNvPicPr>
           <p:nvPr/>
         </p:nvPicPr>
         <p:blipFill>
-          <a:blip r:embed="rId6">
+          <a:blip r:embed="rId7">
             <a:extLst>
               <a:ext uri="{28A0092B-C50C-407E-A947-70E740481C1C}">
                 <a14:useLocalDpi xmlns:a14="http://schemas.microsoft.com/office/drawing/2010/main" val="0"/>
@@ -8883,7 +9250,7 @@
         </p:blipFill>
         <p:spPr bwMode="auto">
           <a:xfrm>
-            <a:off x="7058651" y="5218231"/>
+            <a:off x="7359641" y="4257132"/>
             <a:ext cx="1095219" cy="1082809"/>
           </a:xfrm>
           <a:prstGeom prst="rect">
@@ -8903,46 +9270,39 @@
       </p:pic>
       <p:pic>
         <p:nvPicPr>
-          <p:cNvPr id="4" name="Image 3"/>
+          <p:cNvPr id="31" name="Image 1">
+            <a:extLst>
+              <a:ext uri="{FF2B5EF4-FFF2-40B4-BE49-F238E27FC236}">
+                <a16:creationId xmlns:a16="http://schemas.microsoft.com/office/drawing/2014/main" id="{78A4C6F8-4D1B-604F-B654-F8451DC103D9}"/>
+              </a:ext>
+            </a:extLst>
+          </p:cNvPr>
           <p:cNvPicPr>
             <a:picLocks noChangeAspect="1"/>
           </p:cNvPicPr>
           <p:nvPr/>
         </p:nvPicPr>
         <p:blipFill>
-          <a:blip r:embed="rId7"/>
+          <a:blip r:embed="rId8">
+            <a:clrChange>
+              <a:clrFrom>
+                <a:srgbClr val="FFFFFF"/>
+              </a:clrFrom>
+              <a:clrTo>
+                <a:srgbClr val="FFFFFF">
+                  <a:alpha val="0"/>
+                </a:srgbClr>
+              </a:clrTo>
+            </a:clrChange>
+          </a:blip>
           <a:stretch>
             <a:fillRect/>
           </a:stretch>
         </p:blipFill>
         <p:spPr>
           <a:xfrm>
-            <a:off x="6983900" y="4127237"/>
-            <a:ext cx="1021372" cy="1021372"/>
-          </a:xfrm>
-          <a:prstGeom prst="rect">
-            <a:avLst/>
-          </a:prstGeom>
-        </p:spPr>
-      </p:pic>
-      <p:pic>
-        <p:nvPicPr>
-          <p:cNvPr id="15" name="Image 14"/>
-          <p:cNvPicPr>
-            <a:picLocks noChangeAspect="1"/>
-          </p:cNvPicPr>
-          <p:nvPr/>
-        </p:nvPicPr>
-        <p:blipFill>
-          <a:blip r:embed="rId7"/>
-          <a:stretch>
-            <a:fillRect/>
-          </a:stretch>
-        </p:blipFill>
-        <p:spPr>
-          <a:xfrm>
-            <a:off x="3263465" y="5453314"/>
-            <a:ext cx="737385" cy="737385"/>
+            <a:off x="6247484" y="4313998"/>
+            <a:ext cx="1025943" cy="1025943"/>
           </a:xfrm>
           <a:prstGeom prst="rect">
             <a:avLst/>
@@ -8958,19 +9318,77 @@
           <p:nvPr/>
         </p:nvPicPr>
         <p:blipFill>
-          <a:blip r:embed="rId8"/>
+          <a:blip r:embed="rId9">
+            <a:clrChange>
+              <a:clrFrom>
+                <a:srgbClr val="FFFFFF"/>
+              </a:clrFrom>
+              <a:clrTo>
+                <a:srgbClr val="FFFFFF">
+                  <a:alpha val="0"/>
+                </a:srgbClr>
+              </a:clrTo>
+            </a:clrChange>
+          </a:blip>
           <a:stretch>
             <a:fillRect/>
           </a:stretch>
         </p:blipFill>
         <p:spPr>
           <a:xfrm>
-            <a:off x="4615355" y="5472975"/>
+            <a:off x="4015711" y="5013333"/>
             <a:ext cx="627426" cy="627426"/>
           </a:xfrm>
           <a:prstGeom prst="rect">
             <a:avLst/>
           </a:prstGeom>
+          <a:effectLst>
+            <a:softEdge rad="31750"/>
+          </a:effectLst>
+        </p:spPr>
+      </p:pic>
+      <p:pic>
+        <p:nvPicPr>
+          <p:cNvPr id="32" name="Image 3">
+            <a:extLst>
+              <a:ext uri="{FF2B5EF4-FFF2-40B4-BE49-F238E27FC236}">
+                <a16:creationId xmlns:a16="http://schemas.microsoft.com/office/drawing/2014/main" id="{2799D9D7-0145-2546-87F7-D2F5D2436932}"/>
+              </a:ext>
+            </a:extLst>
+          </p:cNvPr>
+          <p:cNvPicPr>
+            <a:picLocks noChangeAspect="1"/>
+          </p:cNvPicPr>
+          <p:nvPr/>
+        </p:nvPicPr>
+        <p:blipFill>
+          <a:blip r:embed="rId3">
+            <a:clrChange>
+              <a:clrFrom>
+                <a:srgbClr val="FFFFFF"/>
+              </a:clrFrom>
+              <a:clrTo>
+                <a:srgbClr val="FFFFFF">
+                  <a:alpha val="0"/>
+                </a:srgbClr>
+              </a:clrTo>
+            </a:clrChange>
+          </a:blip>
+          <a:stretch>
+            <a:fillRect/>
+          </a:stretch>
+        </p:blipFill>
+        <p:spPr>
+          <a:xfrm>
+            <a:off x="2705893" y="5020025"/>
+            <a:ext cx="684514" cy="684514"/>
+          </a:xfrm>
+          <a:prstGeom prst="rect">
+            <a:avLst/>
+          </a:prstGeom>
+          <a:effectLst>
+            <a:softEdge rad="31750"/>
+          </a:effectLst>
         </p:spPr>
       </p:pic>
     </p:spTree>
@@ -9099,7 +9517,7 @@
           <a:p>
             <a:pPr>
               <a:spcBef>
-                <a:spcPts val="0"/>
+                <a:spcPts val="1200"/>
               </a:spcBef>
             </a:pPr>
             <a:r>
@@ -9144,12 +9562,11 @@
           <a:p>
             <a:pPr>
               <a:spcBef>
-                <a:spcPts val="0"/>
+                <a:spcPts val="1200"/>
               </a:spcBef>
             </a:pPr>
             <a:r>
               <a:rPr lang="fr-FR" dirty="0">
-                <a:ea typeface="Calibri"/>
                 <a:cs typeface="Calibri"/>
                 <a:sym typeface="Calibri"/>
               </a:rPr>
@@ -9213,6 +9630,20 @@
           <a:p>
             <a:pPr>
               <a:spcBef>
+                <a:spcPts val="1200"/>
+              </a:spcBef>
+            </a:pPr>
+            <a:r>
+              <a:rPr lang="fr-FR" dirty="0">
+                <a:cs typeface="Calibri"/>
+                <a:sym typeface="Calibri"/>
+              </a:rPr>
+              <a:t>Évolutions fortes</a:t>
+            </a:r>
+          </a:p>
+          <a:p>
+            <a:pPr lvl="1">
+              <a:spcBef>
                 <a:spcPts val="0"/>
               </a:spcBef>
             </a:pPr>
@@ -9222,7 +9653,23 @@
                 <a:cs typeface="Calibri"/>
                 <a:sym typeface="Calibri"/>
               </a:rPr>
-              <a:t>Evolutions fortes</a:t>
+              <a:t>Front : </a:t>
+            </a:r>
+            <a:r>
+              <a:rPr lang="fr-FR" i="1" dirty="0" err="1">
+                <a:ea typeface="Calibri"/>
+                <a:cs typeface="Calibri"/>
+                <a:sym typeface="Calibri"/>
+              </a:rPr>
+              <a:t>framework</a:t>
+            </a:r>
+            <a:r>
+              <a:rPr lang="fr-FR" dirty="0">
+                <a:ea typeface="Calibri"/>
+                <a:cs typeface="Calibri"/>
+                <a:sym typeface="Calibri"/>
+              </a:rPr>
+              <a:t> MVC dans le navigateur</a:t>
             </a:r>
           </a:p>
           <a:p>
@@ -9237,25 +9684,26 @@
                 <a:cs typeface="Calibri"/>
                 <a:sym typeface="Calibri"/>
               </a:rPr>
-              <a:t>Front : Framework MVC dans le navigateur</a:t>
-            </a:r>
-          </a:p>
-          <a:p>
-            <a:pPr lvl="1">
-              <a:spcBef>
-                <a:spcPts val="0"/>
-              </a:spcBef>
-            </a:pPr>
+              <a:t>Back : fortement répartis (</a:t>
+            </a:r>
+            <a:r>
+              <a:rPr lang="fr-FR" i="1" dirty="0">
+                <a:ea typeface="Calibri"/>
+                <a:cs typeface="Calibri"/>
+                <a:sym typeface="Calibri"/>
+              </a:rPr>
+              <a:t>cloud</a:t>
+            </a:r>
             <a:r>
               <a:rPr lang="fr-FR" dirty="0">
                 <a:ea typeface="Calibri"/>
                 <a:cs typeface="Calibri"/>
                 <a:sym typeface="Calibri"/>
               </a:rPr>
-              <a:t>Back : Fortement répartis et très dynamique (</a:t>
-            </a:r>
-            <a:r>
-              <a:rPr lang="fr-FR" dirty="0" err="1">
+              <a:t>) et très dynamique (</a:t>
+            </a:r>
+            <a:r>
+              <a:rPr lang="fr-FR" i="1" dirty="0" err="1">
                 <a:ea typeface="Calibri"/>
                 <a:cs typeface="Calibri"/>
                 <a:sym typeface="Calibri"/>
@@ -9295,6 +9743,108 @@
               <a:cs typeface="Calibri"/>
               <a:sym typeface="Calibri"/>
             </a:endParaRPr>
+          </a:p>
+        </p:txBody>
+      </p:sp>
+      <p:sp>
+        <p:nvSpPr>
+          <p:cNvPr id="5" name="Espace réservé de la date 3">
+            <a:extLst>
+              <a:ext uri="{FF2B5EF4-FFF2-40B4-BE49-F238E27FC236}">
+                <a16:creationId xmlns:a16="http://schemas.microsoft.com/office/drawing/2014/main" id="{8E488E86-E57B-DD4F-8EF0-C9E1A9C1BACE}"/>
+              </a:ext>
+            </a:extLst>
+          </p:cNvPr>
+          <p:cNvSpPr>
+            <a:spLocks noGrp="1"/>
+          </p:cNvSpPr>
+          <p:nvPr>
+            <p:ph type="dt" sz="half" idx="10"/>
+          </p:nvPr>
+        </p:nvSpPr>
+        <p:spPr>
+          <a:xfrm>
+            <a:off x="901702" y="6654800"/>
+            <a:ext cx="2133600" cy="206375"/>
+          </a:xfrm>
+        </p:spPr>
+        <p:txBody>
+          <a:bodyPr/>
+          <a:lstStyle/>
+          <a:p>
+            <a:fld id="{BB2FA04C-1355-4CE6-8050-4BD994E23BD5}" type="datetime4">
+              <a:rPr lang="fr-FR" smtClean="0"/>
+              <a:t>5 juin 2019</a:t>
+            </a:fld>
+            <a:endParaRPr lang="fr-FR" dirty="0"/>
+          </a:p>
+        </p:txBody>
+      </p:sp>
+      <p:sp>
+        <p:nvSpPr>
+          <p:cNvPr id="6" name="Espace réservé du pied de page 4">
+            <a:extLst>
+              <a:ext uri="{FF2B5EF4-FFF2-40B4-BE49-F238E27FC236}">
+                <a16:creationId xmlns:a16="http://schemas.microsoft.com/office/drawing/2014/main" id="{8FF601BA-DE97-0442-863C-1113443568E2}"/>
+              </a:ext>
+            </a:extLst>
+          </p:cNvPr>
+          <p:cNvSpPr>
+            <a:spLocks noGrp="1"/>
+          </p:cNvSpPr>
+          <p:nvPr>
+            <p:ph type="ftr" sz="quarter" idx="11"/>
+          </p:nvPr>
+        </p:nvSpPr>
+        <p:spPr>
+          <a:xfrm>
+            <a:off x="3039530" y="6654800"/>
+            <a:ext cx="5257800" cy="206375"/>
+          </a:xfrm>
+        </p:spPr>
+        <p:txBody>
+          <a:bodyPr/>
+          <a:lstStyle/>
+          <a:p>
+            <a:r>
+              <a:rPr lang="fr-FR"/>
+              <a:t>DIU NSI</a:t>
+            </a:r>
+          </a:p>
+        </p:txBody>
+      </p:sp>
+      <p:sp>
+        <p:nvSpPr>
+          <p:cNvPr id="7" name="Espace réservé du numéro de diapositive 5">
+            <a:extLst>
+              <a:ext uri="{FF2B5EF4-FFF2-40B4-BE49-F238E27FC236}">
+                <a16:creationId xmlns:a16="http://schemas.microsoft.com/office/drawing/2014/main" id="{887C37AF-3662-FC4A-840C-7C0F41A2471E}"/>
+              </a:ext>
+            </a:extLst>
+          </p:cNvPr>
+          <p:cNvSpPr>
+            <a:spLocks noGrp="1"/>
+          </p:cNvSpPr>
+          <p:nvPr>
+            <p:ph type="sldNum" sz="quarter" idx="12"/>
+          </p:nvPr>
+        </p:nvSpPr>
+        <p:spPr>
+          <a:xfrm>
+            <a:off x="0" y="6553200"/>
+            <a:ext cx="457200" cy="304800"/>
+          </a:xfrm>
+        </p:spPr>
+        <p:txBody>
+          <a:bodyPr/>
+          <a:lstStyle/>
+          <a:p>
+            <a:fld id="{DCE37727-CC04-7A46-938D-2CCFF056F773}" type="slidenum">
+              <a:rPr lang="fr-FR" smtClean="0"/>
+              <a:pPr/>
+              <a:t>9</a:t>
+            </a:fld>
+            <a:endParaRPr lang="fr-FR" dirty="0"/>
           </a:p>
         </p:txBody>
       </p:sp>

</xml_diff>

<commit_message>
Web : slide formulaire
</commit_message>
<xml_diff>
--- a/web/5-Developpement/developpement.pptx
+++ b/web/5-Developpement/developpement.pptx
@@ -5,10 +5,10 @@
     <p:sldMasterId id="2147483648" r:id="rId1"/>
   </p:sldMasterIdLst>
   <p:notesMasterIdLst>
-    <p:notesMasterId r:id="rId11"/>
+    <p:notesMasterId r:id="rId12"/>
   </p:notesMasterIdLst>
   <p:handoutMasterIdLst>
-    <p:handoutMasterId r:id="rId12"/>
+    <p:handoutMasterId r:id="rId13"/>
   </p:handoutMasterIdLst>
   <p:sldIdLst>
     <p:sldId id="257" r:id="rId2"/>
@@ -18,8 +18,9 @@
     <p:sldId id="311" r:id="rId6"/>
     <p:sldId id="264" r:id="rId7"/>
     <p:sldId id="312" r:id="rId8"/>
-    <p:sldId id="313" r:id="rId9"/>
-    <p:sldId id="314" r:id="rId10"/>
+    <p:sldId id="315" r:id="rId9"/>
+    <p:sldId id="313" r:id="rId10"/>
+    <p:sldId id="314" r:id="rId11"/>
   </p:sldIdLst>
   <p:sldSz cx="9144000" cy="6858000" type="screen4x3"/>
   <p:notesSz cx="6858000" cy="9144000"/>
@@ -6296,6 +6297,463 @@
 </p:sld>
 </file>
 
+<file path=ppt/slides/slide10.xml><?xml version="1.0" encoding="utf-8"?>
+<p:sld xmlns:a="http://schemas.openxmlformats.org/drawingml/2006/main" xmlns:r="http://schemas.openxmlformats.org/officeDocument/2006/relationships" xmlns:p="http://schemas.openxmlformats.org/presentationml/2006/main">
+  <p:cSld>
+    <p:spTree>
+      <p:nvGrpSpPr>
+        <p:cNvPr id="1" name="Shape 109"/>
+        <p:cNvGrpSpPr/>
+        <p:nvPr/>
+      </p:nvGrpSpPr>
+      <p:grpSpPr>
+        <a:xfrm>
+          <a:off x="0" y="0"/>
+          <a:ext cx="0" cy="0"/>
+          <a:chOff x="0" y="0"/>
+          <a:chExt cx="0" cy="0"/>
+        </a:xfrm>
+      </p:grpSpPr>
+      <p:sp>
+        <p:nvSpPr>
+          <p:cNvPr id="3" name="Titre 2">
+            <a:extLst>
+              <a:ext uri="{FF2B5EF4-FFF2-40B4-BE49-F238E27FC236}">
+                <a16:creationId xmlns:a16="http://schemas.microsoft.com/office/drawing/2014/main" id="{7921C1D7-9AAD-1441-9F6A-F19970F8918F}"/>
+              </a:ext>
+            </a:extLst>
+          </p:cNvPr>
+          <p:cNvSpPr>
+            <a:spLocks noGrp="1"/>
+          </p:cNvSpPr>
+          <p:nvPr>
+            <p:ph type="title"/>
+          </p:nvPr>
+        </p:nvSpPr>
+        <p:spPr/>
+        <p:txBody>
+          <a:bodyPr/>
+          <a:lstStyle/>
+          <a:p>
+            <a:r>
+              <a:rPr lang="fr-FR" dirty="0"/>
+              <a:t>Résumé</a:t>
+            </a:r>
+          </a:p>
+        </p:txBody>
+      </p:sp>
+      <p:sp>
+        <p:nvSpPr>
+          <p:cNvPr id="114" name="Google Shape;114;p21"/>
+          <p:cNvSpPr txBox="1">
+            <a:spLocks noGrp="1"/>
+          </p:cNvSpPr>
+          <p:nvPr>
+            <p:ph sz="half" idx="1"/>
+          </p:nvPr>
+        </p:nvSpPr>
+        <p:spPr>
+          <a:prstGeom prst="rect">
+            <a:avLst/>
+          </a:prstGeom>
+        </p:spPr>
+        <p:txBody>
+          <a:bodyPr spcFirstLastPara="1" wrap="square" lIns="91425" tIns="91425" rIns="91425" bIns="91425" anchor="t" anchorCtr="0">
+            <a:noAutofit/>
+          </a:bodyPr>
+          <a:lstStyle/>
+          <a:p>
+            <a:pPr>
+              <a:spcBef>
+                <a:spcPts val="0"/>
+              </a:spcBef>
+            </a:pPr>
+            <a:r>
+              <a:rPr lang="fr-FR" dirty="0">
+                <a:ea typeface="Calibri"/>
+                <a:cs typeface="Calibri"/>
+                <a:sym typeface="Calibri"/>
+              </a:rPr>
+              <a:t>Développement bicéphale (Front / Back)</a:t>
+            </a:r>
+          </a:p>
+          <a:p>
+            <a:pPr lvl="1">
+              <a:spcBef>
+                <a:spcPts val="0"/>
+              </a:spcBef>
+            </a:pPr>
+            <a:r>
+              <a:rPr lang="fr-FR" dirty="0">
+                <a:ea typeface="Calibri"/>
+                <a:cs typeface="Calibri"/>
+                <a:sym typeface="Calibri"/>
+              </a:rPr>
+              <a:t>Objectifs complémentaires</a:t>
+            </a:r>
+          </a:p>
+          <a:p>
+            <a:pPr lvl="1">
+              <a:spcBef>
+                <a:spcPts val="0"/>
+              </a:spcBef>
+            </a:pPr>
+            <a:r>
+              <a:rPr lang="fr-FR" dirty="0">
+                <a:ea typeface="Calibri"/>
+                <a:cs typeface="Calibri"/>
+                <a:sym typeface="Calibri"/>
+              </a:rPr>
+              <a:t>Compétences différentes</a:t>
+            </a:r>
+          </a:p>
+          <a:p>
+            <a:pPr>
+              <a:spcBef>
+                <a:spcPts val="1200"/>
+              </a:spcBef>
+            </a:pPr>
+            <a:r>
+              <a:rPr lang="fr-FR" dirty="0">
+                <a:ea typeface="Calibri"/>
+                <a:cs typeface="Calibri"/>
+                <a:sym typeface="Calibri"/>
+              </a:rPr>
+              <a:t>Équilibrage des traitements</a:t>
+            </a:r>
+          </a:p>
+          <a:p>
+            <a:pPr lvl="1">
+              <a:spcBef>
+                <a:spcPts val="0"/>
+              </a:spcBef>
+            </a:pPr>
+            <a:r>
+              <a:rPr lang="fr-FR" dirty="0">
+                <a:ea typeface="Calibri"/>
+                <a:cs typeface="Calibri"/>
+                <a:sym typeface="Calibri"/>
+              </a:rPr>
+              <a:t>Client lourd / Serveur léger</a:t>
+            </a:r>
+          </a:p>
+          <a:p>
+            <a:pPr lvl="1">
+              <a:spcBef>
+                <a:spcPts val="0"/>
+              </a:spcBef>
+            </a:pPr>
+            <a:r>
+              <a:rPr lang="fr-FR" dirty="0">
+                <a:ea typeface="Calibri"/>
+                <a:cs typeface="Calibri"/>
+                <a:sym typeface="Calibri"/>
+              </a:rPr>
+              <a:t>Client léger / Serveur lourd</a:t>
+            </a:r>
+          </a:p>
+          <a:p>
+            <a:pPr>
+              <a:spcBef>
+                <a:spcPts val="1200"/>
+              </a:spcBef>
+            </a:pPr>
+            <a:r>
+              <a:rPr lang="fr-FR" dirty="0">
+                <a:cs typeface="Calibri"/>
+                <a:sym typeface="Calibri"/>
+              </a:rPr>
+              <a:t>Tendance </a:t>
+            </a:r>
+          </a:p>
+          <a:p>
+            <a:pPr lvl="1">
+              <a:spcBef>
+                <a:spcPts val="0"/>
+              </a:spcBef>
+            </a:pPr>
+            <a:r>
+              <a:rPr lang="fr-FR" dirty="0" err="1">
+                <a:ea typeface="Calibri"/>
+                <a:cs typeface="Calibri"/>
+                <a:sym typeface="Calibri"/>
+              </a:rPr>
+              <a:t>WebApp</a:t>
+            </a:r>
+            <a:r>
+              <a:rPr lang="fr-FR" dirty="0">
+                <a:ea typeface="Calibri"/>
+                <a:cs typeface="Calibri"/>
+                <a:sym typeface="Calibri"/>
+              </a:rPr>
+              <a:t> (client lourd) / Service Web </a:t>
+            </a:r>
+          </a:p>
+          <a:p>
+            <a:pPr lvl="1">
+              <a:spcBef>
+                <a:spcPts val="0"/>
+              </a:spcBef>
+            </a:pPr>
+            <a:r>
+              <a:rPr lang="fr-FR" dirty="0">
+                <a:ea typeface="Calibri"/>
+                <a:cs typeface="Calibri"/>
+                <a:sym typeface="Calibri"/>
+              </a:rPr>
+              <a:t>Application </a:t>
+            </a:r>
+            <a:r>
+              <a:rPr lang="fr-FR" dirty="0" err="1">
+                <a:ea typeface="Calibri"/>
+                <a:cs typeface="Calibri"/>
+                <a:sym typeface="Calibri"/>
+              </a:rPr>
+              <a:t>SmartPhone</a:t>
+            </a:r>
+            <a:r>
+              <a:rPr lang="fr-FR" dirty="0">
+                <a:ea typeface="Calibri"/>
+                <a:cs typeface="Calibri"/>
+                <a:sym typeface="Calibri"/>
+              </a:rPr>
+              <a:t> (client lourd) / Service Web</a:t>
+            </a:r>
+          </a:p>
+          <a:p>
+            <a:pPr>
+              <a:spcBef>
+                <a:spcPts val="1200"/>
+              </a:spcBef>
+            </a:pPr>
+            <a:r>
+              <a:rPr lang="fr-FR" dirty="0">
+                <a:cs typeface="Calibri"/>
+                <a:sym typeface="Calibri"/>
+              </a:rPr>
+              <a:t>Évolutions fortes</a:t>
+            </a:r>
+          </a:p>
+          <a:p>
+            <a:pPr lvl="1">
+              <a:spcBef>
+                <a:spcPts val="0"/>
+              </a:spcBef>
+            </a:pPr>
+            <a:r>
+              <a:rPr lang="fr-FR" dirty="0">
+                <a:ea typeface="Calibri"/>
+                <a:cs typeface="Calibri"/>
+                <a:sym typeface="Calibri"/>
+              </a:rPr>
+              <a:t>Front : </a:t>
+            </a:r>
+            <a:r>
+              <a:rPr lang="fr-FR" i="1" dirty="0" err="1">
+                <a:ea typeface="Calibri"/>
+                <a:cs typeface="Calibri"/>
+                <a:sym typeface="Calibri"/>
+              </a:rPr>
+              <a:t>framework</a:t>
+            </a:r>
+            <a:r>
+              <a:rPr lang="fr-FR" dirty="0">
+                <a:ea typeface="Calibri"/>
+                <a:cs typeface="Calibri"/>
+                <a:sym typeface="Calibri"/>
+              </a:rPr>
+              <a:t> MVC dans le navigateur</a:t>
+            </a:r>
+          </a:p>
+          <a:p>
+            <a:pPr lvl="1">
+              <a:spcBef>
+                <a:spcPts val="0"/>
+              </a:spcBef>
+            </a:pPr>
+            <a:r>
+              <a:rPr lang="fr-FR" dirty="0">
+                <a:ea typeface="Calibri"/>
+                <a:cs typeface="Calibri"/>
+                <a:sym typeface="Calibri"/>
+              </a:rPr>
+              <a:t>Back : fortement répartis (</a:t>
+            </a:r>
+            <a:r>
+              <a:rPr lang="fr-FR" i="1" dirty="0">
+                <a:ea typeface="Calibri"/>
+                <a:cs typeface="Calibri"/>
+                <a:sym typeface="Calibri"/>
+              </a:rPr>
+              <a:t>cloud</a:t>
+            </a:r>
+            <a:r>
+              <a:rPr lang="fr-FR" dirty="0">
+                <a:ea typeface="Calibri"/>
+                <a:cs typeface="Calibri"/>
+                <a:sym typeface="Calibri"/>
+              </a:rPr>
+              <a:t>) et très dynamique (</a:t>
+            </a:r>
+            <a:r>
+              <a:rPr lang="fr-FR" i="1" dirty="0" err="1">
+                <a:ea typeface="Calibri"/>
+                <a:cs typeface="Calibri"/>
+                <a:sym typeface="Calibri"/>
+              </a:rPr>
+              <a:t>serverless</a:t>
+            </a:r>
+            <a:r>
+              <a:rPr lang="fr-FR" dirty="0">
+                <a:ea typeface="Calibri"/>
+                <a:cs typeface="Calibri"/>
+                <a:sym typeface="Calibri"/>
+              </a:rPr>
+              <a:t>)</a:t>
+            </a:r>
+          </a:p>
+          <a:p>
+            <a:pPr lvl="1">
+              <a:spcBef>
+                <a:spcPts val="0"/>
+              </a:spcBef>
+            </a:pPr>
+            <a:endParaRPr lang="fr-FR" dirty="0">
+              <a:ea typeface="Calibri"/>
+              <a:cs typeface="Calibri"/>
+              <a:sym typeface="Calibri"/>
+            </a:endParaRPr>
+          </a:p>
+          <a:p>
+            <a:pPr marL="457200" lvl="1" indent="0">
+              <a:spcBef>
+                <a:spcPts val="0"/>
+              </a:spcBef>
+              <a:buNone/>
+            </a:pPr>
+            <a:endParaRPr lang="fr-FR" dirty="0">
+              <a:ea typeface="Calibri"/>
+              <a:cs typeface="Calibri"/>
+              <a:sym typeface="Calibri"/>
+            </a:endParaRPr>
+          </a:p>
+        </p:txBody>
+      </p:sp>
+      <p:sp>
+        <p:nvSpPr>
+          <p:cNvPr id="5" name="Espace réservé de la date 3">
+            <a:extLst>
+              <a:ext uri="{FF2B5EF4-FFF2-40B4-BE49-F238E27FC236}">
+                <a16:creationId xmlns:a16="http://schemas.microsoft.com/office/drawing/2014/main" id="{8E488E86-E57B-DD4F-8EF0-C9E1A9C1BACE}"/>
+              </a:ext>
+            </a:extLst>
+          </p:cNvPr>
+          <p:cNvSpPr>
+            <a:spLocks noGrp="1"/>
+          </p:cNvSpPr>
+          <p:nvPr>
+            <p:ph type="dt" sz="half" idx="10"/>
+          </p:nvPr>
+        </p:nvSpPr>
+        <p:spPr>
+          <a:xfrm>
+            <a:off x="901702" y="6654800"/>
+            <a:ext cx="2133600" cy="206375"/>
+          </a:xfrm>
+        </p:spPr>
+        <p:txBody>
+          <a:bodyPr/>
+          <a:lstStyle/>
+          <a:p>
+            <a:fld id="{BB2FA04C-1355-4CE6-8050-4BD994E23BD5}" type="datetime4">
+              <a:rPr lang="fr-FR" smtClean="0"/>
+              <a:t>5 juin 2019</a:t>
+            </a:fld>
+            <a:endParaRPr lang="fr-FR" dirty="0"/>
+          </a:p>
+        </p:txBody>
+      </p:sp>
+      <p:sp>
+        <p:nvSpPr>
+          <p:cNvPr id="6" name="Espace réservé du pied de page 4">
+            <a:extLst>
+              <a:ext uri="{FF2B5EF4-FFF2-40B4-BE49-F238E27FC236}">
+                <a16:creationId xmlns:a16="http://schemas.microsoft.com/office/drawing/2014/main" id="{8FF601BA-DE97-0442-863C-1113443568E2}"/>
+              </a:ext>
+            </a:extLst>
+          </p:cNvPr>
+          <p:cNvSpPr>
+            <a:spLocks noGrp="1"/>
+          </p:cNvSpPr>
+          <p:nvPr>
+            <p:ph type="ftr" sz="quarter" idx="11"/>
+          </p:nvPr>
+        </p:nvSpPr>
+        <p:spPr>
+          <a:xfrm>
+            <a:off x="3039530" y="6654800"/>
+            <a:ext cx="5257800" cy="206375"/>
+          </a:xfrm>
+        </p:spPr>
+        <p:txBody>
+          <a:bodyPr/>
+          <a:lstStyle/>
+          <a:p>
+            <a:r>
+              <a:rPr lang="fr-FR"/>
+              <a:t>DIU NSI</a:t>
+            </a:r>
+          </a:p>
+        </p:txBody>
+      </p:sp>
+      <p:sp>
+        <p:nvSpPr>
+          <p:cNvPr id="7" name="Espace réservé du numéro de diapositive 5">
+            <a:extLst>
+              <a:ext uri="{FF2B5EF4-FFF2-40B4-BE49-F238E27FC236}">
+                <a16:creationId xmlns:a16="http://schemas.microsoft.com/office/drawing/2014/main" id="{887C37AF-3662-FC4A-840C-7C0F41A2471E}"/>
+              </a:ext>
+            </a:extLst>
+          </p:cNvPr>
+          <p:cNvSpPr>
+            <a:spLocks noGrp="1"/>
+          </p:cNvSpPr>
+          <p:nvPr>
+            <p:ph type="sldNum" sz="quarter" idx="12"/>
+          </p:nvPr>
+        </p:nvSpPr>
+        <p:spPr>
+          <a:xfrm>
+            <a:off x="0" y="6553200"/>
+            <a:ext cx="457200" cy="304800"/>
+          </a:xfrm>
+        </p:spPr>
+        <p:txBody>
+          <a:bodyPr/>
+          <a:lstStyle/>
+          <a:p>
+            <a:fld id="{DCE37727-CC04-7A46-938D-2CCFF056F773}" type="slidenum">
+              <a:rPr lang="fr-FR" smtClean="0"/>
+              <a:pPr/>
+              <a:t>10</a:t>
+            </a:fld>
+            <a:endParaRPr lang="fr-FR" dirty="0"/>
+          </a:p>
+        </p:txBody>
+      </p:sp>
+    </p:spTree>
+    <p:extLst>
+      <p:ext uri="{BB962C8B-B14F-4D97-AF65-F5344CB8AC3E}">
+        <p14:creationId xmlns:p14="http://schemas.microsoft.com/office/powerpoint/2010/main" val="2874215417"/>
+      </p:ext>
+    </p:extLst>
+  </p:cSld>
+  <p:clrMapOvr>
+    <a:masterClrMapping/>
+  </p:clrMapOvr>
+</p:sld>
+</file>
+
 <file path=ppt/slides/slide2.xml><?xml version="1.0" encoding="utf-8"?>
 <p:sld xmlns:a="http://schemas.openxmlformats.org/drawingml/2006/main" xmlns:r="http://schemas.openxmlformats.org/officeDocument/2006/relationships" xmlns:p="http://schemas.openxmlformats.org/presentationml/2006/main">
   <p:cSld>
@@ -8672,6 +9130,1681 @@
   <p:cSld>
     <p:spTree>
       <p:nvGrpSpPr>
+        <p:cNvPr id="1" name=""/>
+        <p:cNvGrpSpPr/>
+        <p:nvPr/>
+      </p:nvGrpSpPr>
+      <p:grpSpPr>
+        <a:xfrm>
+          <a:off x="0" y="0"/>
+          <a:ext cx="0" cy="0"/>
+          <a:chOff x="0" y="0"/>
+          <a:chExt cx="0" cy="0"/>
+        </a:xfrm>
+      </p:grpSpPr>
+      <p:sp>
+        <p:nvSpPr>
+          <p:cNvPr id="2" name="Title 1">
+            <a:extLst>
+              <a:ext uri="{FF2B5EF4-FFF2-40B4-BE49-F238E27FC236}">
+                <a16:creationId xmlns:a16="http://schemas.microsoft.com/office/drawing/2014/main" id="{D89946E9-70F0-2841-BC76-02FB9D044357}"/>
+              </a:ext>
+            </a:extLst>
+          </p:cNvPr>
+          <p:cNvSpPr>
+            <a:spLocks noGrp="1"/>
+          </p:cNvSpPr>
+          <p:nvPr>
+            <p:ph type="title"/>
+          </p:nvPr>
+        </p:nvSpPr>
+        <p:spPr/>
+        <p:txBody>
+          <a:bodyPr/>
+          <a:lstStyle/>
+          <a:p>
+            <a:r>
+              <a:rPr lang="fr-FR" dirty="0"/>
+              <a:t>Exemple – Formulaire</a:t>
+            </a:r>
+          </a:p>
+        </p:txBody>
+      </p:sp>
+      <p:sp>
+        <p:nvSpPr>
+          <p:cNvPr id="3" name="Date Placeholder 2">
+            <a:extLst>
+              <a:ext uri="{FF2B5EF4-FFF2-40B4-BE49-F238E27FC236}">
+                <a16:creationId xmlns:a16="http://schemas.microsoft.com/office/drawing/2014/main" id="{FC4E7CC2-A5D3-284B-BF7C-7C83C5085FF1}"/>
+              </a:ext>
+            </a:extLst>
+          </p:cNvPr>
+          <p:cNvSpPr>
+            <a:spLocks noGrp="1"/>
+          </p:cNvSpPr>
+          <p:nvPr>
+            <p:ph type="dt" sz="half" idx="10"/>
+          </p:nvPr>
+        </p:nvSpPr>
+        <p:spPr/>
+        <p:txBody>
+          <a:bodyPr/>
+          <a:lstStyle/>
+          <a:p>
+            <a:fld id="{BB2FA04C-1355-4CE6-8050-4BD994E23BD5}" type="datetime4">
+              <a:rPr lang="fr-FR" smtClean="0"/>
+              <a:t>5 juin 2019</a:t>
+            </a:fld>
+            <a:endParaRPr lang="fr-FR" dirty="0"/>
+          </a:p>
+        </p:txBody>
+      </p:sp>
+      <p:sp>
+        <p:nvSpPr>
+          <p:cNvPr id="4" name="Footer Placeholder 3">
+            <a:extLst>
+              <a:ext uri="{FF2B5EF4-FFF2-40B4-BE49-F238E27FC236}">
+                <a16:creationId xmlns:a16="http://schemas.microsoft.com/office/drawing/2014/main" id="{FBDCC55D-9155-4443-BFD3-D919A82CDACB}"/>
+              </a:ext>
+            </a:extLst>
+          </p:cNvPr>
+          <p:cNvSpPr>
+            <a:spLocks noGrp="1"/>
+          </p:cNvSpPr>
+          <p:nvPr>
+            <p:ph type="ftr" sz="quarter" idx="11"/>
+          </p:nvPr>
+        </p:nvSpPr>
+        <p:spPr/>
+        <p:txBody>
+          <a:bodyPr/>
+          <a:lstStyle/>
+          <a:p>
+            <a:r>
+              <a:rPr lang="fr-FR"/>
+              <a:t>DIU NSI</a:t>
+            </a:r>
+          </a:p>
+        </p:txBody>
+      </p:sp>
+      <p:sp>
+        <p:nvSpPr>
+          <p:cNvPr id="5" name="Slide Number Placeholder 4">
+            <a:extLst>
+              <a:ext uri="{FF2B5EF4-FFF2-40B4-BE49-F238E27FC236}">
+                <a16:creationId xmlns:a16="http://schemas.microsoft.com/office/drawing/2014/main" id="{650EEB80-4BD1-6A4A-9D71-1989ED45060C}"/>
+              </a:ext>
+            </a:extLst>
+          </p:cNvPr>
+          <p:cNvSpPr>
+            <a:spLocks noGrp="1"/>
+          </p:cNvSpPr>
+          <p:nvPr>
+            <p:ph type="sldNum" sz="quarter" idx="12"/>
+          </p:nvPr>
+        </p:nvSpPr>
+        <p:spPr/>
+        <p:txBody>
+          <a:bodyPr/>
+          <a:lstStyle/>
+          <a:p>
+            <a:fld id="{DCE37727-CC04-7A46-938D-2CCFF056F773}" type="slidenum">
+              <a:rPr lang="fr-FR" smtClean="0"/>
+              <a:pPr/>
+              <a:t>8</a:t>
+            </a:fld>
+            <a:endParaRPr lang="fr-FR"/>
+          </a:p>
+        </p:txBody>
+      </p:sp>
+      <p:graphicFrame>
+        <p:nvGraphicFramePr>
+          <p:cNvPr id="8" name="Table 7">
+            <a:extLst>
+              <a:ext uri="{FF2B5EF4-FFF2-40B4-BE49-F238E27FC236}">
+                <a16:creationId xmlns:a16="http://schemas.microsoft.com/office/drawing/2014/main" id="{4A8763EA-1798-C54D-83AC-3EC2FD0AD3E6}"/>
+              </a:ext>
+            </a:extLst>
+          </p:cNvPr>
+          <p:cNvGraphicFramePr>
+            <a:graphicFrameLocks noGrp="1"/>
+          </p:cNvGraphicFramePr>
+          <p:nvPr>
+            <p:extLst>
+              <p:ext uri="{D42A27DB-BD31-4B8C-83A1-F6EECF244321}">
+                <p14:modId xmlns:p14="http://schemas.microsoft.com/office/powerpoint/2010/main" val="2545683146"/>
+              </p:ext>
+            </p:extLst>
+          </p:nvPr>
+        </p:nvGraphicFramePr>
+        <p:xfrm>
+          <a:off x="740833" y="1333118"/>
+          <a:ext cx="7662333" cy="4902201"/>
+        </p:xfrm>
+        <a:graphic>
+          <a:graphicData uri="http://schemas.openxmlformats.org/drawingml/2006/table">
+            <a:tbl>
+              <a:tblPr firstRow="1" bandRow="1">
+                <a:tableStyleId>{2D5ABB26-0587-4C30-8999-92F81FD0307C}</a:tableStyleId>
+              </a:tblPr>
+              <a:tblGrid>
+                <a:gridCol w="1911832">
+                  <a:extLst>
+                    <a:ext uri="{9D8B030D-6E8A-4147-A177-3AD203B41FA5}">
+                      <a16:colId xmlns:a16="http://schemas.microsoft.com/office/drawing/2014/main" val="406355994"/>
+                    </a:ext>
+                  </a:extLst>
+                </a:gridCol>
+                <a:gridCol w="5750501">
+                  <a:extLst>
+                    <a:ext uri="{9D8B030D-6E8A-4147-A177-3AD203B41FA5}">
+                      <a16:colId xmlns:a16="http://schemas.microsoft.com/office/drawing/2014/main" val="1318678898"/>
+                    </a:ext>
+                  </a:extLst>
+                </a:gridCol>
+              </a:tblGrid>
+              <a:tr h="406401">
+                <a:tc>
+                  <a:txBody>
+                    <a:bodyPr/>
+                    <a:lstStyle/>
+                    <a:p>
+                      <a:pPr algn="ctr"/>
+                      <a:r>
+                        <a:rPr lang="fr-FR" b="1" dirty="0"/>
+                        <a:t>Front</a:t>
+                      </a:r>
+                    </a:p>
+                  </a:txBody>
+                  <a:tcPr anchor="ctr">
+                    <a:lnL w="12700" cap="flat" cmpd="sng" algn="ctr">
+                      <a:solidFill>
+                        <a:schemeClr val="tx1"/>
+                      </a:solidFill>
+                      <a:prstDash val="solid"/>
+                      <a:round/>
+                      <a:headEnd type="none" w="med" len="med"/>
+                      <a:tailEnd type="none" w="med" len="med"/>
+                    </a:lnL>
+                    <a:lnR w="12700" cap="flat" cmpd="sng" algn="ctr">
+                      <a:solidFill>
+                        <a:schemeClr val="tx1"/>
+                      </a:solidFill>
+                      <a:prstDash val="solid"/>
+                      <a:round/>
+                      <a:headEnd type="none" w="med" len="med"/>
+                      <a:tailEnd type="none" w="med" len="med"/>
+                    </a:lnR>
+                    <a:lnT w="12700" cap="flat" cmpd="sng" algn="ctr">
+                      <a:solidFill>
+                        <a:schemeClr val="tx1"/>
+                      </a:solidFill>
+                      <a:prstDash val="solid"/>
+                      <a:round/>
+                      <a:headEnd type="none" w="med" len="med"/>
+                      <a:tailEnd type="none" w="med" len="med"/>
+                    </a:lnT>
+                    <a:lnB w="12700" cap="flat" cmpd="sng" algn="ctr">
+                      <a:solidFill>
+                        <a:schemeClr val="tx1"/>
+                      </a:solidFill>
+                      <a:prstDash val="solid"/>
+                      <a:round/>
+                      <a:headEnd type="none" w="med" len="med"/>
+                      <a:tailEnd type="none" w="med" len="med"/>
+                    </a:lnB>
+                  </a:tcPr>
+                </a:tc>
+                <a:tc>
+                  <a:txBody>
+                    <a:bodyPr/>
+                    <a:lstStyle/>
+                    <a:p>
+                      <a:pPr algn="ctr"/>
+                      <a:r>
+                        <a:rPr lang="fr-FR" b="1" dirty="0"/>
+                        <a:t>Back</a:t>
+                      </a:r>
+                    </a:p>
+                  </a:txBody>
+                  <a:tcPr anchor="ctr">
+                    <a:lnL w="12700" cap="flat" cmpd="sng" algn="ctr">
+                      <a:solidFill>
+                        <a:schemeClr val="tx1"/>
+                      </a:solidFill>
+                      <a:prstDash val="solid"/>
+                      <a:round/>
+                      <a:headEnd type="none" w="med" len="med"/>
+                      <a:tailEnd type="none" w="med" len="med"/>
+                    </a:lnL>
+                    <a:lnR w="12700" cap="flat" cmpd="sng" algn="ctr">
+                      <a:solidFill>
+                        <a:schemeClr val="tx1"/>
+                      </a:solidFill>
+                      <a:prstDash val="solid"/>
+                      <a:round/>
+                      <a:headEnd type="none" w="med" len="med"/>
+                      <a:tailEnd type="none" w="med" len="med"/>
+                    </a:lnR>
+                    <a:lnT w="12700" cap="flat" cmpd="sng" algn="ctr">
+                      <a:solidFill>
+                        <a:schemeClr val="tx1"/>
+                      </a:solidFill>
+                      <a:prstDash val="solid"/>
+                      <a:round/>
+                      <a:headEnd type="none" w="med" len="med"/>
+                      <a:tailEnd type="none" w="med" len="med"/>
+                    </a:lnT>
+                    <a:lnB w="12700" cap="flat" cmpd="sng" algn="ctr">
+                      <a:solidFill>
+                        <a:schemeClr val="tx1"/>
+                      </a:solidFill>
+                      <a:prstDash val="solid"/>
+                      <a:round/>
+                      <a:headEnd type="none" w="med" len="med"/>
+                      <a:tailEnd type="none" w="med" len="med"/>
+                    </a:lnB>
+                  </a:tcPr>
+                </a:tc>
+                <a:extLst>
+                  <a:ext uri="{0D108BD9-81ED-4DB2-BD59-A6C34878D82A}">
+                    <a16:rowId xmlns:a16="http://schemas.microsoft.com/office/drawing/2014/main" val="316534365"/>
+                  </a:ext>
+                </a:extLst>
+              </a:tr>
+              <a:tr h="4495800">
+                <a:tc>
+                  <a:txBody>
+                    <a:bodyPr/>
+                    <a:lstStyle/>
+                    <a:p>
+                      <a:endParaRPr lang="fr-FR" dirty="0"/>
+                    </a:p>
+                  </a:txBody>
+                  <a:tcPr anchor="ctr">
+                    <a:lnL w="12700" cap="flat" cmpd="sng" algn="ctr">
+                      <a:solidFill>
+                        <a:schemeClr val="tx1"/>
+                      </a:solidFill>
+                      <a:prstDash val="solid"/>
+                      <a:round/>
+                      <a:headEnd type="none" w="med" len="med"/>
+                      <a:tailEnd type="none" w="med" len="med"/>
+                    </a:lnL>
+                    <a:lnR w="12700" cap="flat" cmpd="sng" algn="ctr">
+                      <a:solidFill>
+                        <a:schemeClr val="tx1"/>
+                      </a:solidFill>
+                      <a:prstDash val="solid"/>
+                      <a:round/>
+                      <a:headEnd type="none" w="med" len="med"/>
+                      <a:tailEnd type="none" w="med" len="med"/>
+                    </a:lnR>
+                    <a:lnT w="12700" cap="flat" cmpd="sng" algn="ctr">
+                      <a:solidFill>
+                        <a:schemeClr val="tx1"/>
+                      </a:solidFill>
+                      <a:prstDash val="solid"/>
+                      <a:round/>
+                      <a:headEnd type="none" w="med" len="med"/>
+                      <a:tailEnd type="none" w="med" len="med"/>
+                    </a:lnT>
+                    <a:lnB w="12700" cap="flat" cmpd="sng" algn="ctr">
+                      <a:solidFill>
+                        <a:schemeClr val="tx1"/>
+                      </a:solidFill>
+                      <a:prstDash val="solid"/>
+                      <a:round/>
+                      <a:headEnd type="none" w="med" len="med"/>
+                      <a:tailEnd type="none" w="med" len="med"/>
+                    </a:lnB>
+                  </a:tcPr>
+                </a:tc>
+                <a:tc>
+                  <a:txBody>
+                    <a:bodyPr/>
+                    <a:lstStyle/>
+                    <a:p>
+                      <a:endParaRPr lang="fr-FR" dirty="0"/>
+                    </a:p>
+                  </a:txBody>
+                  <a:tcPr anchor="ctr">
+                    <a:lnL w="12700" cap="flat" cmpd="sng" algn="ctr">
+                      <a:solidFill>
+                        <a:schemeClr val="tx1"/>
+                      </a:solidFill>
+                      <a:prstDash val="solid"/>
+                      <a:round/>
+                      <a:headEnd type="none" w="med" len="med"/>
+                      <a:tailEnd type="none" w="med" len="med"/>
+                    </a:lnL>
+                    <a:lnR w="12700" cap="flat" cmpd="sng" algn="ctr">
+                      <a:solidFill>
+                        <a:schemeClr val="tx1"/>
+                      </a:solidFill>
+                      <a:prstDash val="solid"/>
+                      <a:round/>
+                      <a:headEnd type="none" w="med" len="med"/>
+                      <a:tailEnd type="none" w="med" len="med"/>
+                    </a:lnR>
+                    <a:lnT w="12700" cap="flat" cmpd="sng" algn="ctr">
+                      <a:solidFill>
+                        <a:schemeClr val="tx1"/>
+                      </a:solidFill>
+                      <a:prstDash val="solid"/>
+                      <a:round/>
+                      <a:headEnd type="none" w="med" len="med"/>
+                      <a:tailEnd type="none" w="med" len="med"/>
+                    </a:lnT>
+                    <a:lnB w="12700" cap="flat" cmpd="sng" algn="ctr">
+                      <a:solidFill>
+                        <a:schemeClr val="tx1"/>
+                      </a:solidFill>
+                      <a:prstDash val="solid"/>
+                      <a:round/>
+                      <a:headEnd type="none" w="med" len="med"/>
+                      <a:tailEnd type="none" w="med" len="med"/>
+                    </a:lnB>
+                  </a:tcPr>
+                </a:tc>
+                <a:extLst>
+                  <a:ext uri="{0D108BD9-81ED-4DB2-BD59-A6C34878D82A}">
+                    <a16:rowId xmlns:a16="http://schemas.microsoft.com/office/drawing/2014/main" val="3679506044"/>
+                  </a:ext>
+                </a:extLst>
+              </a:tr>
+            </a:tbl>
+          </a:graphicData>
+        </a:graphic>
+      </p:graphicFrame>
+      <p:sp>
+        <p:nvSpPr>
+          <p:cNvPr id="10" name="Oval 9">
+            <a:extLst>
+              <a:ext uri="{FF2B5EF4-FFF2-40B4-BE49-F238E27FC236}">
+                <a16:creationId xmlns:a16="http://schemas.microsoft.com/office/drawing/2014/main" id="{6A39CEE3-4BF4-FA45-BF58-355F687BE4A0}"/>
+              </a:ext>
+            </a:extLst>
+          </p:cNvPr>
+          <p:cNvSpPr/>
+          <p:nvPr/>
+        </p:nvSpPr>
+        <p:spPr>
+          <a:xfrm>
+            <a:off x="1460500" y="2051392"/>
+            <a:ext cx="516467" cy="516467"/>
+          </a:xfrm>
+          <a:prstGeom prst="ellipse">
+            <a:avLst/>
+          </a:prstGeom>
+          <a:solidFill>
+            <a:schemeClr val="accent5"/>
+          </a:solidFill>
+          <a:ln w="19050">
+            <a:solidFill>
+              <a:schemeClr val="tx1"/>
+            </a:solidFill>
+          </a:ln>
+        </p:spPr>
+        <p:style>
+          <a:lnRef idx="2">
+            <a:schemeClr val="accent1">
+              <a:shade val="50000"/>
+            </a:schemeClr>
+          </a:lnRef>
+          <a:fillRef idx="1">
+            <a:schemeClr val="accent1"/>
+          </a:fillRef>
+          <a:effectRef idx="0">
+            <a:schemeClr val="accent1"/>
+          </a:effectRef>
+          <a:fontRef idx="minor">
+            <a:schemeClr val="lt1"/>
+          </a:fontRef>
+        </p:style>
+        <p:txBody>
+          <a:bodyPr rtlCol="0" anchor="ctr"/>
+          <a:lstStyle/>
+          <a:p>
+            <a:pPr algn="ctr"/>
+            <a:endParaRPr lang="fr-FR"/>
+          </a:p>
+        </p:txBody>
+      </p:sp>
+      <p:sp>
+        <p:nvSpPr>
+          <p:cNvPr id="11" name="TextBox 10">
+            <a:extLst>
+              <a:ext uri="{FF2B5EF4-FFF2-40B4-BE49-F238E27FC236}">
+                <a16:creationId xmlns:a16="http://schemas.microsoft.com/office/drawing/2014/main" id="{D07007BB-D314-5A42-A354-1EC52E29E150}"/>
+              </a:ext>
+            </a:extLst>
+          </p:cNvPr>
+          <p:cNvSpPr txBox="1"/>
+          <p:nvPr/>
+        </p:nvSpPr>
+        <p:spPr>
+          <a:xfrm>
+            <a:off x="862310" y="2551053"/>
+            <a:ext cx="1725152" cy="738664"/>
+          </a:xfrm>
+          <a:prstGeom prst="rect">
+            <a:avLst/>
+          </a:prstGeom>
+          <a:noFill/>
+        </p:spPr>
+        <p:txBody>
+          <a:bodyPr wrap="none" rtlCol="0">
+            <a:spAutoFit/>
+          </a:bodyPr>
+          <a:lstStyle/>
+          <a:p>
+            <a:pPr algn="ctr"/>
+            <a:r>
+              <a:rPr lang="fr-FR" sz="1400" dirty="0"/>
+              <a:t>Le navigateur </a:t>
+            </a:r>
+          </a:p>
+          <a:p>
+            <a:pPr algn="ctr"/>
+            <a:r>
+              <a:rPr lang="fr-FR" sz="1400" dirty="0"/>
+              <a:t>demande une page</a:t>
+            </a:r>
+          </a:p>
+          <a:p>
+            <a:pPr algn="ctr"/>
+            <a:r>
+              <a:rPr lang="fr-FR" sz="1400" dirty="0"/>
+              <a:t>avec un formulaire</a:t>
+            </a:r>
+          </a:p>
+        </p:txBody>
+      </p:sp>
+      <p:cxnSp>
+        <p:nvCxnSpPr>
+          <p:cNvPr id="13" name="Straight Arrow Connector 12">
+            <a:extLst>
+              <a:ext uri="{FF2B5EF4-FFF2-40B4-BE49-F238E27FC236}">
+                <a16:creationId xmlns:a16="http://schemas.microsoft.com/office/drawing/2014/main" id="{1BFC00F3-E8F8-B14D-893B-07912143FA7E}"/>
+              </a:ext>
+            </a:extLst>
+          </p:cNvPr>
+          <p:cNvCxnSpPr>
+            <a:cxnSpLocks/>
+          </p:cNvCxnSpPr>
+          <p:nvPr/>
+        </p:nvCxnSpPr>
+        <p:spPr>
+          <a:xfrm flipV="1">
+            <a:off x="2036236" y="2309625"/>
+            <a:ext cx="2514598" cy="1"/>
+          </a:xfrm>
+          <a:prstGeom prst="straightConnector1">
+            <a:avLst/>
+          </a:prstGeom>
+          <a:noFill/>
+          <a:ln w="38100" cap="flat" cmpd="sng">
+            <a:solidFill>
+              <a:schemeClr val="tx1">
+                <a:lumMod val="50000"/>
+                <a:lumOff val="50000"/>
+              </a:schemeClr>
+            </a:solidFill>
+            <a:prstDash val="solid"/>
+            <a:round/>
+            <a:headEnd type="none" w="med" len="med"/>
+            <a:tailEnd type="triangle" w="med" len="med"/>
+          </a:ln>
+        </p:spPr>
+      </p:cxnSp>
+      <p:sp>
+        <p:nvSpPr>
+          <p:cNvPr id="15" name="ZoneTexte 13">
+            <a:extLst>
+              <a:ext uri="{FF2B5EF4-FFF2-40B4-BE49-F238E27FC236}">
+                <a16:creationId xmlns:a16="http://schemas.microsoft.com/office/drawing/2014/main" id="{11257B5A-A3EC-564E-95BB-BD401F6ED019}"/>
+              </a:ext>
+            </a:extLst>
+          </p:cNvPr>
+          <p:cNvSpPr txBox="1"/>
+          <p:nvPr/>
+        </p:nvSpPr>
+        <p:spPr>
+          <a:xfrm>
+            <a:off x="3185043" y="1986318"/>
+            <a:ext cx="606256" cy="338554"/>
+          </a:xfrm>
+          <a:prstGeom prst="rect">
+            <a:avLst/>
+          </a:prstGeom>
+          <a:noFill/>
+        </p:spPr>
+        <p:txBody>
+          <a:bodyPr wrap="none" rtlCol="0">
+            <a:spAutoFit/>
+          </a:bodyPr>
+          <a:lstStyle/>
+          <a:p>
+            <a:r>
+              <a:rPr lang="fr-FR" sz="1600" dirty="0"/>
+              <a:t>GET</a:t>
+            </a:r>
+          </a:p>
+        </p:txBody>
+      </p:sp>
+      <p:sp>
+        <p:nvSpPr>
+          <p:cNvPr id="16" name="Rounded Rectangle 15">
+            <a:extLst>
+              <a:ext uri="{FF2B5EF4-FFF2-40B4-BE49-F238E27FC236}">
+                <a16:creationId xmlns:a16="http://schemas.microsoft.com/office/drawing/2014/main" id="{C79B642B-C6E8-1543-B979-91EA7043EC69}"/>
+              </a:ext>
+            </a:extLst>
+          </p:cNvPr>
+          <p:cNvSpPr/>
+          <p:nvPr/>
+        </p:nvSpPr>
+        <p:spPr>
+          <a:xfrm>
+            <a:off x="4610102" y="1876406"/>
+            <a:ext cx="1591731" cy="870449"/>
+          </a:xfrm>
+          <a:prstGeom prst="roundRect">
+            <a:avLst/>
+          </a:prstGeom>
+          <a:ln w="19050"/>
+        </p:spPr>
+        <p:style>
+          <a:lnRef idx="2">
+            <a:schemeClr val="dk1"/>
+          </a:lnRef>
+          <a:fillRef idx="1">
+            <a:schemeClr val="lt1"/>
+          </a:fillRef>
+          <a:effectRef idx="0">
+            <a:schemeClr val="dk1"/>
+          </a:effectRef>
+          <a:fontRef idx="minor">
+            <a:schemeClr val="dk1"/>
+          </a:fontRef>
+        </p:style>
+        <p:txBody>
+          <a:bodyPr rtlCol="0" anchor="ctr"/>
+          <a:lstStyle/>
+          <a:p>
+            <a:pPr algn="ctr"/>
+            <a:r>
+              <a:rPr lang="fr-FR" sz="1400" dirty="0"/>
+              <a:t>Création</a:t>
+            </a:r>
+            <a:br>
+              <a:rPr lang="fr-FR" sz="1400" dirty="0"/>
+            </a:br>
+            <a:r>
+              <a:rPr lang="fr-FR" sz="1400" dirty="0"/>
+              <a:t>d’un formulaire vide par défaut</a:t>
+            </a:r>
+          </a:p>
+        </p:txBody>
+      </p:sp>
+      <p:sp>
+        <p:nvSpPr>
+          <p:cNvPr id="17" name="Rounded Rectangle 16">
+            <a:extLst>
+              <a:ext uri="{FF2B5EF4-FFF2-40B4-BE49-F238E27FC236}">
+                <a16:creationId xmlns:a16="http://schemas.microsoft.com/office/drawing/2014/main" id="{9B455D11-BB5B-C940-AE8B-E04C4F441834}"/>
+              </a:ext>
+            </a:extLst>
+          </p:cNvPr>
+          <p:cNvSpPr/>
+          <p:nvPr/>
+        </p:nvSpPr>
+        <p:spPr>
+          <a:xfrm>
+            <a:off x="828133" y="3824121"/>
+            <a:ext cx="1725152" cy="653981"/>
+          </a:xfrm>
+          <a:prstGeom prst="roundRect">
+            <a:avLst/>
+          </a:prstGeom>
+          <a:ln w="19050"/>
+        </p:spPr>
+        <p:style>
+          <a:lnRef idx="2">
+            <a:schemeClr val="dk1"/>
+          </a:lnRef>
+          <a:fillRef idx="1">
+            <a:schemeClr val="lt1"/>
+          </a:fillRef>
+          <a:effectRef idx="0">
+            <a:schemeClr val="dk1"/>
+          </a:effectRef>
+          <a:fontRef idx="minor">
+            <a:schemeClr val="dk1"/>
+          </a:fontRef>
+        </p:style>
+        <p:txBody>
+          <a:bodyPr rtlCol="0" anchor="ctr"/>
+          <a:lstStyle/>
+          <a:p>
+            <a:pPr algn="ctr"/>
+            <a:r>
+              <a:rPr lang="fr-FR" sz="1400" dirty="0"/>
+              <a:t>L’utilisateur rempli </a:t>
+            </a:r>
+            <a:br>
+              <a:rPr lang="fr-FR" sz="1400" dirty="0"/>
+            </a:br>
+            <a:r>
+              <a:rPr lang="fr-FR" sz="1400" dirty="0"/>
+              <a:t>le formulaire</a:t>
+            </a:r>
+          </a:p>
+        </p:txBody>
+      </p:sp>
+      <p:cxnSp>
+        <p:nvCxnSpPr>
+          <p:cNvPr id="18" name="Straight Arrow Connector 17">
+            <a:extLst>
+              <a:ext uri="{FF2B5EF4-FFF2-40B4-BE49-F238E27FC236}">
+                <a16:creationId xmlns:a16="http://schemas.microsoft.com/office/drawing/2014/main" id="{C82A932E-27EB-1D4A-BB69-35044EC21282}"/>
+              </a:ext>
+            </a:extLst>
+          </p:cNvPr>
+          <p:cNvCxnSpPr>
+            <a:cxnSpLocks/>
+          </p:cNvCxnSpPr>
+          <p:nvPr/>
+        </p:nvCxnSpPr>
+        <p:spPr>
+          <a:xfrm flipV="1">
+            <a:off x="2603503" y="4146553"/>
+            <a:ext cx="1751162" cy="1"/>
+          </a:xfrm>
+          <a:prstGeom prst="straightConnector1">
+            <a:avLst/>
+          </a:prstGeom>
+          <a:noFill/>
+          <a:ln w="38100" cap="flat" cmpd="sng">
+            <a:solidFill>
+              <a:schemeClr val="tx1">
+                <a:lumMod val="50000"/>
+                <a:lumOff val="50000"/>
+              </a:schemeClr>
+            </a:solidFill>
+            <a:prstDash val="solid"/>
+            <a:round/>
+            <a:headEnd type="none" w="med" len="med"/>
+            <a:tailEnd type="triangle" w="med" len="med"/>
+          </a:ln>
+        </p:spPr>
+      </p:cxnSp>
+      <p:sp>
+        <p:nvSpPr>
+          <p:cNvPr id="20" name="ZoneTexte 13">
+            <a:extLst>
+              <a:ext uri="{FF2B5EF4-FFF2-40B4-BE49-F238E27FC236}">
+                <a16:creationId xmlns:a16="http://schemas.microsoft.com/office/drawing/2014/main" id="{903A7483-DF4C-2343-A24F-447443C92632}"/>
+              </a:ext>
+            </a:extLst>
+          </p:cNvPr>
+          <p:cNvSpPr txBox="1"/>
+          <p:nvPr/>
+        </p:nvSpPr>
+        <p:spPr>
+          <a:xfrm>
+            <a:off x="2712127" y="3810879"/>
+            <a:ext cx="1577676" cy="892552"/>
+          </a:xfrm>
+          <a:prstGeom prst="rect">
+            <a:avLst/>
+          </a:prstGeom>
+          <a:noFill/>
+        </p:spPr>
+        <p:txBody>
+          <a:bodyPr wrap="none" rtlCol="0">
+            <a:spAutoFit/>
+          </a:bodyPr>
+          <a:lstStyle/>
+          <a:p>
+            <a:pPr algn="ctr"/>
+            <a:r>
+              <a:rPr lang="fr-FR" sz="1400" dirty="0"/>
+              <a:t>POST</a:t>
+            </a:r>
+          </a:p>
+          <a:p>
+            <a:pPr algn="ctr">
+              <a:spcBef>
+                <a:spcPts val="1200"/>
+              </a:spcBef>
+            </a:pPr>
+            <a:r>
+              <a:rPr lang="fr-FR" sz="1400" dirty="0"/>
+              <a:t>avec les données</a:t>
+            </a:r>
+            <a:br>
+              <a:rPr lang="fr-FR" sz="1400" dirty="0"/>
+            </a:br>
+            <a:r>
+              <a:rPr lang="fr-FR" sz="1400" dirty="0"/>
+              <a:t>du formulaire</a:t>
+            </a:r>
+          </a:p>
+        </p:txBody>
+      </p:sp>
+      <p:cxnSp>
+        <p:nvCxnSpPr>
+          <p:cNvPr id="22" name="Elbow Connector 21">
+            <a:extLst>
+              <a:ext uri="{FF2B5EF4-FFF2-40B4-BE49-F238E27FC236}">
+                <a16:creationId xmlns:a16="http://schemas.microsoft.com/office/drawing/2014/main" id="{A244F3EF-5EEF-E04A-B8DB-E6FC11A7C776}"/>
+              </a:ext>
+            </a:extLst>
+          </p:cNvPr>
+          <p:cNvCxnSpPr>
+            <a:cxnSpLocks/>
+          </p:cNvCxnSpPr>
+          <p:nvPr/>
+        </p:nvCxnSpPr>
+        <p:spPr>
+          <a:xfrm rot="5400000">
+            <a:off x="3081976" y="1457793"/>
+            <a:ext cx="923673" cy="3724312"/>
+          </a:xfrm>
+          <a:prstGeom prst="bentConnector3">
+            <a:avLst>
+              <a:gd name="adj1" fmla="val 61916"/>
+            </a:avLst>
+          </a:prstGeom>
+          <a:noFill/>
+          <a:ln w="38100" cap="flat" cmpd="sng">
+            <a:solidFill>
+              <a:schemeClr val="tx1">
+                <a:lumMod val="50000"/>
+                <a:lumOff val="50000"/>
+              </a:schemeClr>
+            </a:solidFill>
+            <a:prstDash val="solid"/>
+            <a:round/>
+            <a:headEnd type="none" w="med" len="med"/>
+            <a:tailEnd type="triangle" w="med" len="med"/>
+          </a:ln>
+        </p:spPr>
+      </p:cxnSp>
+      <p:sp>
+        <p:nvSpPr>
+          <p:cNvPr id="24" name="Rounded Rectangle 23">
+            <a:extLst>
+              <a:ext uri="{FF2B5EF4-FFF2-40B4-BE49-F238E27FC236}">
+                <a16:creationId xmlns:a16="http://schemas.microsoft.com/office/drawing/2014/main" id="{0DEA46E6-B80B-BE4C-9567-E21DA4DA4271}"/>
+              </a:ext>
+            </a:extLst>
+          </p:cNvPr>
+          <p:cNvSpPr/>
+          <p:nvPr/>
+        </p:nvSpPr>
+        <p:spPr>
+          <a:xfrm>
+            <a:off x="4406895" y="3786862"/>
+            <a:ext cx="1650998" cy="719379"/>
+          </a:xfrm>
+          <a:prstGeom prst="roundRect">
+            <a:avLst/>
+          </a:prstGeom>
+          <a:ln w="19050"/>
+        </p:spPr>
+        <p:style>
+          <a:lnRef idx="2">
+            <a:schemeClr val="dk1"/>
+          </a:lnRef>
+          <a:fillRef idx="1">
+            <a:schemeClr val="lt1"/>
+          </a:fillRef>
+          <a:effectRef idx="0">
+            <a:schemeClr val="dk1"/>
+          </a:effectRef>
+          <a:fontRef idx="minor">
+            <a:schemeClr val="dk1"/>
+          </a:fontRef>
+        </p:style>
+        <p:txBody>
+          <a:bodyPr rtlCol="0" anchor="ctr"/>
+          <a:lstStyle/>
+          <a:p>
+            <a:pPr algn="ctr"/>
+            <a:r>
+              <a:rPr lang="fr-FR" sz="1400" dirty="0"/>
+              <a:t>Validation</a:t>
+            </a:r>
+            <a:br>
+              <a:rPr lang="fr-FR" sz="1400" dirty="0"/>
+            </a:br>
+            <a:r>
+              <a:rPr lang="fr-FR" sz="1400" dirty="0"/>
+              <a:t>des données</a:t>
+            </a:r>
+          </a:p>
+        </p:txBody>
+      </p:sp>
+      <p:cxnSp>
+        <p:nvCxnSpPr>
+          <p:cNvPr id="25" name="Straight Arrow Connector 24">
+            <a:extLst>
+              <a:ext uri="{FF2B5EF4-FFF2-40B4-BE49-F238E27FC236}">
+                <a16:creationId xmlns:a16="http://schemas.microsoft.com/office/drawing/2014/main" id="{F38D1E8D-4A58-584F-A150-26F4B935955A}"/>
+              </a:ext>
+            </a:extLst>
+          </p:cNvPr>
+          <p:cNvCxnSpPr>
+            <a:cxnSpLocks/>
+          </p:cNvCxnSpPr>
+          <p:nvPr/>
+        </p:nvCxnSpPr>
+        <p:spPr>
+          <a:xfrm flipV="1">
+            <a:off x="6127057" y="4146552"/>
+            <a:ext cx="555141" cy="1"/>
+          </a:xfrm>
+          <a:prstGeom prst="straightConnector1">
+            <a:avLst/>
+          </a:prstGeom>
+          <a:noFill/>
+          <a:ln w="38100" cap="flat" cmpd="sng">
+            <a:solidFill>
+              <a:schemeClr val="tx1">
+                <a:lumMod val="50000"/>
+                <a:lumOff val="50000"/>
+              </a:schemeClr>
+            </a:solidFill>
+            <a:prstDash val="solid"/>
+            <a:round/>
+            <a:headEnd type="none" w="med" len="med"/>
+            <a:tailEnd type="triangle" w="med" len="med"/>
+          </a:ln>
+        </p:spPr>
+      </p:cxnSp>
+      <p:sp>
+        <p:nvSpPr>
+          <p:cNvPr id="28" name="Diamond 27">
+            <a:extLst>
+              <a:ext uri="{FF2B5EF4-FFF2-40B4-BE49-F238E27FC236}">
+                <a16:creationId xmlns:a16="http://schemas.microsoft.com/office/drawing/2014/main" id="{71F0184D-AE7A-6B4D-B699-71A5ED2515A6}"/>
+              </a:ext>
+            </a:extLst>
+          </p:cNvPr>
+          <p:cNvSpPr/>
+          <p:nvPr/>
+        </p:nvSpPr>
+        <p:spPr>
+          <a:xfrm>
+            <a:off x="6770781" y="3624059"/>
+            <a:ext cx="1188900" cy="1071033"/>
+          </a:xfrm>
+          <a:prstGeom prst="diamond">
+            <a:avLst/>
+          </a:prstGeom>
+          <a:solidFill>
+            <a:schemeClr val="accent1"/>
+          </a:solidFill>
+          <a:ln>
+            <a:noFill/>
+          </a:ln>
+        </p:spPr>
+        <p:style>
+          <a:lnRef idx="2">
+            <a:schemeClr val="accent1">
+              <a:shade val="50000"/>
+            </a:schemeClr>
+          </a:lnRef>
+          <a:fillRef idx="1">
+            <a:schemeClr val="accent1"/>
+          </a:fillRef>
+          <a:effectRef idx="0">
+            <a:schemeClr val="accent1"/>
+          </a:effectRef>
+          <a:fontRef idx="minor">
+            <a:schemeClr val="lt1"/>
+          </a:fontRef>
+        </p:style>
+        <p:txBody>
+          <a:bodyPr rtlCol="0" anchor="ctr"/>
+          <a:lstStyle/>
+          <a:p>
+            <a:pPr algn="ctr"/>
+            <a:endParaRPr lang="fr-FR" sz="1600" dirty="0"/>
+          </a:p>
+        </p:txBody>
+      </p:sp>
+      <p:sp>
+        <p:nvSpPr>
+          <p:cNvPr id="31" name="Rectangle 30">
+            <a:extLst>
+              <a:ext uri="{FF2B5EF4-FFF2-40B4-BE49-F238E27FC236}">
+                <a16:creationId xmlns:a16="http://schemas.microsoft.com/office/drawing/2014/main" id="{2F82BC03-C4B9-1648-B76D-E2B72D8752ED}"/>
+              </a:ext>
+            </a:extLst>
+          </p:cNvPr>
+          <p:cNvSpPr/>
+          <p:nvPr/>
+        </p:nvSpPr>
+        <p:spPr>
+          <a:xfrm>
+            <a:off x="6934849" y="3900321"/>
+            <a:ext cx="901209" cy="523220"/>
+          </a:xfrm>
+          <a:prstGeom prst="rect">
+            <a:avLst/>
+          </a:prstGeom>
+        </p:spPr>
+        <p:txBody>
+          <a:bodyPr wrap="none">
+            <a:spAutoFit/>
+          </a:bodyPr>
+          <a:lstStyle/>
+          <a:p>
+            <a:pPr algn="ctr"/>
+            <a:r>
+              <a:rPr lang="fr-FR" sz="1400" dirty="0">
+                <a:solidFill>
+                  <a:schemeClr val="bg1"/>
+                </a:solidFill>
+              </a:rPr>
+              <a:t>Données</a:t>
+            </a:r>
+            <a:br>
+              <a:rPr lang="fr-FR" sz="1400" dirty="0">
+                <a:solidFill>
+                  <a:schemeClr val="bg1"/>
+                </a:solidFill>
+              </a:rPr>
+            </a:br>
+            <a:r>
+              <a:rPr lang="fr-FR" sz="1400" dirty="0">
+                <a:solidFill>
+                  <a:schemeClr val="bg1"/>
+                </a:solidFill>
+              </a:rPr>
+              <a:t>valides ?</a:t>
+            </a:r>
+          </a:p>
+        </p:txBody>
+      </p:sp>
+      <p:cxnSp>
+        <p:nvCxnSpPr>
+          <p:cNvPr id="32" name="Straight Arrow Connector 31">
+            <a:extLst>
+              <a:ext uri="{FF2B5EF4-FFF2-40B4-BE49-F238E27FC236}">
+                <a16:creationId xmlns:a16="http://schemas.microsoft.com/office/drawing/2014/main" id="{C4A56298-2C17-F546-BE4F-DAFFA35CC5FE}"/>
+              </a:ext>
+            </a:extLst>
+          </p:cNvPr>
+          <p:cNvCxnSpPr>
+            <a:cxnSpLocks/>
+          </p:cNvCxnSpPr>
+          <p:nvPr/>
+        </p:nvCxnSpPr>
+        <p:spPr>
+          <a:xfrm rot="16200000" flipV="1">
+            <a:off x="7119697" y="3343440"/>
+            <a:ext cx="474133" cy="1"/>
+          </a:xfrm>
+          <a:prstGeom prst="straightConnector1">
+            <a:avLst/>
+          </a:prstGeom>
+          <a:noFill/>
+          <a:ln w="38100" cap="flat" cmpd="sng">
+            <a:solidFill>
+              <a:schemeClr val="tx1">
+                <a:lumMod val="50000"/>
+                <a:lumOff val="50000"/>
+              </a:schemeClr>
+            </a:solidFill>
+            <a:prstDash val="solid"/>
+            <a:round/>
+            <a:headEnd type="none" w="med" len="med"/>
+            <a:tailEnd type="triangle" w="med" len="med"/>
+          </a:ln>
+        </p:spPr>
+      </p:cxnSp>
+      <p:sp>
+        <p:nvSpPr>
+          <p:cNvPr id="34" name="ZoneTexte 13">
+            <a:extLst>
+              <a:ext uri="{FF2B5EF4-FFF2-40B4-BE49-F238E27FC236}">
+                <a16:creationId xmlns:a16="http://schemas.microsoft.com/office/drawing/2014/main" id="{7293A084-06F0-F540-982A-8EFCA92310F3}"/>
+              </a:ext>
+            </a:extLst>
+          </p:cNvPr>
+          <p:cNvSpPr txBox="1"/>
+          <p:nvPr/>
+        </p:nvSpPr>
+        <p:spPr>
+          <a:xfrm>
+            <a:off x="7356763" y="3234197"/>
+            <a:ext cx="559769" cy="338554"/>
+          </a:xfrm>
+          <a:prstGeom prst="rect">
+            <a:avLst/>
+          </a:prstGeom>
+          <a:noFill/>
+        </p:spPr>
+        <p:txBody>
+          <a:bodyPr wrap="none" rtlCol="0">
+            <a:spAutoFit/>
+          </a:bodyPr>
+          <a:lstStyle/>
+          <a:p>
+            <a:r>
+              <a:rPr lang="fr-FR" sz="1600" dirty="0"/>
+              <a:t>Non</a:t>
+            </a:r>
+          </a:p>
+        </p:txBody>
+      </p:sp>
+      <p:sp>
+        <p:nvSpPr>
+          <p:cNvPr id="37" name="Rounded Rectangle 36">
+            <a:extLst>
+              <a:ext uri="{FF2B5EF4-FFF2-40B4-BE49-F238E27FC236}">
+                <a16:creationId xmlns:a16="http://schemas.microsoft.com/office/drawing/2014/main" id="{4F20F8D2-4C45-CD44-9581-7BA40BADE04C}"/>
+              </a:ext>
+            </a:extLst>
+          </p:cNvPr>
+          <p:cNvSpPr/>
+          <p:nvPr/>
+        </p:nvSpPr>
+        <p:spPr>
+          <a:xfrm>
+            <a:off x="6523567" y="1920218"/>
+            <a:ext cx="1725149" cy="1158567"/>
+          </a:xfrm>
+          <a:prstGeom prst="roundRect">
+            <a:avLst/>
+          </a:prstGeom>
+          <a:ln w="19050"/>
+        </p:spPr>
+        <p:style>
+          <a:lnRef idx="2">
+            <a:schemeClr val="dk1"/>
+          </a:lnRef>
+          <a:fillRef idx="1">
+            <a:schemeClr val="lt1"/>
+          </a:fillRef>
+          <a:effectRef idx="0">
+            <a:schemeClr val="dk1"/>
+          </a:effectRef>
+          <a:fontRef idx="minor">
+            <a:schemeClr val="dk1"/>
+          </a:fontRef>
+        </p:style>
+        <p:txBody>
+          <a:bodyPr rtlCol="0" anchor="ctr"/>
+          <a:lstStyle/>
+          <a:p>
+            <a:pPr algn="ctr"/>
+            <a:r>
+              <a:rPr lang="fr-FR" sz="1400" dirty="0"/>
+              <a:t>Création</a:t>
+            </a:r>
+            <a:br>
+              <a:rPr lang="fr-FR" sz="1400" dirty="0"/>
+            </a:br>
+            <a:r>
+              <a:rPr lang="fr-FR" sz="1400" dirty="0"/>
+              <a:t>d’un formulaire rempli avec les données et un message d’erreur</a:t>
+            </a:r>
+          </a:p>
+        </p:txBody>
+      </p:sp>
+      <p:sp>
+        <p:nvSpPr>
+          <p:cNvPr id="38" name="Rounded Rectangle 37">
+            <a:extLst>
+              <a:ext uri="{FF2B5EF4-FFF2-40B4-BE49-F238E27FC236}">
+                <a16:creationId xmlns:a16="http://schemas.microsoft.com/office/drawing/2014/main" id="{AF85B123-BCD9-2B40-8C67-F4B9589974A0}"/>
+              </a:ext>
+            </a:extLst>
+          </p:cNvPr>
+          <p:cNvSpPr/>
+          <p:nvPr/>
+        </p:nvSpPr>
+        <p:spPr>
+          <a:xfrm>
+            <a:off x="6728884" y="5259381"/>
+            <a:ext cx="1315480" cy="791317"/>
+          </a:xfrm>
+          <a:prstGeom prst="roundRect">
+            <a:avLst/>
+          </a:prstGeom>
+          <a:ln w="19050"/>
+        </p:spPr>
+        <p:style>
+          <a:lnRef idx="2">
+            <a:schemeClr val="dk1"/>
+          </a:lnRef>
+          <a:fillRef idx="1">
+            <a:schemeClr val="lt1"/>
+          </a:fillRef>
+          <a:effectRef idx="0">
+            <a:schemeClr val="dk1"/>
+          </a:effectRef>
+          <a:fontRef idx="minor">
+            <a:schemeClr val="dk1"/>
+          </a:fontRef>
+        </p:style>
+        <p:txBody>
+          <a:bodyPr rtlCol="0" anchor="ctr"/>
+          <a:lstStyle/>
+          <a:p>
+            <a:pPr algn="ctr"/>
+            <a:r>
+              <a:rPr lang="fr-FR" sz="1400" dirty="0"/>
+              <a:t>Actions sur les données</a:t>
+            </a:r>
+          </a:p>
+        </p:txBody>
+      </p:sp>
+      <p:cxnSp>
+        <p:nvCxnSpPr>
+          <p:cNvPr id="41" name="Elbow Connector 40">
+            <a:extLst>
+              <a:ext uri="{FF2B5EF4-FFF2-40B4-BE49-F238E27FC236}">
+                <a16:creationId xmlns:a16="http://schemas.microsoft.com/office/drawing/2014/main" id="{2EA0A0A0-DAC1-E741-8E2B-20CEA7F645AC}"/>
+              </a:ext>
+            </a:extLst>
+          </p:cNvPr>
+          <p:cNvCxnSpPr>
+            <a:cxnSpLocks/>
+          </p:cNvCxnSpPr>
+          <p:nvPr/>
+        </p:nvCxnSpPr>
+        <p:spPr>
+          <a:xfrm rot="10800000" flipV="1">
+            <a:off x="5219701" y="2499502"/>
+            <a:ext cx="1253067" cy="933350"/>
+          </a:xfrm>
+          <a:prstGeom prst="bentConnector3">
+            <a:avLst>
+              <a:gd name="adj1" fmla="val 12162"/>
+            </a:avLst>
+          </a:prstGeom>
+          <a:noFill/>
+          <a:ln w="38100" cap="flat" cmpd="sng">
+            <a:solidFill>
+              <a:schemeClr val="tx1">
+                <a:lumMod val="50000"/>
+                <a:lumOff val="50000"/>
+              </a:schemeClr>
+            </a:solidFill>
+            <a:prstDash val="solid"/>
+            <a:round/>
+            <a:headEnd type="none" w="med" len="med"/>
+            <a:tailEnd type="none" w="med" len="med"/>
+          </a:ln>
+        </p:spPr>
+      </p:cxnSp>
+      <p:cxnSp>
+        <p:nvCxnSpPr>
+          <p:cNvPr id="44" name="Straight Arrow Connector 43">
+            <a:extLst>
+              <a:ext uri="{FF2B5EF4-FFF2-40B4-BE49-F238E27FC236}">
+                <a16:creationId xmlns:a16="http://schemas.microsoft.com/office/drawing/2014/main" id="{DB4856CB-4AA8-804C-A341-4EBAA11A68D0}"/>
+              </a:ext>
+            </a:extLst>
+          </p:cNvPr>
+          <p:cNvCxnSpPr>
+            <a:cxnSpLocks/>
+          </p:cNvCxnSpPr>
+          <p:nvPr/>
+        </p:nvCxnSpPr>
+        <p:spPr>
+          <a:xfrm rot="5400000">
+            <a:off x="7141248" y="4971472"/>
+            <a:ext cx="431030" cy="1"/>
+          </a:xfrm>
+          <a:prstGeom prst="straightConnector1">
+            <a:avLst/>
+          </a:prstGeom>
+          <a:noFill/>
+          <a:ln w="38100" cap="flat" cmpd="sng">
+            <a:solidFill>
+              <a:schemeClr val="tx1">
+                <a:lumMod val="50000"/>
+                <a:lumOff val="50000"/>
+              </a:schemeClr>
+            </a:solidFill>
+            <a:prstDash val="solid"/>
+            <a:round/>
+            <a:headEnd type="none" w="med" len="med"/>
+            <a:tailEnd type="triangle" w="med" len="med"/>
+          </a:ln>
+        </p:spPr>
+      </p:cxnSp>
+      <p:sp>
+        <p:nvSpPr>
+          <p:cNvPr id="45" name="ZoneTexte 13">
+            <a:extLst>
+              <a:ext uri="{FF2B5EF4-FFF2-40B4-BE49-F238E27FC236}">
+                <a16:creationId xmlns:a16="http://schemas.microsoft.com/office/drawing/2014/main" id="{4B47F649-59E4-8B49-B65A-0EFAF2FAF3C0}"/>
+              </a:ext>
+            </a:extLst>
+          </p:cNvPr>
+          <p:cNvSpPr txBox="1"/>
+          <p:nvPr/>
+        </p:nvSpPr>
+        <p:spPr>
+          <a:xfrm>
+            <a:off x="7356763" y="4800252"/>
+            <a:ext cx="503664" cy="338554"/>
+          </a:xfrm>
+          <a:prstGeom prst="rect">
+            <a:avLst/>
+          </a:prstGeom>
+          <a:noFill/>
+        </p:spPr>
+        <p:txBody>
+          <a:bodyPr wrap="none" rtlCol="0">
+            <a:spAutoFit/>
+          </a:bodyPr>
+          <a:lstStyle/>
+          <a:p>
+            <a:r>
+              <a:rPr lang="fr-FR" sz="1600" dirty="0"/>
+              <a:t>Oui</a:t>
+            </a:r>
+          </a:p>
+        </p:txBody>
+      </p:sp>
+      <p:cxnSp>
+        <p:nvCxnSpPr>
+          <p:cNvPr id="51" name="Straight Arrow Connector 50">
+            <a:extLst>
+              <a:ext uri="{FF2B5EF4-FFF2-40B4-BE49-F238E27FC236}">
+                <a16:creationId xmlns:a16="http://schemas.microsoft.com/office/drawing/2014/main" id="{6FFE76C1-B63C-7649-B69D-1365A451B684}"/>
+              </a:ext>
+            </a:extLst>
+          </p:cNvPr>
+          <p:cNvCxnSpPr>
+            <a:cxnSpLocks/>
+          </p:cNvCxnSpPr>
+          <p:nvPr/>
+        </p:nvCxnSpPr>
+        <p:spPr>
+          <a:xfrm flipH="1">
+            <a:off x="2036236" y="5632561"/>
+            <a:ext cx="2276625" cy="0"/>
+          </a:xfrm>
+          <a:prstGeom prst="straightConnector1">
+            <a:avLst/>
+          </a:prstGeom>
+          <a:noFill/>
+          <a:ln w="38100" cap="flat" cmpd="sng">
+            <a:solidFill>
+              <a:schemeClr val="tx1">
+                <a:lumMod val="50000"/>
+                <a:lumOff val="50000"/>
+              </a:schemeClr>
+            </a:solidFill>
+            <a:prstDash val="solid"/>
+            <a:round/>
+            <a:headEnd type="none" w="med" len="med"/>
+            <a:tailEnd type="triangle" w="med" len="med"/>
+          </a:ln>
+        </p:spPr>
+      </p:cxnSp>
+      <p:sp>
+        <p:nvSpPr>
+          <p:cNvPr id="55" name="Rounded Rectangle 54">
+            <a:extLst>
+              <a:ext uri="{FF2B5EF4-FFF2-40B4-BE49-F238E27FC236}">
+                <a16:creationId xmlns:a16="http://schemas.microsoft.com/office/drawing/2014/main" id="{5416136C-7DD1-DA45-AD12-7C89496BC683}"/>
+              </a:ext>
+            </a:extLst>
+          </p:cNvPr>
+          <p:cNvSpPr/>
+          <p:nvPr/>
+        </p:nvSpPr>
+        <p:spPr>
+          <a:xfrm>
+            <a:off x="4389961" y="5236903"/>
+            <a:ext cx="1650998" cy="791317"/>
+          </a:xfrm>
+          <a:prstGeom prst="roundRect">
+            <a:avLst/>
+          </a:prstGeom>
+          <a:ln w="19050"/>
+        </p:spPr>
+        <p:style>
+          <a:lnRef idx="2">
+            <a:schemeClr val="dk1"/>
+          </a:lnRef>
+          <a:fillRef idx="1">
+            <a:schemeClr val="lt1"/>
+          </a:fillRef>
+          <a:effectRef idx="0">
+            <a:schemeClr val="dk1"/>
+          </a:effectRef>
+          <a:fontRef idx="minor">
+            <a:schemeClr val="dk1"/>
+          </a:fontRef>
+        </p:style>
+        <p:txBody>
+          <a:bodyPr rtlCol="0" anchor="ctr"/>
+          <a:lstStyle/>
+          <a:p>
+            <a:pPr algn="ctr"/>
+            <a:r>
+              <a:rPr lang="fr-FR" sz="1400" dirty="0"/>
+              <a:t>Redirection</a:t>
+            </a:r>
+            <a:br>
+              <a:rPr lang="fr-FR" sz="1400" dirty="0"/>
+            </a:br>
+            <a:r>
+              <a:rPr lang="fr-FR" sz="1400" dirty="0"/>
+              <a:t>vers une page de « succès »</a:t>
+            </a:r>
+          </a:p>
+        </p:txBody>
+      </p:sp>
+      <p:cxnSp>
+        <p:nvCxnSpPr>
+          <p:cNvPr id="56" name="Straight Arrow Connector 55">
+            <a:extLst>
+              <a:ext uri="{FF2B5EF4-FFF2-40B4-BE49-F238E27FC236}">
+                <a16:creationId xmlns:a16="http://schemas.microsoft.com/office/drawing/2014/main" id="{59FBC7DA-1C85-4343-84E9-C7AB7B7E9A89}"/>
+              </a:ext>
+            </a:extLst>
+          </p:cNvPr>
+          <p:cNvCxnSpPr>
+            <a:cxnSpLocks/>
+          </p:cNvCxnSpPr>
+          <p:nvPr/>
+        </p:nvCxnSpPr>
+        <p:spPr>
+          <a:xfrm flipH="1" flipV="1">
+            <a:off x="6109446" y="5618665"/>
+            <a:ext cx="555141" cy="1"/>
+          </a:xfrm>
+          <a:prstGeom prst="straightConnector1">
+            <a:avLst/>
+          </a:prstGeom>
+          <a:noFill/>
+          <a:ln w="38100" cap="flat" cmpd="sng">
+            <a:solidFill>
+              <a:schemeClr val="tx1">
+                <a:lumMod val="50000"/>
+                <a:lumOff val="50000"/>
+              </a:schemeClr>
+            </a:solidFill>
+            <a:prstDash val="solid"/>
+            <a:round/>
+            <a:headEnd type="none" w="med" len="med"/>
+            <a:tailEnd type="triangle" w="med" len="med"/>
+          </a:ln>
+        </p:spPr>
+      </p:cxnSp>
+      <p:sp>
+        <p:nvSpPr>
+          <p:cNvPr id="58" name="Oval 57">
+            <a:extLst>
+              <a:ext uri="{FF2B5EF4-FFF2-40B4-BE49-F238E27FC236}">
+                <a16:creationId xmlns:a16="http://schemas.microsoft.com/office/drawing/2014/main" id="{72A728FF-7B48-D943-A24A-B6B9830CB0FA}"/>
+              </a:ext>
+            </a:extLst>
+          </p:cNvPr>
+          <p:cNvSpPr/>
+          <p:nvPr/>
+        </p:nvSpPr>
+        <p:spPr>
+          <a:xfrm>
+            <a:off x="1423422" y="5391261"/>
+            <a:ext cx="516467" cy="516467"/>
+          </a:xfrm>
+          <a:prstGeom prst="ellipse">
+            <a:avLst/>
+          </a:prstGeom>
+          <a:solidFill>
+            <a:schemeClr val="accent5"/>
+          </a:solidFill>
+          <a:ln w="19050">
+            <a:solidFill>
+              <a:schemeClr val="tx1"/>
+            </a:solidFill>
+          </a:ln>
+        </p:spPr>
+        <p:style>
+          <a:lnRef idx="2">
+            <a:schemeClr val="accent1">
+              <a:shade val="50000"/>
+            </a:schemeClr>
+          </a:lnRef>
+          <a:fillRef idx="1">
+            <a:schemeClr val="accent1"/>
+          </a:fillRef>
+          <a:effectRef idx="0">
+            <a:schemeClr val="accent1"/>
+          </a:effectRef>
+          <a:fontRef idx="minor">
+            <a:schemeClr val="lt1"/>
+          </a:fontRef>
+        </p:style>
+        <p:txBody>
+          <a:bodyPr rtlCol="0" anchor="ctr"/>
+          <a:lstStyle/>
+          <a:p>
+            <a:pPr algn="ctr"/>
+            <a:endParaRPr lang="fr-FR"/>
+          </a:p>
+        </p:txBody>
+      </p:sp>
+      <p:sp>
+        <p:nvSpPr>
+          <p:cNvPr id="60" name="Oval 59">
+            <a:extLst>
+              <a:ext uri="{FF2B5EF4-FFF2-40B4-BE49-F238E27FC236}">
+                <a16:creationId xmlns:a16="http://schemas.microsoft.com/office/drawing/2014/main" id="{8381883E-A99C-A848-ACBD-D358F63E9F4E}"/>
+              </a:ext>
+            </a:extLst>
+          </p:cNvPr>
+          <p:cNvSpPr/>
+          <p:nvPr/>
+        </p:nvSpPr>
+        <p:spPr>
+          <a:xfrm>
+            <a:off x="1505278" y="5473116"/>
+            <a:ext cx="352754" cy="352754"/>
+          </a:xfrm>
+          <a:prstGeom prst="ellipse">
+            <a:avLst/>
+          </a:prstGeom>
+          <a:solidFill>
+            <a:schemeClr val="tx1"/>
+          </a:solidFill>
+          <a:ln w="19050">
+            <a:solidFill>
+              <a:schemeClr val="tx1"/>
+            </a:solidFill>
+          </a:ln>
+        </p:spPr>
+        <p:style>
+          <a:lnRef idx="2">
+            <a:schemeClr val="accent1">
+              <a:shade val="50000"/>
+            </a:schemeClr>
+          </a:lnRef>
+          <a:fillRef idx="1">
+            <a:schemeClr val="accent1"/>
+          </a:fillRef>
+          <a:effectRef idx="0">
+            <a:schemeClr val="accent1"/>
+          </a:effectRef>
+          <a:fontRef idx="minor">
+            <a:schemeClr val="lt1"/>
+          </a:fontRef>
+        </p:style>
+        <p:txBody>
+          <a:bodyPr rtlCol="0" anchor="ctr"/>
+          <a:lstStyle/>
+          <a:p>
+            <a:pPr algn="ctr"/>
+            <a:endParaRPr lang="fr-FR"/>
+          </a:p>
+        </p:txBody>
+      </p:sp>
+      <p:sp>
+        <p:nvSpPr>
+          <p:cNvPr id="61" name="TextBox 60">
+            <a:extLst>
+              <a:ext uri="{FF2B5EF4-FFF2-40B4-BE49-F238E27FC236}">
+                <a16:creationId xmlns:a16="http://schemas.microsoft.com/office/drawing/2014/main" id="{FE8C867B-2CBA-4C43-9D93-5A4A82BB4105}"/>
+              </a:ext>
+            </a:extLst>
+          </p:cNvPr>
+          <p:cNvSpPr txBox="1"/>
+          <p:nvPr/>
+        </p:nvSpPr>
+        <p:spPr>
+          <a:xfrm>
+            <a:off x="1465089" y="5904935"/>
+            <a:ext cx="433132" cy="307777"/>
+          </a:xfrm>
+          <a:prstGeom prst="rect">
+            <a:avLst/>
+          </a:prstGeom>
+          <a:noFill/>
+        </p:spPr>
+        <p:txBody>
+          <a:bodyPr wrap="none" rtlCol="0">
+            <a:spAutoFit/>
+          </a:bodyPr>
+          <a:lstStyle/>
+          <a:p>
+            <a:r>
+              <a:rPr lang="fr-FR" sz="1400" dirty="0"/>
+              <a:t>Fin</a:t>
+            </a:r>
+          </a:p>
+        </p:txBody>
+      </p:sp>
+      <p:pic>
+        <p:nvPicPr>
+          <p:cNvPr id="65" name="Google Shape;134;p22">
+            <a:extLst>
+              <a:ext uri="{FF2B5EF4-FFF2-40B4-BE49-F238E27FC236}">
+                <a16:creationId xmlns:a16="http://schemas.microsoft.com/office/drawing/2014/main" id="{6E41042E-EEFA-2745-AFEE-45A5DD62EE57}"/>
+              </a:ext>
+            </a:extLst>
+          </p:cNvPr>
+          <p:cNvPicPr preferRelativeResize="0"/>
+          <p:nvPr/>
+        </p:nvPicPr>
+        <p:blipFill>
+          <a:blip r:embed="rId2">
+            <a:alphaModFix/>
+          </a:blip>
+          <a:stretch>
+            <a:fillRect/>
+          </a:stretch>
+        </p:blipFill>
+        <p:spPr>
+          <a:xfrm>
+            <a:off x="3170168" y="3091959"/>
+            <a:ext cx="633900" cy="633900"/>
+          </a:xfrm>
+          <a:prstGeom prst="rect">
+            <a:avLst/>
+          </a:prstGeom>
+          <a:noFill/>
+          <a:ln>
+            <a:noFill/>
+          </a:ln>
+        </p:spPr>
+      </p:pic>
+      <p:pic>
+        <p:nvPicPr>
+          <p:cNvPr id="66" name="Google Shape;134;p22">
+            <a:extLst>
+              <a:ext uri="{FF2B5EF4-FFF2-40B4-BE49-F238E27FC236}">
+                <a16:creationId xmlns:a16="http://schemas.microsoft.com/office/drawing/2014/main" id="{75BD06FD-8067-2A40-918B-F31D746A2315}"/>
+              </a:ext>
+            </a:extLst>
+          </p:cNvPr>
+          <p:cNvPicPr preferRelativeResize="0"/>
+          <p:nvPr/>
+        </p:nvPicPr>
+        <p:blipFill>
+          <a:blip r:embed="rId2">
+            <a:alphaModFix/>
+          </a:blip>
+          <a:stretch>
+            <a:fillRect/>
+          </a:stretch>
+        </p:blipFill>
+        <p:spPr>
+          <a:xfrm>
+            <a:off x="3185043" y="5328506"/>
+            <a:ext cx="633900" cy="633900"/>
+          </a:xfrm>
+          <a:prstGeom prst="rect">
+            <a:avLst/>
+          </a:prstGeom>
+          <a:noFill/>
+          <a:ln>
+            <a:noFill/>
+          </a:ln>
+        </p:spPr>
+      </p:pic>
+      <p:pic>
+        <p:nvPicPr>
+          <p:cNvPr id="67" name="Picture 66">
+            <a:extLst>
+              <a:ext uri="{FF2B5EF4-FFF2-40B4-BE49-F238E27FC236}">
+                <a16:creationId xmlns:a16="http://schemas.microsoft.com/office/drawing/2014/main" id="{7676DD85-6E65-FF4D-A3E8-7EA6B76EDD3A}"/>
+              </a:ext>
+            </a:extLst>
+          </p:cNvPr>
+          <p:cNvPicPr>
+            <a:picLocks noChangeAspect="1"/>
+          </p:cNvPicPr>
+          <p:nvPr/>
+        </p:nvPicPr>
+        <p:blipFill>
+          <a:blip r:embed="rId3"/>
+          <a:stretch>
+            <a:fillRect/>
+          </a:stretch>
+        </p:blipFill>
+        <p:spPr>
+          <a:xfrm>
+            <a:off x="0" y="0"/>
+            <a:ext cx="9144000" cy="6858000"/>
+          </a:xfrm>
+          <a:prstGeom prst="rect">
+            <a:avLst/>
+          </a:prstGeom>
+        </p:spPr>
+      </p:pic>
+    </p:spTree>
+    <p:extLst>
+      <p:ext uri="{BB962C8B-B14F-4D97-AF65-F5344CB8AC3E}">
+        <p14:creationId xmlns:p14="http://schemas.microsoft.com/office/powerpoint/2010/main" val="1969718543"/>
+      </p:ext>
+    </p:extLst>
+  </p:cSld>
+  <p:clrMapOvr>
+    <a:masterClrMapping/>
+  </p:clrMapOvr>
+</p:sld>
+</file>
+
+<file path=ppt/slides/slide9.xml><?xml version="1.0" encoding="utf-8"?>
+<p:sld xmlns:a="http://schemas.openxmlformats.org/drawingml/2006/main" xmlns:r="http://schemas.openxmlformats.org/officeDocument/2006/relationships" xmlns:p="http://schemas.openxmlformats.org/presentationml/2006/main">
+  <p:cSld>
+    <p:spTree>
+      <p:nvGrpSpPr>
         <p:cNvPr id="1" name="Shape 109"/>
         <p:cNvGrpSpPr/>
         <p:nvPr/>
@@ -8957,7 +11090,7 @@
             <a:fld id="{DCE37727-CC04-7A46-938D-2CCFF056F773}" type="slidenum">
               <a:rPr lang="fr-FR" smtClean="0"/>
               <a:pPr/>
-              <a:t>8</a:t>
+              <a:t>9</a:t>
             </a:fld>
             <a:endParaRPr lang="fr-FR" dirty="0"/>
           </a:p>
@@ -9395,463 +11528,6 @@
     <p:extLst>
       <p:ext uri="{BB962C8B-B14F-4D97-AF65-F5344CB8AC3E}">
         <p14:creationId xmlns:p14="http://schemas.microsoft.com/office/powerpoint/2010/main" val="3512948217"/>
-      </p:ext>
-    </p:extLst>
-  </p:cSld>
-  <p:clrMapOvr>
-    <a:masterClrMapping/>
-  </p:clrMapOvr>
-</p:sld>
-</file>
-
-<file path=ppt/slides/slide9.xml><?xml version="1.0" encoding="utf-8"?>
-<p:sld xmlns:a="http://schemas.openxmlformats.org/drawingml/2006/main" xmlns:r="http://schemas.openxmlformats.org/officeDocument/2006/relationships" xmlns:p="http://schemas.openxmlformats.org/presentationml/2006/main">
-  <p:cSld>
-    <p:spTree>
-      <p:nvGrpSpPr>
-        <p:cNvPr id="1" name="Shape 109"/>
-        <p:cNvGrpSpPr/>
-        <p:nvPr/>
-      </p:nvGrpSpPr>
-      <p:grpSpPr>
-        <a:xfrm>
-          <a:off x="0" y="0"/>
-          <a:ext cx="0" cy="0"/>
-          <a:chOff x="0" y="0"/>
-          <a:chExt cx="0" cy="0"/>
-        </a:xfrm>
-      </p:grpSpPr>
-      <p:sp>
-        <p:nvSpPr>
-          <p:cNvPr id="3" name="Titre 2">
-            <a:extLst>
-              <a:ext uri="{FF2B5EF4-FFF2-40B4-BE49-F238E27FC236}">
-                <a16:creationId xmlns:a16="http://schemas.microsoft.com/office/drawing/2014/main" id="{7921C1D7-9AAD-1441-9F6A-F19970F8918F}"/>
-              </a:ext>
-            </a:extLst>
-          </p:cNvPr>
-          <p:cNvSpPr>
-            <a:spLocks noGrp="1"/>
-          </p:cNvSpPr>
-          <p:nvPr>
-            <p:ph type="title"/>
-          </p:nvPr>
-        </p:nvSpPr>
-        <p:spPr/>
-        <p:txBody>
-          <a:bodyPr/>
-          <a:lstStyle/>
-          <a:p>
-            <a:r>
-              <a:rPr lang="fr-FR" dirty="0"/>
-              <a:t>Résumé</a:t>
-            </a:r>
-          </a:p>
-        </p:txBody>
-      </p:sp>
-      <p:sp>
-        <p:nvSpPr>
-          <p:cNvPr id="114" name="Google Shape;114;p21"/>
-          <p:cNvSpPr txBox="1">
-            <a:spLocks noGrp="1"/>
-          </p:cNvSpPr>
-          <p:nvPr>
-            <p:ph sz="half" idx="1"/>
-          </p:nvPr>
-        </p:nvSpPr>
-        <p:spPr>
-          <a:prstGeom prst="rect">
-            <a:avLst/>
-          </a:prstGeom>
-        </p:spPr>
-        <p:txBody>
-          <a:bodyPr spcFirstLastPara="1" wrap="square" lIns="91425" tIns="91425" rIns="91425" bIns="91425" anchor="t" anchorCtr="0">
-            <a:noAutofit/>
-          </a:bodyPr>
-          <a:lstStyle/>
-          <a:p>
-            <a:pPr>
-              <a:spcBef>
-                <a:spcPts val="0"/>
-              </a:spcBef>
-            </a:pPr>
-            <a:r>
-              <a:rPr lang="fr-FR" dirty="0">
-                <a:ea typeface="Calibri"/>
-                <a:cs typeface="Calibri"/>
-                <a:sym typeface="Calibri"/>
-              </a:rPr>
-              <a:t>Développement bicéphale (Front / Back)</a:t>
-            </a:r>
-          </a:p>
-          <a:p>
-            <a:pPr lvl="1">
-              <a:spcBef>
-                <a:spcPts val="0"/>
-              </a:spcBef>
-            </a:pPr>
-            <a:r>
-              <a:rPr lang="fr-FR" dirty="0">
-                <a:ea typeface="Calibri"/>
-                <a:cs typeface="Calibri"/>
-                <a:sym typeface="Calibri"/>
-              </a:rPr>
-              <a:t>Objectifs complémentaires</a:t>
-            </a:r>
-          </a:p>
-          <a:p>
-            <a:pPr lvl="1">
-              <a:spcBef>
-                <a:spcPts val="0"/>
-              </a:spcBef>
-            </a:pPr>
-            <a:r>
-              <a:rPr lang="fr-FR" dirty="0">
-                <a:ea typeface="Calibri"/>
-                <a:cs typeface="Calibri"/>
-                <a:sym typeface="Calibri"/>
-              </a:rPr>
-              <a:t>Compétences différentes</a:t>
-            </a:r>
-          </a:p>
-          <a:p>
-            <a:pPr>
-              <a:spcBef>
-                <a:spcPts val="1200"/>
-              </a:spcBef>
-            </a:pPr>
-            <a:r>
-              <a:rPr lang="fr-FR" dirty="0">
-                <a:ea typeface="Calibri"/>
-                <a:cs typeface="Calibri"/>
-                <a:sym typeface="Calibri"/>
-              </a:rPr>
-              <a:t>Équilibrage des traitements</a:t>
-            </a:r>
-          </a:p>
-          <a:p>
-            <a:pPr lvl="1">
-              <a:spcBef>
-                <a:spcPts val="0"/>
-              </a:spcBef>
-            </a:pPr>
-            <a:r>
-              <a:rPr lang="fr-FR" dirty="0">
-                <a:ea typeface="Calibri"/>
-                <a:cs typeface="Calibri"/>
-                <a:sym typeface="Calibri"/>
-              </a:rPr>
-              <a:t>Client lourd / Serveur léger</a:t>
-            </a:r>
-          </a:p>
-          <a:p>
-            <a:pPr lvl="1">
-              <a:spcBef>
-                <a:spcPts val="0"/>
-              </a:spcBef>
-            </a:pPr>
-            <a:r>
-              <a:rPr lang="fr-FR" dirty="0">
-                <a:ea typeface="Calibri"/>
-                <a:cs typeface="Calibri"/>
-                <a:sym typeface="Calibri"/>
-              </a:rPr>
-              <a:t>Client léger / Serveur lourd</a:t>
-            </a:r>
-          </a:p>
-          <a:p>
-            <a:pPr>
-              <a:spcBef>
-                <a:spcPts val="1200"/>
-              </a:spcBef>
-            </a:pPr>
-            <a:r>
-              <a:rPr lang="fr-FR" dirty="0">
-                <a:cs typeface="Calibri"/>
-                <a:sym typeface="Calibri"/>
-              </a:rPr>
-              <a:t>Tendance </a:t>
-            </a:r>
-          </a:p>
-          <a:p>
-            <a:pPr lvl="1">
-              <a:spcBef>
-                <a:spcPts val="0"/>
-              </a:spcBef>
-            </a:pPr>
-            <a:r>
-              <a:rPr lang="fr-FR" dirty="0" err="1">
-                <a:ea typeface="Calibri"/>
-                <a:cs typeface="Calibri"/>
-                <a:sym typeface="Calibri"/>
-              </a:rPr>
-              <a:t>WebApp</a:t>
-            </a:r>
-            <a:r>
-              <a:rPr lang="fr-FR" dirty="0">
-                <a:ea typeface="Calibri"/>
-                <a:cs typeface="Calibri"/>
-                <a:sym typeface="Calibri"/>
-              </a:rPr>
-              <a:t> (client lourd) / Service Web </a:t>
-            </a:r>
-          </a:p>
-          <a:p>
-            <a:pPr lvl="1">
-              <a:spcBef>
-                <a:spcPts val="0"/>
-              </a:spcBef>
-            </a:pPr>
-            <a:r>
-              <a:rPr lang="fr-FR" dirty="0">
-                <a:ea typeface="Calibri"/>
-                <a:cs typeface="Calibri"/>
-                <a:sym typeface="Calibri"/>
-              </a:rPr>
-              <a:t>Application </a:t>
-            </a:r>
-            <a:r>
-              <a:rPr lang="fr-FR" dirty="0" err="1">
-                <a:ea typeface="Calibri"/>
-                <a:cs typeface="Calibri"/>
-                <a:sym typeface="Calibri"/>
-              </a:rPr>
-              <a:t>SmartPhone</a:t>
-            </a:r>
-            <a:r>
-              <a:rPr lang="fr-FR" dirty="0">
-                <a:ea typeface="Calibri"/>
-                <a:cs typeface="Calibri"/>
-                <a:sym typeface="Calibri"/>
-              </a:rPr>
-              <a:t> (client lourd) / Service Web</a:t>
-            </a:r>
-          </a:p>
-          <a:p>
-            <a:pPr>
-              <a:spcBef>
-                <a:spcPts val="1200"/>
-              </a:spcBef>
-            </a:pPr>
-            <a:r>
-              <a:rPr lang="fr-FR" dirty="0">
-                <a:cs typeface="Calibri"/>
-                <a:sym typeface="Calibri"/>
-              </a:rPr>
-              <a:t>Évolutions fortes</a:t>
-            </a:r>
-          </a:p>
-          <a:p>
-            <a:pPr lvl="1">
-              <a:spcBef>
-                <a:spcPts val="0"/>
-              </a:spcBef>
-            </a:pPr>
-            <a:r>
-              <a:rPr lang="fr-FR" dirty="0">
-                <a:ea typeface="Calibri"/>
-                <a:cs typeface="Calibri"/>
-                <a:sym typeface="Calibri"/>
-              </a:rPr>
-              <a:t>Front : </a:t>
-            </a:r>
-            <a:r>
-              <a:rPr lang="fr-FR" i="1" dirty="0" err="1">
-                <a:ea typeface="Calibri"/>
-                <a:cs typeface="Calibri"/>
-                <a:sym typeface="Calibri"/>
-              </a:rPr>
-              <a:t>framework</a:t>
-            </a:r>
-            <a:r>
-              <a:rPr lang="fr-FR" dirty="0">
-                <a:ea typeface="Calibri"/>
-                <a:cs typeface="Calibri"/>
-                <a:sym typeface="Calibri"/>
-              </a:rPr>
-              <a:t> MVC dans le navigateur</a:t>
-            </a:r>
-          </a:p>
-          <a:p>
-            <a:pPr lvl="1">
-              <a:spcBef>
-                <a:spcPts val="0"/>
-              </a:spcBef>
-            </a:pPr>
-            <a:r>
-              <a:rPr lang="fr-FR" dirty="0">
-                <a:ea typeface="Calibri"/>
-                <a:cs typeface="Calibri"/>
-                <a:sym typeface="Calibri"/>
-              </a:rPr>
-              <a:t>Back : fortement répartis (</a:t>
-            </a:r>
-            <a:r>
-              <a:rPr lang="fr-FR" i="1" dirty="0">
-                <a:ea typeface="Calibri"/>
-                <a:cs typeface="Calibri"/>
-                <a:sym typeface="Calibri"/>
-              </a:rPr>
-              <a:t>cloud</a:t>
-            </a:r>
-            <a:r>
-              <a:rPr lang="fr-FR" dirty="0">
-                <a:ea typeface="Calibri"/>
-                <a:cs typeface="Calibri"/>
-                <a:sym typeface="Calibri"/>
-              </a:rPr>
-              <a:t>) et très dynamique (</a:t>
-            </a:r>
-            <a:r>
-              <a:rPr lang="fr-FR" i="1" dirty="0" err="1">
-                <a:ea typeface="Calibri"/>
-                <a:cs typeface="Calibri"/>
-                <a:sym typeface="Calibri"/>
-              </a:rPr>
-              <a:t>serverless</a:t>
-            </a:r>
-            <a:r>
-              <a:rPr lang="fr-FR" dirty="0">
-                <a:ea typeface="Calibri"/>
-                <a:cs typeface="Calibri"/>
-                <a:sym typeface="Calibri"/>
-              </a:rPr>
-              <a:t>)</a:t>
-            </a:r>
-          </a:p>
-          <a:p>
-            <a:pPr lvl="1">
-              <a:spcBef>
-                <a:spcPts val="0"/>
-              </a:spcBef>
-            </a:pPr>
-            <a:endParaRPr lang="fr-FR" dirty="0">
-              <a:ea typeface="Calibri"/>
-              <a:cs typeface="Calibri"/>
-              <a:sym typeface="Calibri"/>
-            </a:endParaRPr>
-          </a:p>
-          <a:p>
-            <a:pPr marL="457200" lvl="1" indent="0">
-              <a:spcBef>
-                <a:spcPts val="0"/>
-              </a:spcBef>
-              <a:buNone/>
-            </a:pPr>
-            <a:endParaRPr lang="fr-FR" dirty="0">
-              <a:ea typeface="Calibri"/>
-              <a:cs typeface="Calibri"/>
-              <a:sym typeface="Calibri"/>
-            </a:endParaRPr>
-          </a:p>
-        </p:txBody>
-      </p:sp>
-      <p:sp>
-        <p:nvSpPr>
-          <p:cNvPr id="5" name="Espace réservé de la date 3">
-            <a:extLst>
-              <a:ext uri="{FF2B5EF4-FFF2-40B4-BE49-F238E27FC236}">
-                <a16:creationId xmlns:a16="http://schemas.microsoft.com/office/drawing/2014/main" id="{8E488E86-E57B-DD4F-8EF0-C9E1A9C1BACE}"/>
-              </a:ext>
-            </a:extLst>
-          </p:cNvPr>
-          <p:cNvSpPr>
-            <a:spLocks noGrp="1"/>
-          </p:cNvSpPr>
-          <p:nvPr>
-            <p:ph type="dt" sz="half" idx="10"/>
-          </p:nvPr>
-        </p:nvSpPr>
-        <p:spPr>
-          <a:xfrm>
-            <a:off x="901702" y="6654800"/>
-            <a:ext cx="2133600" cy="206375"/>
-          </a:xfrm>
-        </p:spPr>
-        <p:txBody>
-          <a:bodyPr/>
-          <a:lstStyle/>
-          <a:p>
-            <a:fld id="{BB2FA04C-1355-4CE6-8050-4BD994E23BD5}" type="datetime4">
-              <a:rPr lang="fr-FR" smtClean="0"/>
-              <a:t>5 juin 2019</a:t>
-            </a:fld>
-            <a:endParaRPr lang="fr-FR" dirty="0"/>
-          </a:p>
-        </p:txBody>
-      </p:sp>
-      <p:sp>
-        <p:nvSpPr>
-          <p:cNvPr id="6" name="Espace réservé du pied de page 4">
-            <a:extLst>
-              <a:ext uri="{FF2B5EF4-FFF2-40B4-BE49-F238E27FC236}">
-                <a16:creationId xmlns:a16="http://schemas.microsoft.com/office/drawing/2014/main" id="{8FF601BA-DE97-0442-863C-1113443568E2}"/>
-              </a:ext>
-            </a:extLst>
-          </p:cNvPr>
-          <p:cNvSpPr>
-            <a:spLocks noGrp="1"/>
-          </p:cNvSpPr>
-          <p:nvPr>
-            <p:ph type="ftr" sz="quarter" idx="11"/>
-          </p:nvPr>
-        </p:nvSpPr>
-        <p:spPr>
-          <a:xfrm>
-            <a:off x="3039530" y="6654800"/>
-            <a:ext cx="5257800" cy="206375"/>
-          </a:xfrm>
-        </p:spPr>
-        <p:txBody>
-          <a:bodyPr/>
-          <a:lstStyle/>
-          <a:p>
-            <a:r>
-              <a:rPr lang="fr-FR"/>
-              <a:t>DIU NSI</a:t>
-            </a:r>
-          </a:p>
-        </p:txBody>
-      </p:sp>
-      <p:sp>
-        <p:nvSpPr>
-          <p:cNvPr id="7" name="Espace réservé du numéro de diapositive 5">
-            <a:extLst>
-              <a:ext uri="{FF2B5EF4-FFF2-40B4-BE49-F238E27FC236}">
-                <a16:creationId xmlns:a16="http://schemas.microsoft.com/office/drawing/2014/main" id="{887C37AF-3662-FC4A-840C-7C0F41A2471E}"/>
-              </a:ext>
-            </a:extLst>
-          </p:cNvPr>
-          <p:cNvSpPr>
-            <a:spLocks noGrp="1"/>
-          </p:cNvSpPr>
-          <p:nvPr>
-            <p:ph type="sldNum" sz="quarter" idx="12"/>
-          </p:nvPr>
-        </p:nvSpPr>
-        <p:spPr>
-          <a:xfrm>
-            <a:off x="0" y="6553200"/>
-            <a:ext cx="457200" cy="304800"/>
-          </a:xfrm>
-        </p:spPr>
-        <p:txBody>
-          <a:bodyPr/>
-          <a:lstStyle/>
-          <a:p>
-            <a:fld id="{DCE37727-CC04-7A46-938D-2CCFF056F773}" type="slidenum">
-              <a:rPr lang="fr-FR" smtClean="0"/>
-              <a:pPr/>
-              <a:t>9</a:t>
-            </a:fld>
-            <a:endParaRPr lang="fr-FR" dirty="0"/>
-          </a:p>
-        </p:txBody>
-      </p:sp>
-    </p:spTree>
-    <p:extLst>
-      <p:ext uri="{BB962C8B-B14F-4D97-AF65-F5344CB8AC3E}">
-        <p14:creationId xmlns:p14="http://schemas.microsoft.com/office/powerpoint/2010/main" val="2874215417"/>
       </p:ext>
     </p:extLst>
   </p:cSld>

</xml_diff>

<commit_message>
Web : correction des liens pdf de l'index
</commit_message>
<xml_diff>
--- a/web/5-Developpement/developpement.pptx
+++ b/web/5-Developpement/developpement.pptx
@@ -220,7 +220,7 @@
           <a:p>
             <a:fld id="{5EB47243-285B-2741-8C7D-C88258D9CCFA}" type="datetimeFigureOut">
               <a:rPr lang="fr-FR" smtClean="0"/>
-              <a:t>06/06/2019</a:t>
+              <a:t>07/06/2019</a:t>
             </a:fld>
             <a:endParaRPr lang="fr-FR"/>
           </a:p>
@@ -286,7 +286,7 @@
           <a:p>
             <a:fld id="{C5CA9166-BC48-2C47-B9BF-6F57720E77B8}" type="slidenum">
               <a:rPr lang="fr-FR" smtClean="0"/>
-              <a:t>‹N°›</a:t>
+              <a:t>‹#›</a:t>
             </a:fld>
             <a:endParaRPr lang="fr-FR"/>
           </a:p>
@@ -386,7 +386,7 @@
           <a:p>
             <a:fld id="{7D088D39-B4EA-D24B-B9C3-6A64886EABE2}" type="datetimeFigureOut">
               <a:rPr lang="fr-FR" smtClean="0"/>
-              <a:t>06/06/2019</a:t>
+              <a:t>07/06/2019</a:t>
             </a:fld>
             <a:endParaRPr lang="fr-FR"/>
           </a:p>
@@ -544,7 +544,7 @@
           <a:p>
             <a:fld id="{1C0E2CBA-6097-B848-A7DA-4D7BD6EB303B}" type="slidenum">
               <a:rPr lang="fr-FR" smtClean="0"/>
-              <a:t>‹N°›</a:t>
+              <a:t>‹#›</a:t>
             </a:fld>
             <a:endParaRPr lang="fr-FR"/>
           </a:p>
@@ -1859,7 +1859,7 @@
           <a:p>
             <a:fld id="{BB2FA04C-1355-4CE6-8050-4BD994E23BD5}" type="datetime4">
               <a:rPr lang="fr-FR" smtClean="0"/>
-              <a:t>6 juin 2019</a:t>
+              <a:t>7 juin 2019</a:t>
             </a:fld>
             <a:endParaRPr lang="fr-FR" dirty="0"/>
           </a:p>
@@ -1937,7 +1937,7 @@
             <a:fld id="{DCE37727-CC04-7A46-938D-2CCFF056F773}" type="slidenum">
               <a:rPr lang="fr-FR" smtClean="0"/>
               <a:pPr/>
-              <a:t>‹N°›</a:t>
+              <a:t>‹#›</a:t>
             </a:fld>
             <a:endParaRPr lang="fr-FR"/>
           </a:p>
@@ -2004,7 +2004,7 @@
           <p:cNvPr id="11" name="Espace réservé du contenu 2">
             <a:extLst>
               <a:ext uri="{FF2B5EF4-FFF2-40B4-BE49-F238E27FC236}">
-                <a16:creationId xmlns:a16="http://schemas.microsoft.com/office/drawing/2014/main" xmlns="" id="{1A2ADADB-3494-4B4C-90B5-5BAE3E740810}"/>
+                <a16:creationId xmlns:a16="http://schemas.microsoft.com/office/drawing/2014/main" id="{1A2ADADB-3494-4B4C-90B5-5BAE3E740810}"/>
               </a:ext>
             </a:extLst>
           </p:cNvPr>
@@ -2450,7 +2450,7 @@
           <a:p>
             <a:fld id="{A81C4219-47FF-4375-968D-EABA4A212953}" type="datetime4">
               <a:rPr lang="fr-FR" smtClean="0"/>
-              <a:t>6 juin 2019</a:t>
+              <a:t>7 juin 2019</a:t>
             </a:fld>
             <a:endParaRPr lang="fr-FR" dirty="0"/>
           </a:p>
@@ -2528,7 +2528,7 @@
             <a:fld id="{DCE37727-CC04-7A46-938D-2CCFF056F773}" type="slidenum">
               <a:rPr lang="fr-FR" smtClean="0"/>
               <a:pPr/>
-              <a:t>‹N°›</a:t>
+              <a:t>‹#›</a:t>
             </a:fld>
             <a:endParaRPr lang="fr-FR"/>
           </a:p>
@@ -4286,7 +4286,7 @@
           <a:p>
             <a:fld id="{81E3CCF4-D669-4BB6-B0BE-EE495E88AE6B}" type="datetime4">
               <a:rPr lang="fr-FR" smtClean="0"/>
-              <a:t>6 juin 2019</a:t>
+              <a:t>7 juin 2019</a:t>
             </a:fld>
             <a:endParaRPr lang="fr-FR" dirty="0"/>
           </a:p>
@@ -4364,7 +4364,7 @@
             <a:fld id="{DCE37727-CC04-7A46-938D-2CCFF056F773}" type="slidenum">
               <a:rPr lang="fr-FR" smtClean="0"/>
               <a:pPr/>
-              <a:t>‹N°›</a:t>
+              <a:t>‹#›</a:t>
             </a:fld>
             <a:endParaRPr lang="fr-FR"/>
           </a:p>
@@ -5222,7 +5222,7 @@
           <a:p>
             <a:fld id="{2E52B8B1-858B-4633-AE57-5B6CA9292F2B}" type="datetime4">
               <a:rPr lang="fr-FR" smtClean="0"/>
-              <a:t>6 juin 2019</a:t>
+              <a:t>7 juin 2019</a:t>
             </a:fld>
             <a:endParaRPr lang="fr-FR" dirty="0"/>
           </a:p>
@@ -5300,7 +5300,7 @@
             <a:fld id="{DCE37727-CC04-7A46-938D-2CCFF056F773}" type="slidenum">
               <a:rPr lang="fr-FR" smtClean="0"/>
               <a:pPr/>
-              <a:t>‹N°›</a:t>
+              <a:t>‹#›</a:t>
             </a:fld>
             <a:endParaRPr lang="fr-FR"/>
           </a:p>
@@ -5843,7 +5843,7 @@
             </a:pPr>
             <a:fld id="{00000000-1234-1234-1234-123412341234}" type="slidenum">
               <a:rPr lang="en"/>
-              <a:t>‹N°›</a:t>
+              <a:t>‹#›</a:t>
             </a:fld>
             <a:endParaRPr/>
           </a:p>
@@ -6319,7 +6319,7 @@
           <p:cNvPr id="3" name="Titre 2">
             <a:extLst>
               <a:ext uri="{FF2B5EF4-FFF2-40B4-BE49-F238E27FC236}">
-                <a16:creationId xmlns:a16="http://schemas.microsoft.com/office/drawing/2014/main" xmlns="" id="{7921C1D7-9AAD-1441-9F6A-F19970F8918F}"/>
+                <a16:creationId xmlns:a16="http://schemas.microsoft.com/office/drawing/2014/main" id="{7921C1D7-9AAD-1441-9F6A-F19970F8918F}"/>
               </a:ext>
             </a:extLst>
           </p:cNvPr>
@@ -6644,7 +6644,7 @@
           <p:cNvPr id="5" name="Espace réservé de la date 3">
             <a:extLst>
               <a:ext uri="{FF2B5EF4-FFF2-40B4-BE49-F238E27FC236}">
-                <a16:creationId xmlns:a16="http://schemas.microsoft.com/office/drawing/2014/main" xmlns="" id="{8E488E86-E57B-DD4F-8EF0-C9E1A9C1BACE}"/>
+                <a16:creationId xmlns:a16="http://schemas.microsoft.com/office/drawing/2014/main" id="{8E488E86-E57B-DD4F-8EF0-C9E1A9C1BACE}"/>
               </a:ext>
             </a:extLst>
           </p:cNvPr>
@@ -6667,7 +6667,7 @@
           <a:p>
             <a:fld id="{BB2FA04C-1355-4CE6-8050-4BD994E23BD5}" type="datetime4">
               <a:rPr lang="fr-FR" smtClean="0"/>
-              <a:t>6 juin 2019</a:t>
+              <a:t>7 juin 2019</a:t>
             </a:fld>
             <a:endParaRPr lang="fr-FR" dirty="0"/>
           </a:p>
@@ -6678,7 +6678,7 @@
           <p:cNvPr id="6" name="Espace réservé du pied de page 4">
             <a:extLst>
               <a:ext uri="{FF2B5EF4-FFF2-40B4-BE49-F238E27FC236}">
-                <a16:creationId xmlns:a16="http://schemas.microsoft.com/office/drawing/2014/main" xmlns="" id="{8FF601BA-DE97-0442-863C-1113443568E2}"/>
+                <a16:creationId xmlns:a16="http://schemas.microsoft.com/office/drawing/2014/main" id="{8FF601BA-DE97-0442-863C-1113443568E2}"/>
               </a:ext>
             </a:extLst>
           </p:cNvPr>
@@ -6711,7 +6711,7 @@
           <p:cNvPr id="7" name="Espace réservé du numéro de diapositive 5">
             <a:extLst>
               <a:ext uri="{FF2B5EF4-FFF2-40B4-BE49-F238E27FC236}">
-                <a16:creationId xmlns:a16="http://schemas.microsoft.com/office/drawing/2014/main" xmlns="" id="{887C37AF-3662-FC4A-840C-7C0F41A2471E}"/>
+                <a16:creationId xmlns:a16="http://schemas.microsoft.com/office/drawing/2014/main" id="{887C37AF-3662-FC4A-840C-7C0F41A2471E}"/>
               </a:ext>
             </a:extLst>
           </p:cNvPr>
@@ -6751,13 +6751,6 @@
   <p:clrMapOvr>
     <a:masterClrMapping/>
   </p:clrMapOvr>
-  <p:timing>
-    <p:tnLst>
-      <p:par>
-        <p:cTn id="1" dur="indefinite" restart="never" nodeType="tmRoot"/>
-      </p:par>
-    </p:tnLst>
-  </p:timing>
 </p:sld>
 </file>
 
@@ -6889,7 +6882,7 @@
           <p:cNvPr id="3" name="Titre 2">
             <a:extLst>
               <a:ext uri="{FF2B5EF4-FFF2-40B4-BE49-F238E27FC236}">
-                <a16:creationId xmlns:a16="http://schemas.microsoft.com/office/drawing/2014/main" xmlns="" id="{7921C1D7-9AAD-1441-9F6A-F19970F8918F}"/>
+                <a16:creationId xmlns:a16="http://schemas.microsoft.com/office/drawing/2014/main" id="{7921C1D7-9AAD-1441-9F6A-F19970F8918F}"/>
               </a:ext>
             </a:extLst>
           </p:cNvPr>
@@ -6992,7 +6985,7 @@
           <p:cNvPr id="6" name="Image 5">
             <a:extLst>
               <a:ext uri="{FF2B5EF4-FFF2-40B4-BE49-F238E27FC236}">
-                <a16:creationId xmlns:a16="http://schemas.microsoft.com/office/drawing/2014/main" xmlns="" id="{5B87F28A-5152-D743-821E-A2AA15F99530}"/>
+                <a16:creationId xmlns:a16="http://schemas.microsoft.com/office/drawing/2014/main" id="{5B87F28A-5152-D743-821E-A2AA15F99530}"/>
               </a:ext>
             </a:extLst>
           </p:cNvPr>
@@ -7022,7 +7015,7 @@
           <p:cNvPr id="9" name="Google Shape;133;p22">
             <a:extLst>
               <a:ext uri="{FF2B5EF4-FFF2-40B4-BE49-F238E27FC236}">
-                <a16:creationId xmlns:a16="http://schemas.microsoft.com/office/drawing/2014/main" xmlns="" id="{11B00C56-9F68-CE48-A866-BCB4C0E0236D}"/>
+                <a16:creationId xmlns:a16="http://schemas.microsoft.com/office/drawing/2014/main" id="{11B00C56-9F68-CE48-A866-BCB4C0E0236D}"/>
               </a:ext>
             </a:extLst>
           </p:cNvPr>
@@ -7185,7 +7178,7 @@
           <p:cNvPr id="11" name="Espace réservé de la date 3">
             <a:extLst>
               <a:ext uri="{FF2B5EF4-FFF2-40B4-BE49-F238E27FC236}">
-                <a16:creationId xmlns:a16="http://schemas.microsoft.com/office/drawing/2014/main" xmlns="" id="{5C84ECBD-BF62-124A-9CF0-441464D6A8DA}"/>
+                <a16:creationId xmlns:a16="http://schemas.microsoft.com/office/drawing/2014/main" id="{5C84ECBD-BF62-124A-9CF0-441464D6A8DA}"/>
               </a:ext>
             </a:extLst>
           </p:cNvPr>
@@ -7208,7 +7201,7 @@
           <a:p>
             <a:fld id="{BB2FA04C-1355-4CE6-8050-4BD994E23BD5}" type="datetime4">
               <a:rPr lang="fr-FR" smtClean="0"/>
-              <a:t>6 juin 2019</a:t>
+              <a:t>7 juin 2019</a:t>
             </a:fld>
             <a:endParaRPr lang="fr-FR" dirty="0"/>
           </a:p>
@@ -7219,7 +7212,7 @@
           <p:cNvPr id="12" name="Espace réservé du pied de page 4">
             <a:extLst>
               <a:ext uri="{FF2B5EF4-FFF2-40B4-BE49-F238E27FC236}">
-                <a16:creationId xmlns:a16="http://schemas.microsoft.com/office/drawing/2014/main" xmlns="" id="{6EFD8C49-3932-C94A-99C2-A5AD1B9A3A3E}"/>
+                <a16:creationId xmlns:a16="http://schemas.microsoft.com/office/drawing/2014/main" id="{6EFD8C49-3932-C94A-99C2-A5AD1B9A3A3E}"/>
               </a:ext>
             </a:extLst>
           </p:cNvPr>
@@ -7252,7 +7245,7 @@
           <p:cNvPr id="13" name="Espace réservé du numéro de diapositive 5">
             <a:extLst>
               <a:ext uri="{FF2B5EF4-FFF2-40B4-BE49-F238E27FC236}">
-                <a16:creationId xmlns:a16="http://schemas.microsoft.com/office/drawing/2014/main" xmlns="" id="{2E493AFA-EF12-7542-9439-8B9CA4899864}"/>
+                <a16:creationId xmlns:a16="http://schemas.microsoft.com/office/drawing/2014/main" id="{2E493AFA-EF12-7542-9439-8B9CA4899864}"/>
               </a:ext>
             </a:extLst>
           </p:cNvPr>
@@ -7317,7 +7310,7 @@
           <p:cNvPr id="2" name="Titre 1">
             <a:extLst>
               <a:ext uri="{FF2B5EF4-FFF2-40B4-BE49-F238E27FC236}">
-                <a16:creationId xmlns:a16="http://schemas.microsoft.com/office/drawing/2014/main" xmlns="" id="{55B573BC-ECF7-2E47-BFC1-85ECAA9F5DDA}"/>
+                <a16:creationId xmlns:a16="http://schemas.microsoft.com/office/drawing/2014/main" id="{55B573BC-ECF7-2E47-BFC1-85ECAA9F5DDA}"/>
               </a:ext>
             </a:extLst>
           </p:cNvPr>
@@ -7345,7 +7338,7 @@
           <p:cNvPr id="4" name="Espace réservé de la date 3">
             <a:extLst>
               <a:ext uri="{FF2B5EF4-FFF2-40B4-BE49-F238E27FC236}">
-                <a16:creationId xmlns:a16="http://schemas.microsoft.com/office/drawing/2014/main" xmlns="" id="{94DCC9B2-B418-CD43-950A-803321C2F44D}"/>
+                <a16:creationId xmlns:a16="http://schemas.microsoft.com/office/drawing/2014/main" id="{94DCC9B2-B418-CD43-950A-803321C2F44D}"/>
               </a:ext>
             </a:extLst>
           </p:cNvPr>
@@ -7363,7 +7356,7 @@
           <a:p>
             <a:fld id="{BB2FA04C-1355-4CE6-8050-4BD994E23BD5}" type="datetime4">
               <a:rPr lang="fr-FR" smtClean="0"/>
-              <a:t>6 juin 2019</a:t>
+              <a:t>7 juin 2019</a:t>
             </a:fld>
             <a:endParaRPr lang="fr-FR" dirty="0"/>
           </a:p>
@@ -7374,7 +7367,7 @@
           <p:cNvPr id="5" name="Espace réservé du pied de page 4">
             <a:extLst>
               <a:ext uri="{FF2B5EF4-FFF2-40B4-BE49-F238E27FC236}">
-                <a16:creationId xmlns:a16="http://schemas.microsoft.com/office/drawing/2014/main" xmlns="" id="{61D52A78-1A31-404B-8692-974193451EF2}"/>
+                <a16:creationId xmlns:a16="http://schemas.microsoft.com/office/drawing/2014/main" id="{61D52A78-1A31-404B-8692-974193451EF2}"/>
               </a:ext>
             </a:extLst>
           </p:cNvPr>
@@ -7402,7 +7395,7 @@
           <p:cNvPr id="6" name="Espace réservé du numéro de diapositive 5">
             <a:extLst>
               <a:ext uri="{FF2B5EF4-FFF2-40B4-BE49-F238E27FC236}">
-                <a16:creationId xmlns:a16="http://schemas.microsoft.com/office/drawing/2014/main" xmlns="" id="{298A8F3A-04A3-CB48-B40E-457859CD3A1E}"/>
+                <a16:creationId xmlns:a16="http://schemas.microsoft.com/office/drawing/2014/main" id="{298A8F3A-04A3-CB48-B40E-457859CD3A1E}"/>
               </a:ext>
             </a:extLst>
           </p:cNvPr>
@@ -7432,7 +7425,7 @@
           <p:cNvPr id="3" name="Espace réservé du contenu 2">
             <a:extLst>
               <a:ext uri="{FF2B5EF4-FFF2-40B4-BE49-F238E27FC236}">
-                <a16:creationId xmlns:a16="http://schemas.microsoft.com/office/drawing/2014/main" xmlns="" id="{0E0F6FEE-CBCA-1F4F-B200-C1D720151BDA}"/>
+                <a16:creationId xmlns:a16="http://schemas.microsoft.com/office/drawing/2014/main" id="{0E0F6FEE-CBCA-1F4F-B200-C1D720151BDA}"/>
               </a:ext>
             </a:extLst>
           </p:cNvPr>
@@ -7596,7 +7589,7 @@
           <p:cNvPr id="9" name="Image 8">
             <a:extLst>
               <a:ext uri="{FF2B5EF4-FFF2-40B4-BE49-F238E27FC236}">
-                <a16:creationId xmlns:a16="http://schemas.microsoft.com/office/drawing/2014/main" xmlns="" id="{5B87F28A-5152-D743-821E-A2AA15F99530}"/>
+                <a16:creationId xmlns:a16="http://schemas.microsoft.com/office/drawing/2014/main" id="{5B87F28A-5152-D743-821E-A2AA15F99530}"/>
               </a:ext>
             </a:extLst>
           </p:cNvPr>
@@ -7656,7 +7649,7 @@
           <p:cNvPr id="2" name="Titre 1">
             <a:extLst>
               <a:ext uri="{FF2B5EF4-FFF2-40B4-BE49-F238E27FC236}">
-                <a16:creationId xmlns:a16="http://schemas.microsoft.com/office/drawing/2014/main" xmlns="" id="{55B573BC-ECF7-2E47-BFC1-85ECAA9F5DDA}"/>
+                <a16:creationId xmlns:a16="http://schemas.microsoft.com/office/drawing/2014/main" id="{55B573BC-ECF7-2E47-BFC1-85ECAA9F5DDA}"/>
               </a:ext>
             </a:extLst>
           </p:cNvPr>
@@ -7684,7 +7677,7 @@
           <p:cNvPr id="4" name="Espace réservé de la date 3">
             <a:extLst>
               <a:ext uri="{FF2B5EF4-FFF2-40B4-BE49-F238E27FC236}">
-                <a16:creationId xmlns:a16="http://schemas.microsoft.com/office/drawing/2014/main" xmlns="" id="{94DCC9B2-B418-CD43-950A-803321C2F44D}"/>
+                <a16:creationId xmlns:a16="http://schemas.microsoft.com/office/drawing/2014/main" id="{94DCC9B2-B418-CD43-950A-803321C2F44D}"/>
               </a:ext>
             </a:extLst>
           </p:cNvPr>
@@ -7707,7 +7700,7 @@
           <a:p>
             <a:fld id="{BB2FA04C-1355-4CE6-8050-4BD994E23BD5}" type="datetime4">
               <a:rPr lang="fr-FR" smtClean="0"/>
-              <a:t>6 juin 2019</a:t>
+              <a:t>7 juin 2019</a:t>
             </a:fld>
             <a:endParaRPr lang="fr-FR" dirty="0"/>
           </a:p>
@@ -7718,7 +7711,7 @@
           <p:cNvPr id="5" name="Espace réservé du pied de page 4">
             <a:extLst>
               <a:ext uri="{FF2B5EF4-FFF2-40B4-BE49-F238E27FC236}">
-                <a16:creationId xmlns:a16="http://schemas.microsoft.com/office/drawing/2014/main" xmlns="" id="{61D52A78-1A31-404B-8692-974193451EF2}"/>
+                <a16:creationId xmlns:a16="http://schemas.microsoft.com/office/drawing/2014/main" id="{61D52A78-1A31-404B-8692-974193451EF2}"/>
               </a:ext>
             </a:extLst>
           </p:cNvPr>
@@ -7746,7 +7739,7 @@
           <p:cNvPr id="6" name="Espace réservé du numéro de diapositive 5">
             <a:extLst>
               <a:ext uri="{FF2B5EF4-FFF2-40B4-BE49-F238E27FC236}">
-                <a16:creationId xmlns:a16="http://schemas.microsoft.com/office/drawing/2014/main" xmlns="" id="{298A8F3A-04A3-CB48-B40E-457859CD3A1E}"/>
+                <a16:creationId xmlns:a16="http://schemas.microsoft.com/office/drawing/2014/main" id="{298A8F3A-04A3-CB48-B40E-457859CD3A1E}"/>
               </a:ext>
             </a:extLst>
           </p:cNvPr>
@@ -7776,7 +7769,7 @@
           <p:cNvPr id="3" name="Espace réservé du contenu 2">
             <a:extLst>
               <a:ext uri="{FF2B5EF4-FFF2-40B4-BE49-F238E27FC236}">
-                <a16:creationId xmlns:a16="http://schemas.microsoft.com/office/drawing/2014/main" xmlns="" id="{0E0F6FEE-CBCA-1F4F-B200-C1D720151BDA}"/>
+                <a16:creationId xmlns:a16="http://schemas.microsoft.com/office/drawing/2014/main" id="{0E0F6FEE-CBCA-1F4F-B200-C1D720151BDA}"/>
               </a:ext>
             </a:extLst>
           </p:cNvPr>
@@ -7962,13 +7955,6 @@
   <p:clrMapOvr>
     <a:masterClrMapping/>
   </p:clrMapOvr>
-  <p:timing>
-    <p:tnLst>
-      <p:par>
-        <p:cTn id="1" dur="indefinite" restart="never" nodeType="tmRoot"/>
-      </p:par>
-    </p:tnLst>
-  </p:timing>
 </p:sld>
 </file>
 
@@ -7994,7 +7980,7 @@
           <p:cNvPr id="3" name="Titre 2">
             <a:extLst>
               <a:ext uri="{FF2B5EF4-FFF2-40B4-BE49-F238E27FC236}">
-                <a16:creationId xmlns:a16="http://schemas.microsoft.com/office/drawing/2014/main" xmlns="" id="{7921C1D7-9AAD-1441-9F6A-F19970F8918F}"/>
+                <a16:creationId xmlns:a16="http://schemas.microsoft.com/office/drawing/2014/main" id="{7921C1D7-9AAD-1441-9F6A-F19970F8918F}"/>
               </a:ext>
             </a:extLst>
           </p:cNvPr>
@@ -8191,7 +8177,7 @@
           <p:cNvPr id="25" name="Google Shape;113;p21">
             <a:extLst>
               <a:ext uri="{FF2B5EF4-FFF2-40B4-BE49-F238E27FC236}">
-                <a16:creationId xmlns:a16="http://schemas.microsoft.com/office/drawing/2014/main" xmlns="" id="{6FD9C605-BEC4-6040-AA60-F8B219D3AD10}"/>
+                <a16:creationId xmlns:a16="http://schemas.microsoft.com/office/drawing/2014/main" id="{6FD9C605-BEC4-6040-AA60-F8B219D3AD10}"/>
               </a:ext>
             </a:extLst>
           </p:cNvPr>
@@ -8225,7 +8211,7 @@
           <p:cNvPr id="26" name="Google Shape;117;p21">
             <a:extLst>
               <a:ext uri="{FF2B5EF4-FFF2-40B4-BE49-F238E27FC236}">
-                <a16:creationId xmlns:a16="http://schemas.microsoft.com/office/drawing/2014/main" xmlns="" id="{3C20B004-2EA5-0645-937D-D7D24F65D59F}"/>
+                <a16:creationId xmlns:a16="http://schemas.microsoft.com/office/drawing/2014/main" id="{3C20B004-2EA5-0645-937D-D7D24F65D59F}"/>
               </a:ext>
             </a:extLst>
           </p:cNvPr>
@@ -8262,7 +8248,7 @@
           <p:cNvPr id="27" name="Image 10">
             <a:extLst>
               <a:ext uri="{FF2B5EF4-FFF2-40B4-BE49-F238E27FC236}">
-                <a16:creationId xmlns:a16="http://schemas.microsoft.com/office/drawing/2014/main" xmlns="" id="{D08EB2CE-5902-3C42-ADAF-5D0DEFC8900A}"/>
+                <a16:creationId xmlns:a16="http://schemas.microsoft.com/office/drawing/2014/main" id="{D08EB2CE-5902-3C42-ADAF-5D0DEFC8900A}"/>
               </a:ext>
             </a:extLst>
           </p:cNvPr>
@@ -8292,7 +8278,7 @@
           <p:cNvPr id="28" name="Google Shape;133;p22">
             <a:extLst>
               <a:ext uri="{FF2B5EF4-FFF2-40B4-BE49-F238E27FC236}">
-                <a16:creationId xmlns:a16="http://schemas.microsoft.com/office/drawing/2014/main" xmlns="" id="{B2FA6578-609E-5F43-903E-9D09652383CA}"/>
+                <a16:creationId xmlns:a16="http://schemas.microsoft.com/office/drawing/2014/main" id="{B2FA6578-609E-5F43-903E-9D09652383CA}"/>
               </a:ext>
             </a:extLst>
           </p:cNvPr>
@@ -8329,7 +8315,7 @@
           <p:cNvPr id="29" name="Google Shape;116;p21">
             <a:extLst>
               <a:ext uri="{FF2B5EF4-FFF2-40B4-BE49-F238E27FC236}">
-                <a16:creationId xmlns:a16="http://schemas.microsoft.com/office/drawing/2014/main" xmlns="" id="{60D95972-EA00-9245-9D52-413D7820DE31}"/>
+                <a16:creationId xmlns:a16="http://schemas.microsoft.com/office/drawing/2014/main" id="{60D95972-EA00-9245-9D52-413D7820DE31}"/>
               </a:ext>
             </a:extLst>
           </p:cNvPr>
@@ -8380,7 +8366,7 @@
           <p:cNvPr id="30" name="Google Shape;134;p22">
             <a:extLst>
               <a:ext uri="{FF2B5EF4-FFF2-40B4-BE49-F238E27FC236}">
-                <a16:creationId xmlns:a16="http://schemas.microsoft.com/office/drawing/2014/main" xmlns="" id="{9B20C819-A3A0-AE45-B96B-318D39E4DF7D}"/>
+                <a16:creationId xmlns:a16="http://schemas.microsoft.com/office/drawing/2014/main" id="{9B20C819-A3A0-AE45-B96B-318D39E4DF7D}"/>
               </a:ext>
             </a:extLst>
           </p:cNvPr>
@@ -8414,7 +8400,7 @@
           <p:cNvPr id="31" name="ZoneTexte 13">
             <a:extLst>
               <a:ext uri="{FF2B5EF4-FFF2-40B4-BE49-F238E27FC236}">
-                <a16:creationId xmlns:a16="http://schemas.microsoft.com/office/drawing/2014/main" xmlns="" id="{D7FF2460-FBE6-0D4F-A743-DD38E86DBD7E}"/>
+                <a16:creationId xmlns:a16="http://schemas.microsoft.com/office/drawing/2014/main" id="{D7FF2460-FBE6-0D4F-A743-DD38E86DBD7E}"/>
               </a:ext>
             </a:extLst>
           </p:cNvPr>
@@ -8449,7 +8435,7 @@
           <p:cNvPr id="34" name="Espace réservé de la date 3">
             <a:extLst>
               <a:ext uri="{FF2B5EF4-FFF2-40B4-BE49-F238E27FC236}">
-                <a16:creationId xmlns:a16="http://schemas.microsoft.com/office/drawing/2014/main" xmlns="" id="{7B04738B-FD10-AD42-AA9A-D9E5B188D73B}"/>
+                <a16:creationId xmlns:a16="http://schemas.microsoft.com/office/drawing/2014/main" id="{7B04738B-FD10-AD42-AA9A-D9E5B188D73B}"/>
               </a:ext>
             </a:extLst>
           </p:cNvPr>
@@ -8472,7 +8458,7 @@
           <a:p>
             <a:fld id="{BB2FA04C-1355-4CE6-8050-4BD994E23BD5}" type="datetime4">
               <a:rPr lang="fr-FR" smtClean="0"/>
-              <a:t>6 juin 2019</a:t>
+              <a:t>7 juin 2019</a:t>
             </a:fld>
             <a:endParaRPr lang="fr-FR" dirty="0"/>
           </a:p>
@@ -8483,7 +8469,7 @@
           <p:cNvPr id="35" name="Espace réservé du pied de page 4">
             <a:extLst>
               <a:ext uri="{FF2B5EF4-FFF2-40B4-BE49-F238E27FC236}">
-                <a16:creationId xmlns:a16="http://schemas.microsoft.com/office/drawing/2014/main" xmlns="" id="{0FE90E11-C8BB-D04C-B32C-3C0DABE25AF6}"/>
+                <a16:creationId xmlns:a16="http://schemas.microsoft.com/office/drawing/2014/main" id="{0FE90E11-C8BB-D04C-B32C-3C0DABE25AF6}"/>
               </a:ext>
             </a:extLst>
           </p:cNvPr>
@@ -8516,7 +8502,7 @@
           <p:cNvPr id="36" name="Espace réservé du numéro de diapositive 5">
             <a:extLst>
               <a:ext uri="{FF2B5EF4-FFF2-40B4-BE49-F238E27FC236}">
-                <a16:creationId xmlns:a16="http://schemas.microsoft.com/office/drawing/2014/main" xmlns="" id="{2E42F879-8FF3-D741-BE58-8E6201169997}"/>
+                <a16:creationId xmlns:a16="http://schemas.microsoft.com/office/drawing/2014/main" id="{2E42F879-8FF3-D741-BE58-8E6201169997}"/>
               </a:ext>
             </a:extLst>
           </p:cNvPr>
@@ -8556,13 +8542,6 @@
   <p:clrMapOvr>
     <a:masterClrMapping/>
   </p:clrMapOvr>
-  <p:timing>
-    <p:tnLst>
-      <p:par>
-        <p:cTn id="1" dur="indefinite" restart="never" nodeType="tmRoot"/>
-      </p:par>
-    </p:tnLst>
-  </p:timing>
 </p:sld>
 </file>
 
@@ -8588,7 +8567,7 @@
           <p:cNvPr id="3" name="Titre 2">
             <a:extLst>
               <a:ext uri="{FF2B5EF4-FFF2-40B4-BE49-F238E27FC236}">
-                <a16:creationId xmlns:a16="http://schemas.microsoft.com/office/drawing/2014/main" xmlns="" id="{7921C1D7-9AAD-1441-9F6A-F19970F8918F}"/>
+                <a16:creationId xmlns:a16="http://schemas.microsoft.com/office/drawing/2014/main" id="{7921C1D7-9AAD-1441-9F6A-F19970F8918F}"/>
               </a:ext>
             </a:extLst>
           </p:cNvPr>
@@ -8796,7 +8775,7 @@
           <p:cNvPr id="11" name="Image 10">
             <a:extLst>
               <a:ext uri="{FF2B5EF4-FFF2-40B4-BE49-F238E27FC236}">
-                <a16:creationId xmlns:a16="http://schemas.microsoft.com/office/drawing/2014/main" xmlns="" id="{5B87F28A-5152-D743-821E-A2AA15F99530}"/>
+                <a16:creationId xmlns:a16="http://schemas.microsoft.com/office/drawing/2014/main" id="{5B87F28A-5152-D743-821E-A2AA15F99530}"/>
               </a:ext>
             </a:extLst>
           </p:cNvPr>
@@ -8826,7 +8805,7 @@
           <p:cNvPr id="12" name="Google Shape;133;p22">
             <a:extLst>
               <a:ext uri="{FF2B5EF4-FFF2-40B4-BE49-F238E27FC236}">
-                <a16:creationId xmlns:a16="http://schemas.microsoft.com/office/drawing/2014/main" xmlns="" id="{11B00C56-9F68-CE48-A866-BCB4C0E0236D}"/>
+                <a16:creationId xmlns:a16="http://schemas.microsoft.com/office/drawing/2014/main" id="{11B00C56-9F68-CE48-A866-BCB4C0E0236D}"/>
               </a:ext>
             </a:extLst>
           </p:cNvPr>
@@ -8908,7 +8887,7 @@
           <p:cNvPr id="19" name="Google Shape;134;p22">
             <a:extLst>
               <a:ext uri="{FF2B5EF4-FFF2-40B4-BE49-F238E27FC236}">
-                <a16:creationId xmlns:a16="http://schemas.microsoft.com/office/drawing/2014/main" xmlns="" id="{8A004551-2835-5346-A532-FBA95E1F21A1}"/>
+                <a16:creationId xmlns:a16="http://schemas.microsoft.com/office/drawing/2014/main" id="{8A004551-2835-5346-A532-FBA95E1F21A1}"/>
               </a:ext>
             </a:extLst>
           </p:cNvPr>
@@ -9036,7 +9015,7 @@
           <p:cNvPr id="15" name="Espace réservé de la date 3">
             <a:extLst>
               <a:ext uri="{FF2B5EF4-FFF2-40B4-BE49-F238E27FC236}">
-                <a16:creationId xmlns:a16="http://schemas.microsoft.com/office/drawing/2014/main" xmlns="" id="{704D21A2-40A8-5342-A3A5-74B00E25E343}"/>
+                <a16:creationId xmlns:a16="http://schemas.microsoft.com/office/drawing/2014/main" id="{704D21A2-40A8-5342-A3A5-74B00E25E343}"/>
               </a:ext>
             </a:extLst>
           </p:cNvPr>
@@ -9059,7 +9038,7 @@
           <a:p>
             <a:fld id="{BB2FA04C-1355-4CE6-8050-4BD994E23BD5}" type="datetime4">
               <a:rPr lang="fr-FR" smtClean="0"/>
-              <a:t>6 juin 2019</a:t>
+              <a:t>7 juin 2019</a:t>
             </a:fld>
             <a:endParaRPr lang="fr-FR" dirty="0"/>
           </a:p>
@@ -9070,7 +9049,7 @@
           <p:cNvPr id="16" name="Espace réservé du pied de page 4">
             <a:extLst>
               <a:ext uri="{FF2B5EF4-FFF2-40B4-BE49-F238E27FC236}">
-                <a16:creationId xmlns:a16="http://schemas.microsoft.com/office/drawing/2014/main" xmlns="" id="{D4135517-1EFA-2E41-BF78-74B49BE2E6FF}"/>
+                <a16:creationId xmlns:a16="http://schemas.microsoft.com/office/drawing/2014/main" id="{D4135517-1EFA-2E41-BF78-74B49BE2E6FF}"/>
               </a:ext>
             </a:extLst>
           </p:cNvPr>
@@ -9103,7 +9082,7 @@
           <p:cNvPr id="17" name="Espace réservé du numéro de diapositive 5">
             <a:extLst>
               <a:ext uri="{FF2B5EF4-FFF2-40B4-BE49-F238E27FC236}">
-                <a16:creationId xmlns:a16="http://schemas.microsoft.com/office/drawing/2014/main" xmlns="" id="{9CE77645-18D7-5147-A8DC-6A602D49739B}"/>
+                <a16:creationId xmlns:a16="http://schemas.microsoft.com/office/drawing/2014/main" id="{9CE77645-18D7-5147-A8DC-6A602D49739B}"/>
               </a:ext>
             </a:extLst>
           </p:cNvPr>
@@ -9143,13 +9122,6 @@
   <p:clrMapOvr>
     <a:masterClrMapping/>
   </p:clrMapOvr>
-  <p:timing>
-    <p:tnLst>
-      <p:par>
-        <p:cTn id="1" dur="indefinite" restart="never" nodeType="tmRoot"/>
-      </p:par>
-    </p:tnLst>
-  </p:timing>
 </p:sld>
 </file>
 
@@ -9175,7 +9147,7 @@
           <p:cNvPr id="2" name="Title 1">
             <a:extLst>
               <a:ext uri="{FF2B5EF4-FFF2-40B4-BE49-F238E27FC236}">
-                <a16:creationId xmlns:a16="http://schemas.microsoft.com/office/drawing/2014/main" xmlns="" id="{D89946E9-70F0-2841-BC76-02FB9D044357}"/>
+                <a16:creationId xmlns:a16="http://schemas.microsoft.com/office/drawing/2014/main" id="{D89946E9-70F0-2841-BC76-02FB9D044357}"/>
               </a:ext>
             </a:extLst>
           </p:cNvPr>
@@ -9200,39 +9172,10 @@
       </p:sp>
       <p:sp>
         <p:nvSpPr>
-          <p:cNvPr id="3" name="Date Placeholder 2">
-            <a:extLst>
-              <a:ext uri="{FF2B5EF4-FFF2-40B4-BE49-F238E27FC236}">
-                <a16:creationId xmlns:a16="http://schemas.microsoft.com/office/drawing/2014/main" xmlns="" id="{FC4E7CC2-A5D3-284B-BF7C-7C83C5085FF1}"/>
-              </a:ext>
-            </a:extLst>
-          </p:cNvPr>
-          <p:cNvSpPr>
-            <a:spLocks noGrp="1"/>
-          </p:cNvSpPr>
-          <p:nvPr>
-            <p:ph type="dt" sz="half" idx="10"/>
-          </p:nvPr>
-        </p:nvSpPr>
-        <p:spPr/>
-        <p:txBody>
-          <a:bodyPr/>
-          <a:lstStyle/>
-          <a:p>
-            <a:fld id="{BB2FA04C-1355-4CE6-8050-4BD994E23BD5}" type="datetime4">
-              <a:rPr lang="fr-FR" smtClean="0"/>
-              <a:t>6 juin 2019</a:t>
-            </a:fld>
-            <a:endParaRPr lang="fr-FR" dirty="0"/>
-          </a:p>
-        </p:txBody>
-      </p:sp>
-      <p:sp>
-        <p:nvSpPr>
           <p:cNvPr id="4" name="Footer Placeholder 3">
             <a:extLst>
               <a:ext uri="{FF2B5EF4-FFF2-40B4-BE49-F238E27FC236}">
-                <a16:creationId xmlns:a16="http://schemas.microsoft.com/office/drawing/2014/main" xmlns="" id="{FBDCC55D-9155-4443-BFD3-D919A82CDACB}"/>
+                <a16:creationId xmlns:a16="http://schemas.microsoft.com/office/drawing/2014/main" id="{FBDCC55D-9155-4443-BFD3-D919A82CDACB}"/>
               </a:ext>
             </a:extLst>
           </p:cNvPr>
@@ -9260,7 +9203,7 @@
           <p:cNvPr id="5" name="Slide Number Placeholder 4">
             <a:extLst>
               <a:ext uri="{FF2B5EF4-FFF2-40B4-BE49-F238E27FC236}">
-                <a16:creationId xmlns:a16="http://schemas.microsoft.com/office/drawing/2014/main" xmlns="" id="{650EEB80-4BD1-6A4A-9D71-1989ED45060C}"/>
+                <a16:creationId xmlns:a16="http://schemas.microsoft.com/office/drawing/2014/main" id="{650EEB80-4BD1-6A4A-9D71-1989ED45060C}"/>
               </a:ext>
             </a:extLst>
           </p:cNvPr>
@@ -9290,7 +9233,7 @@
           <p:cNvPr id="8" name="Table 7">
             <a:extLst>
               <a:ext uri="{FF2B5EF4-FFF2-40B4-BE49-F238E27FC236}">
-                <a16:creationId xmlns:a16="http://schemas.microsoft.com/office/drawing/2014/main" xmlns="" id="{4A8763EA-1798-C54D-83AC-3EC2FD0AD3E6}"/>
+                <a16:creationId xmlns:a16="http://schemas.microsoft.com/office/drawing/2014/main" id="{4A8763EA-1798-C54D-83AC-3EC2FD0AD3E6}"/>
               </a:ext>
             </a:extLst>
           </p:cNvPr>
@@ -9319,14 +9262,14 @@
                 <a:gridCol w="1911832">
                   <a:extLst>
                     <a:ext uri="{9D8B030D-6E8A-4147-A177-3AD203B41FA5}">
-                      <a16:colId xmlns:a16="http://schemas.microsoft.com/office/drawing/2014/main" xmlns="" val="406355994"/>
+                      <a16:colId xmlns:a16="http://schemas.microsoft.com/office/drawing/2014/main" val="406355994"/>
                     </a:ext>
                   </a:extLst>
                 </a:gridCol>
                 <a:gridCol w="5750501">
                   <a:extLst>
                     <a:ext uri="{9D8B030D-6E8A-4147-A177-3AD203B41FA5}">
-                      <a16:colId xmlns:a16="http://schemas.microsoft.com/office/drawing/2014/main" xmlns="" val="1318678898"/>
+                      <a16:colId xmlns:a16="http://schemas.microsoft.com/office/drawing/2014/main" val="1318678898"/>
                     </a:ext>
                   </a:extLst>
                 </a:gridCol>
@@ -9436,7 +9379,7 @@
                 </a:tc>
                 <a:extLst>
                   <a:ext uri="{0D108BD9-81ED-4DB2-BD59-A6C34878D82A}">
-                    <a16:rowId xmlns:a16="http://schemas.microsoft.com/office/drawing/2014/main" xmlns="" val="316534365"/>
+                    <a16:rowId xmlns:a16="http://schemas.microsoft.com/office/drawing/2014/main" val="316534365"/>
                   </a:ext>
                 </a:extLst>
               </a:tr>
@@ -9537,7 +9480,7 @@
                 </a:tc>
                 <a:extLst>
                   <a:ext uri="{0D108BD9-81ED-4DB2-BD59-A6C34878D82A}">
-                    <a16:rowId xmlns:a16="http://schemas.microsoft.com/office/drawing/2014/main" xmlns="" val="3679506044"/>
+                    <a16:rowId xmlns:a16="http://schemas.microsoft.com/office/drawing/2014/main" val="3679506044"/>
                   </a:ext>
                 </a:extLst>
               </a:tr>
@@ -9550,7 +9493,7 @@
           <p:cNvPr id="10" name="Oval 9">
             <a:extLst>
               <a:ext uri="{FF2B5EF4-FFF2-40B4-BE49-F238E27FC236}">
-                <a16:creationId xmlns:a16="http://schemas.microsoft.com/office/drawing/2014/main" xmlns="" id="{6A39CEE3-4BF4-FA45-BF58-355F687BE4A0}"/>
+                <a16:creationId xmlns:a16="http://schemas.microsoft.com/office/drawing/2014/main" id="{6A39CEE3-4BF4-FA45-BF58-355F687BE4A0}"/>
               </a:ext>
             </a:extLst>
           </p:cNvPr>
@@ -9604,7 +9547,7 @@
           <p:cNvPr id="11" name="TextBox 10">
             <a:extLst>
               <a:ext uri="{FF2B5EF4-FFF2-40B4-BE49-F238E27FC236}">
-                <a16:creationId xmlns:a16="http://schemas.microsoft.com/office/drawing/2014/main" xmlns="" id="{D07007BB-D314-5A42-A354-1EC52E29E150}"/>
+                <a16:creationId xmlns:a16="http://schemas.microsoft.com/office/drawing/2014/main" id="{D07007BB-D314-5A42-A354-1EC52E29E150}"/>
               </a:ext>
             </a:extLst>
           </p:cNvPr>
@@ -9654,7 +9597,7 @@
           <p:cNvPr id="13" name="Straight Arrow Connector 12">
             <a:extLst>
               <a:ext uri="{FF2B5EF4-FFF2-40B4-BE49-F238E27FC236}">
-                <a16:creationId xmlns:a16="http://schemas.microsoft.com/office/drawing/2014/main" xmlns="" id="{1BFC00F3-E8F8-B14D-893B-07912143FA7E}"/>
+                <a16:creationId xmlns:a16="http://schemas.microsoft.com/office/drawing/2014/main" id="{1BFC00F3-E8F8-B14D-893B-07912143FA7E}"/>
               </a:ext>
             </a:extLst>
           </p:cNvPr>
@@ -9691,7 +9634,7 @@
           <p:cNvPr id="15" name="ZoneTexte 13">
             <a:extLst>
               <a:ext uri="{FF2B5EF4-FFF2-40B4-BE49-F238E27FC236}">
-                <a16:creationId xmlns:a16="http://schemas.microsoft.com/office/drawing/2014/main" xmlns="" id="{11257B5A-A3EC-564E-95BB-BD401F6ED019}"/>
+                <a16:creationId xmlns:a16="http://schemas.microsoft.com/office/drawing/2014/main" id="{11257B5A-A3EC-564E-95BB-BD401F6ED019}"/>
               </a:ext>
             </a:extLst>
           </p:cNvPr>
@@ -9726,7 +9669,7 @@
           <p:cNvPr id="16" name="Rounded Rectangle 15">
             <a:extLst>
               <a:ext uri="{FF2B5EF4-FFF2-40B4-BE49-F238E27FC236}">
-                <a16:creationId xmlns:a16="http://schemas.microsoft.com/office/drawing/2014/main" xmlns="" id="{C79B642B-C6E8-1543-B979-91EA7043EC69}"/>
+                <a16:creationId xmlns:a16="http://schemas.microsoft.com/office/drawing/2014/main" id="{C79B642B-C6E8-1543-B979-91EA7043EC69}"/>
               </a:ext>
             </a:extLst>
           </p:cNvPr>
@@ -9781,7 +9724,7 @@
           <p:cNvPr id="17" name="Rounded Rectangle 16">
             <a:extLst>
               <a:ext uri="{FF2B5EF4-FFF2-40B4-BE49-F238E27FC236}">
-                <a16:creationId xmlns:a16="http://schemas.microsoft.com/office/drawing/2014/main" xmlns="" id="{9B455D11-BB5B-C940-AE8B-E04C4F441834}"/>
+                <a16:creationId xmlns:a16="http://schemas.microsoft.com/office/drawing/2014/main" id="{9B455D11-BB5B-C940-AE8B-E04C4F441834}"/>
               </a:ext>
             </a:extLst>
           </p:cNvPr>
@@ -9836,7 +9779,7 @@
           <p:cNvPr id="18" name="Straight Arrow Connector 17">
             <a:extLst>
               <a:ext uri="{FF2B5EF4-FFF2-40B4-BE49-F238E27FC236}">
-                <a16:creationId xmlns:a16="http://schemas.microsoft.com/office/drawing/2014/main" xmlns="" id="{C82A932E-27EB-1D4A-BB69-35044EC21282}"/>
+                <a16:creationId xmlns:a16="http://schemas.microsoft.com/office/drawing/2014/main" id="{C82A932E-27EB-1D4A-BB69-35044EC21282}"/>
               </a:ext>
             </a:extLst>
           </p:cNvPr>
@@ -9873,7 +9816,7 @@
           <p:cNvPr id="20" name="ZoneTexte 13">
             <a:extLst>
               <a:ext uri="{FF2B5EF4-FFF2-40B4-BE49-F238E27FC236}">
-                <a16:creationId xmlns:a16="http://schemas.microsoft.com/office/drawing/2014/main" xmlns="" id="{903A7483-DF4C-2343-A24F-447443C92632}"/>
+                <a16:creationId xmlns:a16="http://schemas.microsoft.com/office/drawing/2014/main" id="{903A7483-DF4C-2343-A24F-447443C92632}"/>
               </a:ext>
             </a:extLst>
           </p:cNvPr>
@@ -9927,7 +9870,7 @@
           <p:cNvPr id="22" name="Elbow Connector 21">
             <a:extLst>
               <a:ext uri="{FF2B5EF4-FFF2-40B4-BE49-F238E27FC236}">
-                <a16:creationId xmlns:a16="http://schemas.microsoft.com/office/drawing/2014/main" xmlns="" id="{A244F3EF-5EEF-E04A-B8DB-E6FC11A7C776}"/>
+                <a16:creationId xmlns:a16="http://schemas.microsoft.com/office/drawing/2014/main" id="{A244F3EF-5EEF-E04A-B8DB-E6FC11A7C776}"/>
               </a:ext>
             </a:extLst>
           </p:cNvPr>
@@ -9966,7 +9909,7 @@
           <p:cNvPr id="24" name="Rounded Rectangle 23">
             <a:extLst>
               <a:ext uri="{FF2B5EF4-FFF2-40B4-BE49-F238E27FC236}">
-                <a16:creationId xmlns:a16="http://schemas.microsoft.com/office/drawing/2014/main" xmlns="" id="{0DEA46E6-B80B-BE4C-9567-E21DA4DA4271}"/>
+                <a16:creationId xmlns:a16="http://schemas.microsoft.com/office/drawing/2014/main" id="{0DEA46E6-B80B-BE4C-9567-E21DA4DA4271}"/>
               </a:ext>
             </a:extLst>
           </p:cNvPr>
@@ -10021,7 +9964,7 @@
           <p:cNvPr id="25" name="Straight Arrow Connector 24">
             <a:extLst>
               <a:ext uri="{FF2B5EF4-FFF2-40B4-BE49-F238E27FC236}">
-                <a16:creationId xmlns:a16="http://schemas.microsoft.com/office/drawing/2014/main" xmlns="" id="{F38D1E8D-4A58-584F-A150-26F4B935955A}"/>
+                <a16:creationId xmlns:a16="http://schemas.microsoft.com/office/drawing/2014/main" id="{F38D1E8D-4A58-584F-A150-26F4B935955A}"/>
               </a:ext>
             </a:extLst>
           </p:cNvPr>
@@ -10058,7 +10001,7 @@
           <p:cNvPr id="28" name="Diamond 27">
             <a:extLst>
               <a:ext uri="{FF2B5EF4-FFF2-40B4-BE49-F238E27FC236}">
-                <a16:creationId xmlns:a16="http://schemas.microsoft.com/office/drawing/2014/main" xmlns="" id="{71F0184D-AE7A-6B4D-B699-71A5ED2515A6}"/>
+                <a16:creationId xmlns:a16="http://schemas.microsoft.com/office/drawing/2014/main" id="{71F0184D-AE7A-6B4D-B699-71A5ED2515A6}"/>
               </a:ext>
             </a:extLst>
           </p:cNvPr>
@@ -10110,7 +10053,7 @@
           <p:cNvPr id="31" name="Rectangle 30">
             <a:extLst>
               <a:ext uri="{FF2B5EF4-FFF2-40B4-BE49-F238E27FC236}">
-                <a16:creationId xmlns:a16="http://schemas.microsoft.com/office/drawing/2014/main" xmlns="" id="{2F82BC03-C4B9-1648-B76D-E2B72D8752ED}"/>
+                <a16:creationId xmlns:a16="http://schemas.microsoft.com/office/drawing/2014/main" id="{2F82BC03-C4B9-1648-B76D-E2B72D8752ED}"/>
               </a:ext>
             </a:extLst>
           </p:cNvPr>
@@ -10164,7 +10107,7 @@
           <p:cNvPr id="32" name="Straight Arrow Connector 31">
             <a:extLst>
               <a:ext uri="{FF2B5EF4-FFF2-40B4-BE49-F238E27FC236}">
-                <a16:creationId xmlns:a16="http://schemas.microsoft.com/office/drawing/2014/main" xmlns="" id="{C4A56298-2C17-F546-BE4F-DAFFA35CC5FE}"/>
+                <a16:creationId xmlns:a16="http://schemas.microsoft.com/office/drawing/2014/main" id="{C4A56298-2C17-F546-BE4F-DAFFA35CC5FE}"/>
               </a:ext>
             </a:extLst>
           </p:cNvPr>
@@ -10201,7 +10144,7 @@
           <p:cNvPr id="34" name="ZoneTexte 13">
             <a:extLst>
               <a:ext uri="{FF2B5EF4-FFF2-40B4-BE49-F238E27FC236}">
-                <a16:creationId xmlns:a16="http://schemas.microsoft.com/office/drawing/2014/main" xmlns="" id="{7293A084-06F0-F540-982A-8EFCA92310F3}"/>
+                <a16:creationId xmlns:a16="http://schemas.microsoft.com/office/drawing/2014/main" id="{7293A084-06F0-F540-982A-8EFCA92310F3}"/>
               </a:ext>
             </a:extLst>
           </p:cNvPr>
@@ -10236,7 +10179,7 @@
           <p:cNvPr id="37" name="Rounded Rectangle 36">
             <a:extLst>
               <a:ext uri="{FF2B5EF4-FFF2-40B4-BE49-F238E27FC236}">
-                <a16:creationId xmlns:a16="http://schemas.microsoft.com/office/drawing/2014/main" xmlns="" id="{4F20F8D2-4C45-CD44-9581-7BA40BADE04C}"/>
+                <a16:creationId xmlns:a16="http://schemas.microsoft.com/office/drawing/2014/main" id="{4F20F8D2-4C45-CD44-9581-7BA40BADE04C}"/>
               </a:ext>
             </a:extLst>
           </p:cNvPr>
@@ -10291,7 +10234,7 @@
           <p:cNvPr id="38" name="Rounded Rectangle 37">
             <a:extLst>
               <a:ext uri="{FF2B5EF4-FFF2-40B4-BE49-F238E27FC236}">
-                <a16:creationId xmlns:a16="http://schemas.microsoft.com/office/drawing/2014/main" xmlns="" id="{AF85B123-BCD9-2B40-8C67-F4B9589974A0}"/>
+                <a16:creationId xmlns:a16="http://schemas.microsoft.com/office/drawing/2014/main" id="{AF85B123-BCD9-2B40-8C67-F4B9589974A0}"/>
               </a:ext>
             </a:extLst>
           </p:cNvPr>
@@ -10339,7 +10282,7 @@
           <p:cNvPr id="41" name="Elbow Connector 40">
             <a:extLst>
               <a:ext uri="{FF2B5EF4-FFF2-40B4-BE49-F238E27FC236}">
-                <a16:creationId xmlns:a16="http://schemas.microsoft.com/office/drawing/2014/main" xmlns="" id="{2EA0A0A0-DAC1-E741-8E2B-20CEA7F645AC}"/>
+                <a16:creationId xmlns:a16="http://schemas.microsoft.com/office/drawing/2014/main" id="{2EA0A0A0-DAC1-E741-8E2B-20CEA7F645AC}"/>
               </a:ext>
             </a:extLst>
           </p:cNvPr>
@@ -10378,7 +10321,7 @@
           <p:cNvPr id="44" name="Straight Arrow Connector 43">
             <a:extLst>
               <a:ext uri="{FF2B5EF4-FFF2-40B4-BE49-F238E27FC236}">
-                <a16:creationId xmlns:a16="http://schemas.microsoft.com/office/drawing/2014/main" xmlns="" id="{DB4856CB-4AA8-804C-A341-4EBAA11A68D0}"/>
+                <a16:creationId xmlns:a16="http://schemas.microsoft.com/office/drawing/2014/main" id="{DB4856CB-4AA8-804C-A341-4EBAA11A68D0}"/>
               </a:ext>
             </a:extLst>
           </p:cNvPr>
@@ -10415,7 +10358,7 @@
           <p:cNvPr id="45" name="ZoneTexte 13">
             <a:extLst>
               <a:ext uri="{FF2B5EF4-FFF2-40B4-BE49-F238E27FC236}">
-                <a16:creationId xmlns:a16="http://schemas.microsoft.com/office/drawing/2014/main" xmlns="" id="{4B47F649-59E4-8B49-B65A-0EFAF2FAF3C0}"/>
+                <a16:creationId xmlns:a16="http://schemas.microsoft.com/office/drawing/2014/main" id="{4B47F649-59E4-8B49-B65A-0EFAF2FAF3C0}"/>
               </a:ext>
             </a:extLst>
           </p:cNvPr>
@@ -10450,7 +10393,7 @@
           <p:cNvPr id="51" name="Straight Arrow Connector 50">
             <a:extLst>
               <a:ext uri="{FF2B5EF4-FFF2-40B4-BE49-F238E27FC236}">
-                <a16:creationId xmlns:a16="http://schemas.microsoft.com/office/drawing/2014/main" xmlns="" id="{6FFE76C1-B63C-7649-B69D-1365A451B684}"/>
+                <a16:creationId xmlns:a16="http://schemas.microsoft.com/office/drawing/2014/main" id="{6FFE76C1-B63C-7649-B69D-1365A451B684}"/>
               </a:ext>
             </a:extLst>
           </p:cNvPr>
@@ -10487,7 +10430,7 @@
           <p:cNvPr id="55" name="Rounded Rectangle 54">
             <a:extLst>
               <a:ext uri="{FF2B5EF4-FFF2-40B4-BE49-F238E27FC236}">
-                <a16:creationId xmlns:a16="http://schemas.microsoft.com/office/drawing/2014/main" xmlns="" id="{5416136C-7DD1-DA45-AD12-7C89496BC683}"/>
+                <a16:creationId xmlns:a16="http://schemas.microsoft.com/office/drawing/2014/main" id="{5416136C-7DD1-DA45-AD12-7C89496BC683}"/>
               </a:ext>
             </a:extLst>
           </p:cNvPr>
@@ -10542,7 +10485,7 @@
           <p:cNvPr id="56" name="Straight Arrow Connector 55">
             <a:extLst>
               <a:ext uri="{FF2B5EF4-FFF2-40B4-BE49-F238E27FC236}">
-                <a16:creationId xmlns:a16="http://schemas.microsoft.com/office/drawing/2014/main" xmlns="" id="{59FBC7DA-1C85-4343-84E9-C7AB7B7E9A89}"/>
+                <a16:creationId xmlns:a16="http://schemas.microsoft.com/office/drawing/2014/main" id="{59FBC7DA-1C85-4343-84E9-C7AB7B7E9A89}"/>
               </a:ext>
             </a:extLst>
           </p:cNvPr>
@@ -10579,7 +10522,7 @@
           <p:cNvPr id="58" name="Oval 57">
             <a:extLst>
               <a:ext uri="{FF2B5EF4-FFF2-40B4-BE49-F238E27FC236}">
-                <a16:creationId xmlns:a16="http://schemas.microsoft.com/office/drawing/2014/main" xmlns="" id="{72A728FF-7B48-D943-A24A-B6B9830CB0FA}"/>
+                <a16:creationId xmlns:a16="http://schemas.microsoft.com/office/drawing/2014/main" id="{72A728FF-7B48-D943-A24A-B6B9830CB0FA}"/>
               </a:ext>
             </a:extLst>
           </p:cNvPr>
@@ -10633,7 +10576,7 @@
           <p:cNvPr id="60" name="Oval 59">
             <a:extLst>
               <a:ext uri="{FF2B5EF4-FFF2-40B4-BE49-F238E27FC236}">
-                <a16:creationId xmlns:a16="http://schemas.microsoft.com/office/drawing/2014/main" xmlns="" id="{8381883E-A99C-A848-ACBD-D358F63E9F4E}"/>
+                <a16:creationId xmlns:a16="http://schemas.microsoft.com/office/drawing/2014/main" id="{8381883E-A99C-A848-ACBD-D358F63E9F4E}"/>
               </a:ext>
             </a:extLst>
           </p:cNvPr>
@@ -10687,7 +10630,7 @@
           <p:cNvPr id="61" name="TextBox 60">
             <a:extLst>
               <a:ext uri="{FF2B5EF4-FFF2-40B4-BE49-F238E27FC236}">
-                <a16:creationId xmlns:a16="http://schemas.microsoft.com/office/drawing/2014/main" xmlns="" id="{FE8C867B-2CBA-4C43-9D93-5A4A82BB4105}"/>
+                <a16:creationId xmlns:a16="http://schemas.microsoft.com/office/drawing/2014/main" id="{FE8C867B-2CBA-4C43-9D93-5A4A82BB4105}"/>
               </a:ext>
             </a:extLst>
           </p:cNvPr>
@@ -10722,7 +10665,7 @@
           <p:cNvPr id="65" name="Google Shape;134;p22">
             <a:extLst>
               <a:ext uri="{FF2B5EF4-FFF2-40B4-BE49-F238E27FC236}">
-                <a16:creationId xmlns:a16="http://schemas.microsoft.com/office/drawing/2014/main" xmlns="" id="{6E41042E-EEFA-2745-AFEE-45A5DD62EE57}"/>
+                <a16:creationId xmlns:a16="http://schemas.microsoft.com/office/drawing/2014/main" id="{6E41042E-EEFA-2745-AFEE-45A5DD62EE57}"/>
               </a:ext>
             </a:extLst>
           </p:cNvPr>
@@ -10756,7 +10699,7 @@
           <p:cNvPr id="66" name="Google Shape;134;p22">
             <a:extLst>
               <a:ext uri="{FF2B5EF4-FFF2-40B4-BE49-F238E27FC236}">
-                <a16:creationId xmlns:a16="http://schemas.microsoft.com/office/drawing/2014/main" xmlns="" id="{75BD06FD-8067-2A40-918B-F31D746A2315}"/>
+                <a16:creationId xmlns:a16="http://schemas.microsoft.com/office/drawing/2014/main" id="{75BD06FD-8067-2A40-918B-F31D746A2315}"/>
               </a:ext>
             </a:extLst>
           </p:cNvPr>
@@ -10785,36 +10728,40 @@
           </a:ln>
         </p:spPr>
       </p:pic>
-      <p:pic>
-        <p:nvPicPr>
-          <p:cNvPr id="67" name="Picture 66">
+      <p:sp>
+        <p:nvSpPr>
+          <p:cNvPr id="36" name="Espace réservé de la date 3">
             <a:extLst>
               <a:ext uri="{FF2B5EF4-FFF2-40B4-BE49-F238E27FC236}">
-                <a16:creationId xmlns:a16="http://schemas.microsoft.com/office/drawing/2014/main" xmlns="" id="{7676DD85-6E65-FF4D-A3E8-7EA6B76EDD3A}"/>
+                <a16:creationId xmlns:a16="http://schemas.microsoft.com/office/drawing/2014/main" id="{302D4DFD-4023-F24F-A32F-F7BE5452B03D}"/>
               </a:ext>
             </a:extLst>
           </p:cNvPr>
-          <p:cNvPicPr>
-            <a:picLocks noChangeAspect="1"/>
-          </p:cNvPicPr>
-          <p:nvPr/>
-        </p:nvPicPr>
-        <p:blipFill>
-          <a:blip r:embed="rId3"/>
-          <a:stretch>
-            <a:fillRect/>
-          </a:stretch>
-        </p:blipFill>
-        <p:spPr>
-          <a:xfrm>
-            <a:off x="38102" y="-25526"/>
-            <a:ext cx="9144000" cy="6858000"/>
-          </a:xfrm>
-          <a:prstGeom prst="rect">
-            <a:avLst/>
-          </a:prstGeom>
-        </p:spPr>
-      </p:pic>
+          <p:cNvSpPr>
+            <a:spLocks noGrp="1"/>
+          </p:cNvSpPr>
+          <p:nvPr>
+            <p:ph type="dt" sz="half" idx="10"/>
+          </p:nvPr>
+        </p:nvSpPr>
+        <p:spPr>
+          <a:xfrm>
+            <a:off x="901702" y="6654800"/>
+            <a:ext cx="2133600" cy="206375"/>
+          </a:xfrm>
+        </p:spPr>
+        <p:txBody>
+          <a:bodyPr/>
+          <a:lstStyle/>
+          <a:p>
+            <a:fld id="{BB2FA04C-1355-4CE6-8050-4BD994E23BD5}" type="datetime4">
+              <a:rPr lang="fr-FR" smtClean="0"/>
+              <a:t>7 juin 2019</a:t>
+            </a:fld>
+            <a:endParaRPr lang="fr-FR" dirty="0"/>
+          </a:p>
+        </p:txBody>
+      </p:sp>
     </p:spTree>
     <p:extLst>
       <p:ext uri="{BB962C8B-B14F-4D97-AF65-F5344CB8AC3E}">
@@ -10825,13 +10772,6 @@
   <p:clrMapOvr>
     <a:masterClrMapping/>
   </p:clrMapOvr>
-  <p:timing>
-    <p:tnLst>
-      <p:par>
-        <p:cTn id="1" dur="indefinite" restart="never" nodeType="tmRoot"/>
-      </p:par>
-    </p:tnLst>
-  </p:timing>
 </p:sld>
 </file>
 
@@ -10881,7 +10821,7 @@
           <p:cNvPr id="3" name="Titre 2">
             <a:extLst>
               <a:ext uri="{FF2B5EF4-FFF2-40B4-BE49-F238E27FC236}">
-                <a16:creationId xmlns:a16="http://schemas.microsoft.com/office/drawing/2014/main" xmlns="" id="{7921C1D7-9AAD-1441-9F6A-F19970F8918F}"/>
+                <a16:creationId xmlns:a16="http://schemas.microsoft.com/office/drawing/2014/main" id="{7921C1D7-9AAD-1441-9F6A-F19970F8918F}"/>
               </a:ext>
             </a:extLst>
           </p:cNvPr>
@@ -11034,7 +10974,7 @@
           <p:cNvPr id="16" name="Espace réservé de la date 3">
             <a:extLst>
               <a:ext uri="{FF2B5EF4-FFF2-40B4-BE49-F238E27FC236}">
-                <a16:creationId xmlns:a16="http://schemas.microsoft.com/office/drawing/2014/main" xmlns="" id="{85DB5E53-2306-A342-90BB-BD43A00D539E}"/>
+                <a16:creationId xmlns:a16="http://schemas.microsoft.com/office/drawing/2014/main" id="{85DB5E53-2306-A342-90BB-BD43A00D539E}"/>
               </a:ext>
             </a:extLst>
           </p:cNvPr>
@@ -11057,7 +10997,7 @@
           <a:p>
             <a:fld id="{BB2FA04C-1355-4CE6-8050-4BD994E23BD5}" type="datetime4">
               <a:rPr lang="fr-FR" smtClean="0"/>
-              <a:t>6 juin 2019</a:t>
+              <a:t>7 juin 2019</a:t>
             </a:fld>
             <a:endParaRPr lang="fr-FR" dirty="0"/>
           </a:p>
@@ -11068,7 +11008,7 @@
           <p:cNvPr id="17" name="Espace réservé du pied de page 4">
             <a:extLst>
               <a:ext uri="{FF2B5EF4-FFF2-40B4-BE49-F238E27FC236}">
-                <a16:creationId xmlns:a16="http://schemas.microsoft.com/office/drawing/2014/main" xmlns="" id="{815F5B13-8167-B446-B71B-F51C00AFCE7E}"/>
+                <a16:creationId xmlns:a16="http://schemas.microsoft.com/office/drawing/2014/main" id="{815F5B13-8167-B446-B71B-F51C00AFCE7E}"/>
               </a:ext>
             </a:extLst>
           </p:cNvPr>
@@ -11101,7 +11041,7 @@
           <p:cNvPr id="18" name="Espace réservé du numéro de diapositive 5">
             <a:extLst>
               <a:ext uri="{FF2B5EF4-FFF2-40B4-BE49-F238E27FC236}">
-                <a16:creationId xmlns:a16="http://schemas.microsoft.com/office/drawing/2014/main" xmlns="" id="{2715BE8D-4266-ED42-B897-EC095C7BBB00}"/>
+                <a16:creationId xmlns:a16="http://schemas.microsoft.com/office/drawing/2014/main" id="{2715BE8D-4266-ED42-B897-EC095C7BBB00}"/>
               </a:ext>
             </a:extLst>
           </p:cNvPr>
@@ -11136,7 +11076,7 @@
           <p:cNvPr id="23" name="Google Shape;113;p21">
             <a:extLst>
               <a:ext uri="{FF2B5EF4-FFF2-40B4-BE49-F238E27FC236}">
-                <a16:creationId xmlns:a16="http://schemas.microsoft.com/office/drawing/2014/main" xmlns="" id="{C0090C7A-07F8-9343-AACB-DB32A461D777}"/>
+                <a16:creationId xmlns:a16="http://schemas.microsoft.com/office/drawing/2014/main" id="{C0090C7A-07F8-9343-AACB-DB32A461D777}"/>
               </a:ext>
             </a:extLst>
           </p:cNvPr>
@@ -11170,7 +11110,7 @@
           <p:cNvPr id="24" name="Google Shape;117;p21">
             <a:extLst>
               <a:ext uri="{FF2B5EF4-FFF2-40B4-BE49-F238E27FC236}">
-                <a16:creationId xmlns:a16="http://schemas.microsoft.com/office/drawing/2014/main" xmlns="" id="{2009DA93-BAF0-2B4E-AA1B-D0300E63BD6E}"/>
+                <a16:creationId xmlns:a16="http://schemas.microsoft.com/office/drawing/2014/main" id="{2009DA93-BAF0-2B4E-AA1B-D0300E63BD6E}"/>
               </a:ext>
             </a:extLst>
           </p:cNvPr>
@@ -11207,7 +11147,7 @@
           <p:cNvPr id="25" name="Image 10">
             <a:extLst>
               <a:ext uri="{FF2B5EF4-FFF2-40B4-BE49-F238E27FC236}">
-                <a16:creationId xmlns:a16="http://schemas.microsoft.com/office/drawing/2014/main" xmlns="" id="{CA3DDE2F-D277-5044-AB80-87C4981DF03D}"/>
+                <a16:creationId xmlns:a16="http://schemas.microsoft.com/office/drawing/2014/main" id="{CA3DDE2F-D277-5044-AB80-87C4981DF03D}"/>
               </a:ext>
             </a:extLst>
           </p:cNvPr>
@@ -11237,7 +11177,7 @@
           <p:cNvPr id="26" name="Google Shape;133;p22">
             <a:extLst>
               <a:ext uri="{FF2B5EF4-FFF2-40B4-BE49-F238E27FC236}">
-                <a16:creationId xmlns:a16="http://schemas.microsoft.com/office/drawing/2014/main" xmlns="" id="{0E467C43-0234-C44D-842E-1E61FC0F55A1}"/>
+                <a16:creationId xmlns:a16="http://schemas.microsoft.com/office/drawing/2014/main" id="{0E467C43-0234-C44D-842E-1E61FC0F55A1}"/>
               </a:ext>
             </a:extLst>
           </p:cNvPr>
@@ -11274,7 +11214,7 @@
           <p:cNvPr id="27" name="Google Shape;116;p21">
             <a:extLst>
               <a:ext uri="{FF2B5EF4-FFF2-40B4-BE49-F238E27FC236}">
-                <a16:creationId xmlns:a16="http://schemas.microsoft.com/office/drawing/2014/main" xmlns="" id="{E7E7CDCA-10F5-064E-BA24-85BC703673F8}"/>
+                <a16:creationId xmlns:a16="http://schemas.microsoft.com/office/drawing/2014/main" id="{E7E7CDCA-10F5-064E-BA24-85BC703673F8}"/>
               </a:ext>
             </a:extLst>
           </p:cNvPr>
@@ -11325,7 +11265,7 @@
           <p:cNvPr id="28" name="Google Shape;134;p22">
             <a:extLst>
               <a:ext uri="{FF2B5EF4-FFF2-40B4-BE49-F238E27FC236}">
-                <a16:creationId xmlns:a16="http://schemas.microsoft.com/office/drawing/2014/main" xmlns="" id="{29D469E5-C606-CF48-847E-76BDC68DDB2A}"/>
+                <a16:creationId xmlns:a16="http://schemas.microsoft.com/office/drawing/2014/main" id="{29D469E5-C606-CF48-847E-76BDC68DDB2A}"/>
               </a:ext>
             </a:extLst>
           </p:cNvPr>
@@ -11359,7 +11299,7 @@
           <p:cNvPr id="29" name="ZoneTexte 13">
             <a:extLst>
               <a:ext uri="{FF2B5EF4-FFF2-40B4-BE49-F238E27FC236}">
-                <a16:creationId xmlns:a16="http://schemas.microsoft.com/office/drawing/2014/main" xmlns="" id="{F0F4FF03-2B6B-8E49-B85C-4AF68DC2E805}"/>
+                <a16:creationId xmlns:a16="http://schemas.microsoft.com/office/drawing/2014/main" id="{F0F4FF03-2B6B-8E49-B85C-4AF68DC2E805}"/>
               </a:ext>
             </a:extLst>
           </p:cNvPr>
@@ -11394,7 +11334,7 @@
           <p:cNvPr id="30" name="Picture 2" descr="Image associÃ©e">
             <a:extLst>
               <a:ext uri="{FF2B5EF4-FFF2-40B4-BE49-F238E27FC236}">
-                <a16:creationId xmlns:a16="http://schemas.microsoft.com/office/drawing/2014/main" xmlns="" id="{A2D0C2E4-8513-7147-BB59-058570FAD97F}"/>
+                <a16:creationId xmlns:a16="http://schemas.microsoft.com/office/drawing/2014/main" id="{A2D0C2E4-8513-7147-BB59-058570FAD97F}"/>
               </a:ext>
             </a:extLst>
           </p:cNvPr>
@@ -11441,7 +11381,7 @@
           <p:cNvPr id="31" name="Image 1">
             <a:extLst>
               <a:ext uri="{FF2B5EF4-FFF2-40B4-BE49-F238E27FC236}">
-                <a16:creationId xmlns:a16="http://schemas.microsoft.com/office/drawing/2014/main" xmlns="" id="{78A4C6F8-4D1B-604F-B654-F8451DC103D9}"/>
+                <a16:creationId xmlns:a16="http://schemas.microsoft.com/office/drawing/2014/main" id="{78A4C6F8-4D1B-604F-B654-F8451DC103D9}"/>
               </a:ext>
             </a:extLst>
           </p:cNvPr>
@@ -11520,7 +11460,7 @@
           <p:cNvPr id="32" name="Image 3">
             <a:extLst>
               <a:ext uri="{FF2B5EF4-FFF2-40B4-BE49-F238E27FC236}">
-                <a16:creationId xmlns:a16="http://schemas.microsoft.com/office/drawing/2014/main" xmlns="" id="{2799D9D7-0145-2546-87F7-D2F5D2436932}"/>
+                <a16:creationId xmlns:a16="http://schemas.microsoft.com/office/drawing/2014/main" id="{2799D9D7-0145-2546-87F7-D2F5D2436932}"/>
               </a:ext>
             </a:extLst>
           </p:cNvPr>
@@ -11569,13 +11509,6 @@
   <p:clrMapOvr>
     <a:masterClrMapping/>
   </p:clrMapOvr>
-  <p:timing>
-    <p:tnLst>
-      <p:par>
-        <p:cTn id="1" dur="indefinite" restart="never" nodeType="tmRoot"/>
-      </p:par>
-    </p:tnLst>
-  </p:timing>
 </p:sld>
 </file>
 

</xml_diff>